<commit_message>
백업 완료: 2023-11-25 02:02:07
Affected files:
노코드 엔지니어링/노코드 개론.pptx
</commit_message>
<xml_diff>
--- a/노코드 엔지니어링/노코드 개론.pptx
+++ b/노코드 엔지니어링/노코드 개론.pptx
@@ -2226,9 +2226,9 @@
           <a:bodyPr/>
           <a:lstStyle>
             <a:lvl1pPr marL="285750" indent="-285750" algn="l">
-              <a:buFont typeface="Arial" panose="020B0604020202020204" pitchFamily="34" charset="0"/>
-              <a:buChar char="•"/>
-              <a:defRPr sz="1600"/>
+              <a:buFont typeface="Wingdings" panose="05000000000000000000" pitchFamily="2" charset="2"/>
+              <a:buChar char="Ø"/>
+              <a:defRPr sz="1600" b="1"/>
             </a:lvl1pPr>
             <a:lvl2pPr marL="742950" indent="-285750">
               <a:buFont typeface="Arial" panose="020B0604020202020204" pitchFamily="34" charset="0"/>
@@ -3410,7 +3410,7 @@
       </a:lvl1pPr>
     </p:titleStyle>
     <p:bodyStyle>
-      <a:lvl1pPr algn="l" defTabSz="914400" eaLnBrk="1" hangingPunct="1" indent="-180000" latinLnBrk="1" marL="180000" rtl="0">
+      <a:lvl1pPr algn="l" defTabSz="914400" eaLnBrk="1" hangingPunct="1" indent="0" latinLnBrk="1" marL="0" rtl="0">
         <a:lnSpc>
           <a:spcPct val="120000"/>
         </a:lnSpc>
@@ -3422,8 +3422,8 @@
         </a:buClr>
         <a:buSzPct val="100000"/>
         <a:buFont charset="0" panose="020B0604020202020204" pitchFamily="34" typeface="Arial"/>
-        <a:buChar char="•"/>
-        <a:defRPr kern="1200" sz="1600">
+        <a:buNone/>
+        <a:defRPr b="1" kern="1200" sz="1600">
           <a:solidFill>
             <a:schemeClr val="tx1"/>
           </a:solidFill>
@@ -5640,11 +5640,18 @@
             <a:pPr lvl="0"/>
             <a:r>
               <a:rPr/>
-              <a:t>노코드로 제품을 구현하는 것. ### 로우코드</a:t>
+              <a:t>노코드로 제품을 구현하는 것.</a:t>
             </a:r>
           </a:p>
           <a:p>
             <a:pPr lvl="0"/>
+            <a:r>
+              <a:rPr/>
+              <a:t>로우코드</a:t>
+            </a:r>
+          </a:p>
+          <a:p>
+            <a:pPr lvl="1"/>
             <a:r>
               <a:rPr/>
               <a:t>약간의 코딩을 더해 강력한 기능성을 갖는 노코드 툴=</a:t>
@@ -5790,6 +5797,55 @@
                       </p:childTnLst>
                     </p:cTn>
                   </p:par>
+                  <p:par>
+                    <p:cTn id="11" fill="hold">
+                      <p:stCondLst>
+                        <p:cond delay="indefinite"/>
+                      </p:stCondLst>
+                      <p:childTnLst>
+                        <p:par>
+                          <p:cTn id="12" fill="hold">
+                            <p:stCondLst>
+                              <p:cond delay="0"/>
+                            </p:stCondLst>
+                            <p:childTnLst>
+                              <p:par>
+                                <p:cTn id="13" presetID="1" presetClass="entr" presetSubtype="0" fill="hold" grpId="0" nodeType="clickEffect">
+                                  <p:stCondLst>
+                                    <p:cond delay="0"/>
+                                  </p:stCondLst>
+                                  <p:childTnLst>
+                                    <p:set>
+                                      <p:cBhvr>
+                                        <p:cTn id="14" dur="1" fill="hold">
+                                          <p:stCondLst>
+                                            <p:cond delay="0"/>
+                                          </p:stCondLst>
+                                        </p:cTn>
+                                        <p:tgtEl>
+                                          <p:spTgt spid="4">
+                                            <p:txEl>
+                                              <p:pRg st="2" end="2"/>
+                                            </p:txEl>
+                                          </p:spTgt>
+                                        </p:tgtEl>
+                                        <p:attrNameLst>
+                                          <p:attrName>style.visibility</p:attrName>
+                                        </p:attrNameLst>
+                                      </p:cBhvr>
+                                      <p:to>
+                                        <p:strVal val="visible"/>
+                                      </p:to>
+                                    </p:set>
+                                  </p:childTnLst>
+                                </p:cTn>
+                              </p:par>
+                            </p:childTnLst>
+                          </p:cTn>
+                        </p:par>
+                      </p:childTnLst>
+                    </p:cTn>
+                  </p:par>
                 </p:childTnLst>
               </p:cTn>
               <p:prevCondLst>
@@ -5927,61 +5983,63 @@
           <a:bodyPr/>
           <a:lstStyle/>
           <a:p>
-            <a:pPr lvl="0" indent="0" marL="0">
-              <a:spcBef>
-                <a:spcPts val="3000"/>
-              </a:spcBef>
-              <a:buNone/>
-            </a:pPr>
-            <a:r>
-              <a:rPr b="1"/>
+            <a:pPr lvl="0"/>
+            <a:r>
+              <a:rPr/>
               <a:t>쉽다.</a:t>
             </a:r>
           </a:p>
           <a:p>
-            <a:pPr lvl="0"/>
+            <a:pPr lvl="1"/>
             <a:r>
               <a:rPr/>
               <a:t>검은 화면에 텍스트를 보며 작업하는 것이 코딩의 진입장벽</a:t>
             </a:r>
           </a:p>
           <a:p>
-            <a:pPr lvl="1"/>
+            <a:pPr lvl="2"/>
             <a:r>
               <a:rPr/>
               <a:t>노코드 툴은 GUI를 사용해서 WYSIWYG 환경을 구축</a:t>
             </a:r>
           </a:p>
           <a:p>
-            <a:pPr lvl="2"/>
+            <a:pPr lvl="3"/>
             <a:r>
               <a:rPr/>
               <a:t>What you see is what you get</a:t>
             </a:r>
           </a:p>
           <a:p>
+            <a:pPr lvl="1"/>
+            <a:r>
+              <a:rPr/>
+              <a:t>쉽기 때문에 프로그래밍의 학습을 보조하거나 진입장벽을 낮춰주는 효과가 있음</a:t>
+            </a:r>
+          </a:p>
+          <a:p>
             <a:pPr lvl="0"/>
             <a:r>
               <a:rPr/>
-              <a:t>쉽기 때문에 프로그래밍의 학습을 보조하거나 진입장벽을 낮춰주는 효과가 있음 ### 빠르다.</a:t>
-            </a:r>
-          </a:p>
-          <a:p>
-            <a:pPr lvl="0"/>
+              <a:t>빠르다.</a:t>
+            </a:r>
+          </a:p>
+          <a:p>
+            <a:pPr lvl="1"/>
             <a:r>
               <a:rPr/>
               <a:t>개발의 많은 부분이 컴포넌트화, 모듈화되어 있고</a:t>
             </a:r>
           </a:p>
           <a:p>
-            <a:pPr lvl="1"/>
+            <a:pPr lvl="2"/>
             <a:r>
               <a:rPr/>
               <a:t>뚝딱뚝딱 가져다 쓰면 됨</a:t>
             </a:r>
           </a:p>
           <a:p>
-            <a:pPr lvl="0"/>
+            <a:pPr lvl="1"/>
             <a:r>
               <a:rPr/>
               <a:t>GUI를 사용하기 때문에 설계가 직관적임.</a:t>
@@ -6027,7 +6085,7 @@
                                         <p:tgtEl>
                                           <p:spTgt spid="3">
                                             <p:txEl>
-                                              <p:pRg st="1" end="1"/>
+                                              <p:pRg st="0" end="0"/>
                                             </p:txEl>
                                           </p:spTgt>
                                         </p:tgtEl>
@@ -6076,7 +6134,7 @@
                                         <p:tgtEl>
                                           <p:spTgt spid="3">
                                             <p:txEl>
-                                              <p:pRg st="2" end="2"/>
+                                              <p:pRg st="1" end="1"/>
                                             </p:txEl>
                                           </p:spTgt>
                                         </p:tgtEl>
@@ -6125,7 +6183,7 @@
                                         <p:tgtEl>
                                           <p:spTgt spid="3">
                                             <p:txEl>
-                                              <p:pRg st="3" end="3"/>
+                                              <p:pRg st="2" end="2"/>
                                             </p:txEl>
                                           </p:spTgt>
                                         </p:tgtEl>
@@ -6174,7 +6232,7 @@
                                         <p:tgtEl>
                                           <p:spTgt spid="3">
                                             <p:txEl>
-                                              <p:pRg st="4" end="4"/>
+                                              <p:pRg st="3" end="3"/>
                                             </p:txEl>
                                           </p:spTgt>
                                         </p:tgtEl>
@@ -6223,7 +6281,7 @@
                                         <p:tgtEl>
                                           <p:spTgt spid="3">
                                             <p:txEl>
-                                              <p:pRg st="5" end="5"/>
+                                              <p:pRg st="4" end="4"/>
                                             </p:txEl>
                                           </p:spTgt>
                                         </p:tgtEl>
@@ -6272,7 +6330,7 @@
                                         <p:tgtEl>
                                           <p:spTgt spid="3">
                                             <p:txEl>
-                                              <p:pRg st="6" end="6"/>
+                                              <p:pRg st="5" end="5"/>
                                             </p:txEl>
                                           </p:spTgt>
                                         </p:tgtEl>
@@ -6321,7 +6379,105 @@
                                         <p:tgtEl>
                                           <p:spTgt spid="3">
                                             <p:txEl>
+                                              <p:pRg st="6" end="6"/>
+                                            </p:txEl>
+                                          </p:spTgt>
+                                        </p:tgtEl>
+                                        <p:attrNameLst>
+                                          <p:attrName>style.visibility</p:attrName>
+                                        </p:attrNameLst>
+                                      </p:cBhvr>
+                                      <p:to>
+                                        <p:strVal val="visible"/>
+                                      </p:to>
+                                    </p:set>
+                                  </p:childTnLst>
+                                </p:cTn>
+                              </p:par>
+                            </p:childTnLst>
+                          </p:cTn>
+                        </p:par>
+                      </p:childTnLst>
+                    </p:cTn>
+                  </p:par>
+                  <p:par>
+                    <p:cTn id="31" fill="hold">
+                      <p:stCondLst>
+                        <p:cond delay="indefinite"/>
+                      </p:stCondLst>
+                      <p:childTnLst>
+                        <p:par>
+                          <p:cTn id="32" fill="hold">
+                            <p:stCondLst>
+                              <p:cond delay="0"/>
+                            </p:stCondLst>
+                            <p:childTnLst>
+                              <p:par>
+                                <p:cTn id="33" presetID="1" presetClass="entr" presetSubtype="0" fill="hold" grpId="0" nodeType="clickEffect">
+                                  <p:stCondLst>
+                                    <p:cond delay="0"/>
+                                  </p:stCondLst>
+                                  <p:childTnLst>
+                                    <p:set>
+                                      <p:cBhvr>
+                                        <p:cTn id="34" dur="1" fill="hold">
+                                          <p:stCondLst>
+                                            <p:cond delay="0"/>
+                                          </p:stCondLst>
+                                        </p:cTn>
+                                        <p:tgtEl>
+                                          <p:spTgt spid="3">
+                                            <p:txEl>
                                               <p:pRg st="7" end="7"/>
+                                            </p:txEl>
+                                          </p:spTgt>
+                                        </p:tgtEl>
+                                        <p:attrNameLst>
+                                          <p:attrName>style.visibility</p:attrName>
+                                        </p:attrNameLst>
+                                      </p:cBhvr>
+                                      <p:to>
+                                        <p:strVal val="visible"/>
+                                      </p:to>
+                                    </p:set>
+                                  </p:childTnLst>
+                                </p:cTn>
+                              </p:par>
+                            </p:childTnLst>
+                          </p:cTn>
+                        </p:par>
+                      </p:childTnLst>
+                    </p:cTn>
+                  </p:par>
+                  <p:par>
+                    <p:cTn id="35" fill="hold">
+                      <p:stCondLst>
+                        <p:cond delay="indefinite"/>
+                      </p:stCondLst>
+                      <p:childTnLst>
+                        <p:par>
+                          <p:cTn id="36" fill="hold">
+                            <p:stCondLst>
+                              <p:cond delay="0"/>
+                            </p:stCondLst>
+                            <p:childTnLst>
+                              <p:par>
+                                <p:cTn id="37" presetID="1" presetClass="entr" presetSubtype="0" fill="hold" grpId="0" nodeType="clickEffect">
+                                  <p:stCondLst>
+                                    <p:cond delay="0"/>
+                                  </p:stCondLst>
+                                  <p:childTnLst>
+                                    <p:set>
+                                      <p:cBhvr>
+                                        <p:cTn id="38" dur="1" fill="hold">
+                                          <p:stCondLst>
+                                            <p:cond delay="0"/>
+                                          </p:stCondLst>
+                                        </p:cTn>
+                                        <p:tgtEl>
+                                          <p:spTgt spid="3">
+                                            <p:txEl>
+                                              <p:pRg st="8" end="8"/>
                                             </p:txEl>
                                           </p:spTgt>
                                         </p:tgtEl>

</xml_diff>

<commit_message>
백업 완료: 2023-11-25 02:03:09
Affected files:
노코드 엔지니어링/노코드 개론.pptx
</commit_message>
<xml_diff>
--- a/노코드 엔지니어링/노코드 개론.pptx
+++ b/노코드 엔지니어링/노코드 개론.pptx
@@ -9461,15 +9461,15 @@
         <a:srgbClr val="BC658E"/>
       </a:folHlink>
     </a:clrScheme>
-    <a:fontScheme name="Custom 2">
+    <a:fontScheme name="Custom 3">
       <a:majorFont>
         <a:latin typeface="Gill Sans MT"/>
-        <a:ea typeface="KoPubWorld돋움체 Bold"/>
+        <a:ea typeface="KoPubWorld돋움체 Medium"/>
         <a:cs typeface=""/>
       </a:majorFont>
       <a:minorFont>
         <a:latin typeface="Gill Sans MT"/>
-        <a:ea typeface="KoPubWorld돋움체 Bold"/>
+        <a:ea typeface="KoPubWorld돋움체 Medium"/>
         <a:cs typeface=""/>
       </a:minorFont>
     </a:fontScheme>

</xml_diff>

<commit_message>
백업 완료: 2023-11-25 02:32:36
Affected files:
노코드 엔지니어링/노코드 개론.md
노코드 엔지니어링/노코드 개론.pptx
</commit_message>
<xml_diff>
--- a/노코드 엔지니어링/노코드 개론.pptx
+++ b/노코드 엔지니어링/노코드 개론.pptx
@@ -19,7 +19,6 @@
     <p:sldId id="267" r:id="rId13"/>
     <p:sldId id="268" r:id="rId14"/>
     <p:sldId id="269" r:id="rId15"/>
-    <p:sldId id="270" r:id="rId16"/>
   </p:sldIdLst>
   <p:sldSz cx="12192000" cy="6858000"/>
   <p:notesSz cx="6858000" cy="9144000"/>
@@ -2099,7 +2098,7 @@
 </file>
 
 <file path=ppt/slideLayouts/slideLayout8.xml><?xml version="1.0" encoding="utf-8"?>
-<p:sldLayout xmlns:a="http://schemas.openxmlformats.org/drawingml/2006/main" xmlns:r="http://schemas.openxmlformats.org/officeDocument/2006/relationships" xmlns:p="http://schemas.openxmlformats.org/presentationml/2006/main" type="objTx" preserve="1">
+<p:sldLayout xmlns:a="http://schemas.openxmlformats.org/drawingml/2006/main" xmlns:r="http://schemas.openxmlformats.org/officeDocument/2006/relationships" xmlns:p="http://schemas.openxmlformats.org/presentationml/2006/main" preserve="1" userDrawn="1">
   <p:cSld name="Content with Caption">
     <p:spTree>
       <p:nvGrpSpPr>
@@ -2230,7 +2229,7 @@
               <a:buChar char="Ø"/>
               <a:defRPr sz="1600" b="1"/>
             </a:lvl1pPr>
-            <a:lvl2pPr marL="742950" indent="-285750">
+            <a:lvl2pPr marL="270000" indent="-285750">
               <a:buFont typeface="Arial" panose="020B0604020202020204" pitchFamily="34" charset="0"/>
               <a:buChar char="•"/>
               <a:defRPr sz="1400"/>
@@ -3816,31 +3815,6 @@
       </p:grpSpPr>
       <p:sp>
         <p:nvSpPr>
-          <p:cNvPr id="2" name="Title 1"/>
-          <p:cNvSpPr>
-            <a:spLocks noGrp="1"/>
-          </p:cNvSpPr>
-          <p:nvPr>
-            <p:ph type="title"/>
-          </p:nvPr>
-        </p:nvSpPr>
-        <p:spPr/>
-        <p:txBody>
-          <a:bodyPr/>
-          <a:lstStyle/>
-          <a:p>
-            <a:pPr lvl="0" indent="0" marL="0">
-              <a:buNone/>
-            </a:pPr>
-            <a:r>
-              <a:rPr/>
-              <a:t>노코드 도구의 종류</a:t>
-            </a:r>
-          </a:p>
-        </p:txBody>
-      </p:sp>
-      <p:sp>
-        <p:nvSpPr>
           <p:cNvPr id="3" name="Content Placeholder 2"/>
           <p:cNvSpPr>
             <a:spLocks noGrp="1"/>
@@ -3862,35 +3836,35 @@
             </a:pPr>
             <a:r>
               <a:rPr b="1"/>
-              <a:t>브론즈 ~ 골드</a:t>
+              <a:t>다이아 ~ 플래티넘</a:t>
             </a:r>
           </a:p>
           <a:p>
             <a:pPr lvl="0"/>
             <a:r>
               <a:rPr/>
-              <a:t>노션 : 정보 제공 위주의 웹 페이지 제작, 데이터베이스 활용</a:t>
+              <a:t>프레이머: 리액트 컴포넌트를 사용하는 웹페이지 빌더. 코드 사용 가능(Low-code)</a:t>
             </a:r>
           </a:p>
           <a:p>
             <a:pPr lvl="0"/>
             <a:r>
               <a:rPr/>
-              <a:t>피그마 : 벡터 디자인 및 UI 제작 도구</a:t>
+              <a:t>웹플로우: Code export를 지원하는 노코드 웹 빌더</a:t>
             </a:r>
           </a:p>
           <a:p>
             <a:pPr lvl="0"/>
             <a:r>
               <a:rPr/>
-              <a:t>구글 시트 : 스프레드시트 형식으로 데이터를 관리하며, API를 통해 DB로도 활용</a:t>
+              <a:t>에어테이블: 스프레드시트와 같은 테이블 데이터를 기록/관리.</a:t>
             </a:r>
           </a:p>
           <a:p>
             <a:pPr lvl="0"/>
             <a:r>
               <a:rPr/>
-              <a:t>소프터/글라이드/아임웹 : 초심자도 쓰기 좋은 웹 빌더</a:t>
+              <a:t>재피어: 업무 자동화와 백엔드 기능을 구현할 수 있는 노코드 도구</a:t>
             </a:r>
           </a:p>
         </p:txBody>
@@ -4169,313 +4143,6 @@
             </a:pPr>
             <a:r>
               <a:rPr b="1"/>
-              <a:t>다이아 ~ 플래티넘</a:t>
-            </a:r>
-          </a:p>
-          <a:p>
-            <a:pPr lvl="0"/>
-            <a:r>
-              <a:rPr/>
-              <a:t>프레이머: 리액트 컴포넌트를 사용하는 웹페이지 빌더. 코드 사용 가능(Low-code)</a:t>
-            </a:r>
-          </a:p>
-          <a:p>
-            <a:pPr lvl="0"/>
-            <a:r>
-              <a:rPr/>
-              <a:t>웹플로우: Code export를 지원하는 노코드 웹 빌더</a:t>
-            </a:r>
-          </a:p>
-          <a:p>
-            <a:pPr lvl="0"/>
-            <a:r>
-              <a:rPr/>
-              <a:t>에어테이블: 스프레드시트와 같은 테이블 데이터를 기록/관리.</a:t>
-            </a:r>
-          </a:p>
-          <a:p>
-            <a:pPr lvl="0"/>
-            <a:r>
-              <a:rPr/>
-              <a:t>재피어: 업무 자동화와 백엔드 기능을 구현할 수 있는 노코드 도구</a:t>
-            </a:r>
-          </a:p>
-        </p:txBody>
-      </p:sp>
-    </p:spTree>
-  </p:cSld>
-  <p:timing>
-    <p:tnLst>
-      <p:par>
-        <p:cTn id="1" dur="indefinite" restart="never" nodeType="tmRoot">
-          <p:childTnLst>
-            <p:seq concurrent="1" nextAc="seek">
-              <p:cTn id="2" dur="indefinite" nodeType="mainSeq">
-                <p:childTnLst>
-                  <p:par>
-                    <p:cTn id="3" fill="hold">
-                      <p:stCondLst>
-                        <p:cond delay="indefinite"/>
-                      </p:stCondLst>
-                      <p:childTnLst>
-                        <p:par>
-                          <p:cTn id="4" fill="hold">
-                            <p:stCondLst>
-                              <p:cond delay="0"/>
-                            </p:stCondLst>
-                            <p:childTnLst>
-                              <p:par>
-                                <p:cTn id="5" presetID="1" presetClass="entr" presetSubtype="0" fill="hold" grpId="0" nodeType="clickEffect">
-                                  <p:stCondLst>
-                                    <p:cond delay="0"/>
-                                  </p:stCondLst>
-                                  <p:childTnLst>
-                                    <p:set>
-                                      <p:cBhvr>
-                                        <p:cTn id="6" dur="1" fill="hold">
-                                          <p:stCondLst>
-                                            <p:cond delay="0"/>
-                                          </p:stCondLst>
-                                        </p:cTn>
-                                        <p:tgtEl>
-                                          <p:spTgt spid="3">
-                                            <p:txEl>
-                                              <p:pRg st="1" end="1"/>
-                                            </p:txEl>
-                                          </p:spTgt>
-                                        </p:tgtEl>
-                                        <p:attrNameLst>
-                                          <p:attrName>style.visibility</p:attrName>
-                                        </p:attrNameLst>
-                                      </p:cBhvr>
-                                      <p:to>
-                                        <p:strVal val="visible"/>
-                                      </p:to>
-                                    </p:set>
-                                  </p:childTnLst>
-                                </p:cTn>
-                              </p:par>
-                            </p:childTnLst>
-                          </p:cTn>
-                        </p:par>
-                      </p:childTnLst>
-                    </p:cTn>
-                  </p:par>
-                  <p:par>
-                    <p:cTn id="7" fill="hold">
-                      <p:stCondLst>
-                        <p:cond delay="indefinite"/>
-                      </p:stCondLst>
-                      <p:childTnLst>
-                        <p:par>
-                          <p:cTn id="8" fill="hold">
-                            <p:stCondLst>
-                              <p:cond delay="0"/>
-                            </p:stCondLst>
-                            <p:childTnLst>
-                              <p:par>
-                                <p:cTn id="9" presetID="1" presetClass="entr" presetSubtype="0" fill="hold" grpId="0" nodeType="clickEffect">
-                                  <p:stCondLst>
-                                    <p:cond delay="0"/>
-                                  </p:stCondLst>
-                                  <p:childTnLst>
-                                    <p:set>
-                                      <p:cBhvr>
-                                        <p:cTn id="10" dur="1" fill="hold">
-                                          <p:stCondLst>
-                                            <p:cond delay="0"/>
-                                          </p:stCondLst>
-                                        </p:cTn>
-                                        <p:tgtEl>
-                                          <p:spTgt spid="3">
-                                            <p:txEl>
-                                              <p:pRg st="2" end="2"/>
-                                            </p:txEl>
-                                          </p:spTgt>
-                                        </p:tgtEl>
-                                        <p:attrNameLst>
-                                          <p:attrName>style.visibility</p:attrName>
-                                        </p:attrNameLst>
-                                      </p:cBhvr>
-                                      <p:to>
-                                        <p:strVal val="visible"/>
-                                      </p:to>
-                                    </p:set>
-                                  </p:childTnLst>
-                                </p:cTn>
-                              </p:par>
-                            </p:childTnLst>
-                          </p:cTn>
-                        </p:par>
-                      </p:childTnLst>
-                    </p:cTn>
-                  </p:par>
-                  <p:par>
-                    <p:cTn id="11" fill="hold">
-                      <p:stCondLst>
-                        <p:cond delay="indefinite"/>
-                      </p:stCondLst>
-                      <p:childTnLst>
-                        <p:par>
-                          <p:cTn id="12" fill="hold">
-                            <p:stCondLst>
-                              <p:cond delay="0"/>
-                            </p:stCondLst>
-                            <p:childTnLst>
-                              <p:par>
-                                <p:cTn id="13" presetID="1" presetClass="entr" presetSubtype="0" fill="hold" grpId="0" nodeType="clickEffect">
-                                  <p:stCondLst>
-                                    <p:cond delay="0"/>
-                                  </p:stCondLst>
-                                  <p:childTnLst>
-                                    <p:set>
-                                      <p:cBhvr>
-                                        <p:cTn id="14" dur="1" fill="hold">
-                                          <p:stCondLst>
-                                            <p:cond delay="0"/>
-                                          </p:stCondLst>
-                                        </p:cTn>
-                                        <p:tgtEl>
-                                          <p:spTgt spid="3">
-                                            <p:txEl>
-                                              <p:pRg st="3" end="3"/>
-                                            </p:txEl>
-                                          </p:spTgt>
-                                        </p:tgtEl>
-                                        <p:attrNameLst>
-                                          <p:attrName>style.visibility</p:attrName>
-                                        </p:attrNameLst>
-                                      </p:cBhvr>
-                                      <p:to>
-                                        <p:strVal val="visible"/>
-                                      </p:to>
-                                    </p:set>
-                                  </p:childTnLst>
-                                </p:cTn>
-                              </p:par>
-                            </p:childTnLst>
-                          </p:cTn>
-                        </p:par>
-                      </p:childTnLst>
-                    </p:cTn>
-                  </p:par>
-                  <p:par>
-                    <p:cTn id="15" fill="hold">
-                      <p:stCondLst>
-                        <p:cond delay="indefinite"/>
-                      </p:stCondLst>
-                      <p:childTnLst>
-                        <p:par>
-                          <p:cTn id="16" fill="hold">
-                            <p:stCondLst>
-                              <p:cond delay="0"/>
-                            </p:stCondLst>
-                            <p:childTnLst>
-                              <p:par>
-                                <p:cTn id="17" presetID="1" presetClass="entr" presetSubtype="0" fill="hold" grpId="0" nodeType="clickEffect">
-                                  <p:stCondLst>
-                                    <p:cond delay="0"/>
-                                  </p:stCondLst>
-                                  <p:childTnLst>
-                                    <p:set>
-                                      <p:cBhvr>
-                                        <p:cTn id="18" dur="1" fill="hold">
-                                          <p:stCondLst>
-                                            <p:cond delay="0"/>
-                                          </p:stCondLst>
-                                        </p:cTn>
-                                        <p:tgtEl>
-                                          <p:spTgt spid="3">
-                                            <p:txEl>
-                                              <p:pRg st="4" end="4"/>
-                                            </p:txEl>
-                                          </p:spTgt>
-                                        </p:tgtEl>
-                                        <p:attrNameLst>
-                                          <p:attrName>style.visibility</p:attrName>
-                                        </p:attrNameLst>
-                                      </p:cBhvr>
-                                      <p:to>
-                                        <p:strVal val="visible"/>
-                                      </p:to>
-                                    </p:set>
-                                  </p:childTnLst>
-                                </p:cTn>
-                              </p:par>
-                            </p:childTnLst>
-                          </p:cTn>
-                        </p:par>
-                      </p:childTnLst>
-                    </p:cTn>
-                  </p:par>
-                </p:childTnLst>
-              </p:cTn>
-              <p:prevCondLst>
-                <p:cond evt="onPrev" delay="0">
-                  <p:tgtEl>
-                    <p:sldTgt/>
-                  </p:tgtEl>
-                </p:cond>
-              </p:prevCondLst>
-              <p:nextCondLst>
-                <p:cond evt="onNext" delay="0">
-                  <p:tgtEl>
-                    <p:sldTgt/>
-                  </p:tgtEl>
-                </p:cond>
-              </p:nextCondLst>
-            </p:seq>
-          </p:childTnLst>
-        </p:cTn>
-      </p:par>
-    </p:tnLst>
-    <p:bldLst>
-      <p:bldP spid="3" grpId="0" uiExpand="1" build="p"/>
-    </p:bldLst>
-  </p:timing>
-</p:sld>
-</file>
-
-<file path=ppt/slides/slide12.xml><?xml version="1.0" encoding="utf-8"?>
-<p:sld xmlns:a="http://schemas.openxmlformats.org/drawingml/2006/main" xmlns:r="http://schemas.openxmlformats.org/officeDocument/2006/relationships" xmlns:p="http://schemas.openxmlformats.org/presentationml/2006/main">
-  <p:cSld>
-    <p:spTree>
-      <p:nvGrpSpPr>
-        <p:cNvPr id="1" name=""/>
-        <p:cNvGrpSpPr/>
-        <p:nvPr/>
-      </p:nvGrpSpPr>
-      <p:grpSpPr>
-        <a:xfrm>
-          <a:off x="0" y="0"/>
-          <a:ext cx="0" cy="0"/>
-          <a:chOff x="0" y="0"/>
-          <a:chExt cx="0" cy="0"/>
-        </a:xfrm>
-      </p:grpSpPr>
-      <p:sp>
-        <p:nvSpPr>
-          <p:cNvPr id="3" name="Content Placeholder 2"/>
-          <p:cNvSpPr>
-            <a:spLocks noGrp="1"/>
-          </p:cNvSpPr>
-          <p:nvPr>
-            <p:ph idx="1"/>
-          </p:nvPr>
-        </p:nvSpPr>
-        <p:spPr/>
-        <p:txBody>
-          <a:bodyPr/>
-          <a:lstStyle/>
-          <a:p>
-            <a:pPr lvl="0" indent="0" marL="0">
-              <a:spcBef>
-                <a:spcPts val="3000"/>
-              </a:spcBef>
-              <a:buNone/>
-            </a:pPr>
-            <a:r>
-              <a:rPr b="1"/>
               <a:t>마스터</a:t>
             </a:r>
           </a:p>
@@ -4687,7 +4354,7 @@
 </p:sld>
 </file>
 
-<file path=ppt/slides/slide13.xml><?xml version="1.0" encoding="utf-8"?>
+<file path=ppt/slides/slide12.xml><?xml version="1.0" encoding="utf-8"?>
 <p:sld xmlns:a="http://schemas.openxmlformats.org/drawingml/2006/main" xmlns:r="http://schemas.openxmlformats.org/officeDocument/2006/relationships" xmlns:p="http://schemas.openxmlformats.org/presentationml/2006/main">
   <p:cSld>
     <p:spTree>
@@ -5042,7 +4709,7 @@
 </p:sld>
 </file>
 
-<file path=ppt/slides/slide14.xml><?xml version="1.0" encoding="utf-8"?>
+<file path=ppt/slides/slide13.xml><?xml version="1.0" encoding="utf-8"?>
 <p:sld xmlns:a="http://schemas.openxmlformats.org/drawingml/2006/main" xmlns:r="http://schemas.openxmlformats.org/officeDocument/2006/relationships" xmlns:p="http://schemas.openxmlformats.org/presentationml/2006/main">
   <p:cSld>
     <p:spTree>
@@ -5250,7 +4917,7 @@
 </p:sld>
 </file>
 
-<file path=ppt/slides/slide15.xml><?xml version="1.0" encoding="utf-8"?>
+<file path=ppt/slides/slide14.xml><?xml version="1.0" encoding="utf-8"?>
 <p:sld xmlns:a="http://schemas.openxmlformats.org/drawingml/2006/main" xmlns:r="http://schemas.openxmlformats.org/officeDocument/2006/relationships" xmlns:p="http://schemas.openxmlformats.org/presentationml/2006/main">
   <p:cSld>
     <p:spTree>
@@ -8246,52 +7913,115 @@
           <a:bodyPr/>
           <a:lstStyle/>
           <a:p>
+            <a:pPr lvl="0" indent="0" marL="0">
+              <a:buNone/>
+            </a:pPr>
+            <a:r>
+              <a:rPr/>
+              <a:t>:::::::::::::: ::: - 오랜 시간 성숙된 애자일 문화 - 워터폴 방식 개발 방법론의 한계를 해결하기 위한 대안 - 빠른 프로토타입과 테스트를 반복해가며 개발 - 노코드의 신속성과 직관성이 필요한 영역 - 생성형 AI의 출현 - 생성형 AI는 코드 또는 발화의 형태로 대답을 할 수 있음 - 이 대답을 노코드(GUI)로 할 때 사람과 대화하기가 훨씬 유리 ::: ::: - 코로나 이후의 변화 - 세계경제 악화 - 투자 시장의 변화 - 기존: 미래가치에 투자 - 현재: 현재수익/성과에 투자 - 검증된 아이디어에 투자 - 검증의 필요성 증가 - 개발비용 증가 - 온라인 의존도 높아짐 - 온라인 커뮤니티의 부상 - 위성 형태로 세분화되는 인터넷 - 작은 규모의 인터넷 커뮤니티를 만들기 위한 노코드 ::: ::::::::::::::</a:t>
+            </a:r>
+          </a:p>
+        </p:txBody>
+      </p:sp>
+    </p:spTree>
+  </p:cSld>
+</p:sld>
+</file>
+
+<file path=ppt/slides/slide9.xml><?xml version="1.0" encoding="utf-8"?>
+<p:sld xmlns:a="http://schemas.openxmlformats.org/drawingml/2006/main" xmlns:r="http://schemas.openxmlformats.org/officeDocument/2006/relationships" xmlns:p="http://schemas.openxmlformats.org/presentationml/2006/main">
+  <p:cSld>
+    <p:spTree>
+      <p:nvGrpSpPr>
+        <p:cNvPr id="1" name=""/>
+        <p:cNvGrpSpPr/>
+        <p:nvPr/>
+      </p:nvGrpSpPr>
+      <p:grpSpPr>
+        <a:xfrm>
+          <a:off x="0" y="0"/>
+          <a:ext cx="0" cy="0"/>
+          <a:chOff x="0" y="0"/>
+          <a:chExt cx="0" cy="0"/>
+        </a:xfrm>
+      </p:grpSpPr>
+      <p:sp>
+        <p:nvSpPr>
+          <p:cNvPr id="2" name="Title 1"/>
+          <p:cNvSpPr>
+            <a:spLocks noGrp="1"/>
+          </p:cNvSpPr>
+          <p:nvPr>
+            <p:ph type="title"/>
+          </p:nvPr>
+        </p:nvSpPr>
+        <p:spPr/>
+        <p:txBody>
+          <a:bodyPr/>
+          <a:lstStyle/>
+          <a:p>
+            <a:pPr lvl="0" indent="0" marL="0">
+              <a:buNone/>
+            </a:pPr>
+            <a:r>
+              <a:rPr/>
+              <a:t>노코드 도구의 종류</a:t>
+            </a:r>
+          </a:p>
+        </p:txBody>
+      </p:sp>
+      <p:sp>
+        <p:nvSpPr>
+          <p:cNvPr id="3" name="Content Placeholder 2"/>
+          <p:cNvSpPr>
+            <a:spLocks noGrp="1"/>
+          </p:cNvSpPr>
+          <p:nvPr>
+            <p:ph idx="1"/>
+          </p:nvPr>
+        </p:nvSpPr>
+        <p:spPr/>
+        <p:txBody>
+          <a:bodyPr/>
+          <a:lstStyle/>
+          <a:p>
+            <a:pPr lvl="0" indent="0" marL="0">
+              <a:spcBef>
+                <a:spcPts val="3000"/>
+              </a:spcBef>
+              <a:buNone/>
+            </a:pPr>
+            <a:r>
+              <a:rPr b="1"/>
+              <a:t>브론즈 ~ 골드</a:t>
+            </a:r>
+          </a:p>
+          <a:p>
             <a:pPr lvl="0"/>
             <a:r>
               <a:rPr/>
-              <a:t>오랜 시간 성숙된 애자일 문화</a:t>
-            </a:r>
-          </a:p>
-          <a:p>
-            <a:pPr lvl="1"/>
+              <a:t>노션 : 정보 제공 위주의 웹 페이지 제작, 데이터베이스 활용</a:t>
+            </a:r>
+          </a:p>
+          <a:p>
+            <a:pPr lvl="0"/>
             <a:r>
               <a:rPr/>
-              <a:t>워터폴 방식 개발 방법론의 한계를 해결하기 위한 대안</a:t>
-            </a:r>
-          </a:p>
-          <a:p>
-            <a:pPr lvl="1"/>
+              <a:t>피그마 : 벡터 디자인 및 UI 제작 도구</a:t>
+            </a:r>
+          </a:p>
+          <a:p>
+            <a:pPr lvl="0"/>
             <a:r>
               <a:rPr/>
-              <a:t>빠른 프로토타입과 테스트를 반복해가며 개발</a:t>
-            </a:r>
-          </a:p>
-          <a:p>
-            <a:pPr lvl="2"/>
+              <a:t>구글 시트 : 스프레드시트 형식으로 데이터를 관리하며, API를 통해 DB로도 활용</a:t>
+            </a:r>
+          </a:p>
+          <a:p>
+            <a:pPr lvl="0"/>
             <a:r>
               <a:rPr/>
-              <a:t>노코드의 신속성과 직관성이 필요한 영역</a:t>
-            </a:r>
-          </a:p>
-          <a:p>
-            <a:pPr lvl="0"/>
-            <a:r>
-              <a:rPr/>
-              <a:t>생성형 AI의 출현</a:t>
-            </a:r>
-          </a:p>
-          <a:p>
-            <a:pPr lvl="1"/>
-            <a:r>
-              <a:rPr/>
-              <a:t>생성형 AI는 코드 또는 발화의 형태로 대답을 할 수 있음</a:t>
-            </a:r>
-          </a:p>
-          <a:p>
-            <a:pPr lvl="1"/>
-            <a:r>
-              <a:rPr/>
-              <a:t>이 대답을 노코드(GUI)로 할 때 사람과 대화하기가 훨씬 유리</a:t>
+              <a:t>소프터/글라이드/아임웹 : 초심자도 쓰기 좋은 웹 빌더</a:t>
             </a:r>
           </a:p>
         </p:txBody>
@@ -8334,7 +8064,7 @@
                                         <p:tgtEl>
                                           <p:spTgt spid="3">
                                             <p:txEl>
-                                              <p:pRg st="0" end="0"/>
+                                              <p:pRg st="1" end="1"/>
                                             </p:txEl>
                                           </p:spTgt>
                                         </p:tgtEl>
@@ -8383,7 +8113,7 @@
                                         <p:tgtEl>
                                           <p:spTgt spid="3">
                                             <p:txEl>
-                                              <p:pRg st="1" end="1"/>
+                                              <p:pRg st="2" end="2"/>
                                             </p:txEl>
                                           </p:spTgt>
                                         </p:tgtEl>
@@ -8432,7 +8162,7 @@
                                         <p:tgtEl>
                                           <p:spTgt spid="3">
                                             <p:txEl>
-                                              <p:pRg st="2" end="2"/>
+                                              <p:pRg st="3" end="3"/>
                                             </p:txEl>
                                           </p:spTgt>
                                         </p:tgtEl>
@@ -8481,897 +8211,7 @@
                                         <p:tgtEl>
                                           <p:spTgt spid="3">
                                             <p:txEl>
-                                              <p:pRg st="3" end="3"/>
-                                            </p:txEl>
-                                          </p:spTgt>
-                                        </p:tgtEl>
-                                        <p:attrNameLst>
-                                          <p:attrName>style.visibility</p:attrName>
-                                        </p:attrNameLst>
-                                      </p:cBhvr>
-                                      <p:to>
-                                        <p:strVal val="visible"/>
-                                      </p:to>
-                                    </p:set>
-                                  </p:childTnLst>
-                                </p:cTn>
-                              </p:par>
-                            </p:childTnLst>
-                          </p:cTn>
-                        </p:par>
-                      </p:childTnLst>
-                    </p:cTn>
-                  </p:par>
-                  <p:par>
-                    <p:cTn id="19" fill="hold">
-                      <p:stCondLst>
-                        <p:cond delay="indefinite"/>
-                      </p:stCondLst>
-                      <p:childTnLst>
-                        <p:par>
-                          <p:cTn id="20" fill="hold">
-                            <p:stCondLst>
-                              <p:cond delay="0"/>
-                            </p:stCondLst>
-                            <p:childTnLst>
-                              <p:par>
-                                <p:cTn id="21" presetID="1" presetClass="entr" presetSubtype="0" fill="hold" grpId="0" nodeType="clickEffect">
-                                  <p:stCondLst>
-                                    <p:cond delay="0"/>
-                                  </p:stCondLst>
-                                  <p:childTnLst>
-                                    <p:set>
-                                      <p:cBhvr>
-                                        <p:cTn id="22" dur="1" fill="hold">
-                                          <p:stCondLst>
-                                            <p:cond delay="0"/>
-                                          </p:stCondLst>
-                                        </p:cTn>
-                                        <p:tgtEl>
-                                          <p:spTgt spid="3">
-                                            <p:txEl>
                                               <p:pRg st="4" end="4"/>
-                                            </p:txEl>
-                                          </p:spTgt>
-                                        </p:tgtEl>
-                                        <p:attrNameLst>
-                                          <p:attrName>style.visibility</p:attrName>
-                                        </p:attrNameLst>
-                                      </p:cBhvr>
-                                      <p:to>
-                                        <p:strVal val="visible"/>
-                                      </p:to>
-                                    </p:set>
-                                  </p:childTnLst>
-                                </p:cTn>
-                              </p:par>
-                            </p:childTnLst>
-                          </p:cTn>
-                        </p:par>
-                      </p:childTnLst>
-                    </p:cTn>
-                  </p:par>
-                  <p:par>
-                    <p:cTn id="23" fill="hold">
-                      <p:stCondLst>
-                        <p:cond delay="indefinite"/>
-                      </p:stCondLst>
-                      <p:childTnLst>
-                        <p:par>
-                          <p:cTn id="24" fill="hold">
-                            <p:stCondLst>
-                              <p:cond delay="0"/>
-                            </p:stCondLst>
-                            <p:childTnLst>
-                              <p:par>
-                                <p:cTn id="25" presetID="1" presetClass="entr" presetSubtype="0" fill="hold" grpId="0" nodeType="clickEffect">
-                                  <p:stCondLst>
-                                    <p:cond delay="0"/>
-                                  </p:stCondLst>
-                                  <p:childTnLst>
-                                    <p:set>
-                                      <p:cBhvr>
-                                        <p:cTn id="26" dur="1" fill="hold">
-                                          <p:stCondLst>
-                                            <p:cond delay="0"/>
-                                          </p:stCondLst>
-                                        </p:cTn>
-                                        <p:tgtEl>
-                                          <p:spTgt spid="3">
-                                            <p:txEl>
-                                              <p:pRg st="5" end="5"/>
-                                            </p:txEl>
-                                          </p:spTgt>
-                                        </p:tgtEl>
-                                        <p:attrNameLst>
-                                          <p:attrName>style.visibility</p:attrName>
-                                        </p:attrNameLst>
-                                      </p:cBhvr>
-                                      <p:to>
-                                        <p:strVal val="visible"/>
-                                      </p:to>
-                                    </p:set>
-                                  </p:childTnLst>
-                                </p:cTn>
-                              </p:par>
-                            </p:childTnLst>
-                          </p:cTn>
-                        </p:par>
-                      </p:childTnLst>
-                    </p:cTn>
-                  </p:par>
-                  <p:par>
-                    <p:cTn id="27" fill="hold">
-                      <p:stCondLst>
-                        <p:cond delay="indefinite"/>
-                      </p:stCondLst>
-                      <p:childTnLst>
-                        <p:par>
-                          <p:cTn id="28" fill="hold">
-                            <p:stCondLst>
-                              <p:cond delay="0"/>
-                            </p:stCondLst>
-                            <p:childTnLst>
-                              <p:par>
-                                <p:cTn id="29" presetID="1" presetClass="entr" presetSubtype="0" fill="hold" grpId="0" nodeType="clickEffect">
-                                  <p:stCondLst>
-                                    <p:cond delay="0"/>
-                                  </p:stCondLst>
-                                  <p:childTnLst>
-                                    <p:set>
-                                      <p:cBhvr>
-                                        <p:cTn id="30" dur="1" fill="hold">
-                                          <p:stCondLst>
-                                            <p:cond delay="0"/>
-                                          </p:stCondLst>
-                                        </p:cTn>
-                                        <p:tgtEl>
-                                          <p:spTgt spid="3">
-                                            <p:txEl>
-                                              <p:pRg st="6" end="6"/>
-                                            </p:txEl>
-                                          </p:spTgt>
-                                        </p:tgtEl>
-                                        <p:attrNameLst>
-                                          <p:attrName>style.visibility</p:attrName>
-                                        </p:attrNameLst>
-                                      </p:cBhvr>
-                                      <p:to>
-                                        <p:strVal val="visible"/>
-                                      </p:to>
-                                    </p:set>
-                                  </p:childTnLst>
-                                </p:cTn>
-                              </p:par>
-                            </p:childTnLst>
-                          </p:cTn>
-                        </p:par>
-                      </p:childTnLst>
-                    </p:cTn>
-                  </p:par>
-                </p:childTnLst>
-              </p:cTn>
-              <p:prevCondLst>
-                <p:cond evt="onPrev" delay="0">
-                  <p:tgtEl>
-                    <p:sldTgt/>
-                  </p:tgtEl>
-                </p:cond>
-              </p:prevCondLst>
-              <p:nextCondLst>
-                <p:cond evt="onNext" delay="0">
-                  <p:tgtEl>
-                    <p:sldTgt/>
-                  </p:tgtEl>
-                </p:cond>
-              </p:nextCondLst>
-            </p:seq>
-          </p:childTnLst>
-        </p:cTn>
-      </p:par>
-    </p:tnLst>
-    <p:bldLst>
-      <p:bldP spid="3" grpId="0" uiExpand="1" build="p"/>
-    </p:bldLst>
-  </p:timing>
-</p:sld>
-</file>
-
-<file path=ppt/slides/slide9.xml><?xml version="1.0" encoding="utf-8"?>
-<p:sld xmlns:a="http://schemas.openxmlformats.org/drawingml/2006/main" xmlns:r="http://schemas.openxmlformats.org/officeDocument/2006/relationships" xmlns:p="http://schemas.openxmlformats.org/presentationml/2006/main">
-  <p:cSld>
-    <p:spTree>
-      <p:nvGrpSpPr>
-        <p:cNvPr id="1" name=""/>
-        <p:cNvGrpSpPr/>
-        <p:nvPr/>
-      </p:nvGrpSpPr>
-      <p:grpSpPr>
-        <a:xfrm>
-          <a:off x="0" y="0"/>
-          <a:ext cx="0" cy="0"/>
-          <a:chOff x="0" y="0"/>
-          <a:chExt cx="0" cy="0"/>
-        </a:xfrm>
-      </p:grpSpPr>
-      <p:sp>
-        <p:nvSpPr>
-          <p:cNvPr id="3" name="Content Placeholder 2"/>
-          <p:cNvSpPr>
-            <a:spLocks noGrp="1"/>
-          </p:cNvSpPr>
-          <p:nvPr>
-            <p:ph idx="1"/>
-          </p:nvPr>
-        </p:nvSpPr>
-        <p:spPr/>
-        <p:txBody>
-          <a:bodyPr/>
-          <a:lstStyle/>
-          <a:p>
-            <a:pPr lvl="0"/>
-            <a:r>
-              <a:rPr/>
-              <a:t>코로나 이후의 변화</a:t>
-            </a:r>
-          </a:p>
-          <a:p>
-            <a:pPr lvl="1"/>
-            <a:r>
-              <a:rPr/>
-              <a:t>세계경제 악화</a:t>
-            </a:r>
-          </a:p>
-          <a:p>
-            <a:pPr lvl="1"/>
-            <a:r>
-              <a:rPr/>
-              <a:t>투자 시장의 변화</a:t>
-            </a:r>
-          </a:p>
-          <a:p>
-            <a:pPr lvl="2"/>
-            <a:r>
-              <a:rPr/>
-              <a:t>기존: 미래가치에 투자</a:t>
-            </a:r>
-          </a:p>
-          <a:p>
-            <a:pPr lvl="2"/>
-            <a:r>
-              <a:rPr/>
-              <a:t>현재: 현재수익/성과에 투자</a:t>
-            </a:r>
-          </a:p>
-          <a:p>
-            <a:pPr lvl="3"/>
-            <a:r>
-              <a:rPr/>
-              <a:t>검증된 아이디어에 투자</a:t>
-            </a:r>
-          </a:p>
-          <a:p>
-            <a:pPr lvl="4"/>
-            <a:r>
-              <a:rPr/>
-              <a:t>검증의 필요성 증가</a:t>
-            </a:r>
-          </a:p>
-          <a:p>
-            <a:pPr lvl="1"/>
-            <a:r>
-              <a:rPr/>
-              <a:t>개발비용 증가</a:t>
-            </a:r>
-          </a:p>
-          <a:p>
-            <a:pPr lvl="1"/>
-            <a:r>
-              <a:rPr/>
-              <a:t>온라인 의존도 높아짐</a:t>
-            </a:r>
-          </a:p>
-          <a:p>
-            <a:pPr lvl="2"/>
-            <a:r>
-              <a:rPr/>
-              <a:t>온라인 커뮤니티의 부상</a:t>
-            </a:r>
-          </a:p>
-          <a:p>
-            <a:pPr lvl="2"/>
-            <a:r>
-              <a:rPr/>
-              <a:t>위성 형태로 세분화되는 인터넷</a:t>
-            </a:r>
-          </a:p>
-          <a:p>
-            <a:pPr lvl="3"/>
-            <a:r>
-              <a:rPr/>
-              <a:t>작은 규모의 인터넷 커뮤니티를 만들기 위한 노코드</a:t>
-            </a:r>
-          </a:p>
-        </p:txBody>
-      </p:sp>
-    </p:spTree>
-  </p:cSld>
-  <p:timing>
-    <p:tnLst>
-      <p:par>
-        <p:cTn id="1" dur="indefinite" restart="never" nodeType="tmRoot">
-          <p:childTnLst>
-            <p:seq concurrent="1" nextAc="seek">
-              <p:cTn id="2" dur="indefinite" nodeType="mainSeq">
-                <p:childTnLst>
-                  <p:par>
-                    <p:cTn id="3" fill="hold">
-                      <p:stCondLst>
-                        <p:cond delay="indefinite"/>
-                      </p:stCondLst>
-                      <p:childTnLst>
-                        <p:par>
-                          <p:cTn id="4" fill="hold">
-                            <p:stCondLst>
-                              <p:cond delay="0"/>
-                            </p:stCondLst>
-                            <p:childTnLst>
-                              <p:par>
-                                <p:cTn id="5" presetID="1" presetClass="entr" presetSubtype="0" fill="hold" grpId="0" nodeType="clickEffect">
-                                  <p:stCondLst>
-                                    <p:cond delay="0"/>
-                                  </p:stCondLst>
-                                  <p:childTnLst>
-                                    <p:set>
-                                      <p:cBhvr>
-                                        <p:cTn id="6" dur="1" fill="hold">
-                                          <p:stCondLst>
-                                            <p:cond delay="0"/>
-                                          </p:stCondLst>
-                                        </p:cTn>
-                                        <p:tgtEl>
-                                          <p:spTgt spid="3">
-                                            <p:txEl>
-                                              <p:pRg st="0" end="0"/>
-                                            </p:txEl>
-                                          </p:spTgt>
-                                        </p:tgtEl>
-                                        <p:attrNameLst>
-                                          <p:attrName>style.visibility</p:attrName>
-                                        </p:attrNameLst>
-                                      </p:cBhvr>
-                                      <p:to>
-                                        <p:strVal val="visible"/>
-                                      </p:to>
-                                    </p:set>
-                                  </p:childTnLst>
-                                </p:cTn>
-                              </p:par>
-                            </p:childTnLst>
-                          </p:cTn>
-                        </p:par>
-                      </p:childTnLst>
-                    </p:cTn>
-                  </p:par>
-                  <p:par>
-                    <p:cTn id="7" fill="hold">
-                      <p:stCondLst>
-                        <p:cond delay="indefinite"/>
-                      </p:stCondLst>
-                      <p:childTnLst>
-                        <p:par>
-                          <p:cTn id="8" fill="hold">
-                            <p:stCondLst>
-                              <p:cond delay="0"/>
-                            </p:stCondLst>
-                            <p:childTnLst>
-                              <p:par>
-                                <p:cTn id="9" presetID="1" presetClass="entr" presetSubtype="0" fill="hold" grpId="0" nodeType="clickEffect">
-                                  <p:stCondLst>
-                                    <p:cond delay="0"/>
-                                  </p:stCondLst>
-                                  <p:childTnLst>
-                                    <p:set>
-                                      <p:cBhvr>
-                                        <p:cTn id="10" dur="1" fill="hold">
-                                          <p:stCondLst>
-                                            <p:cond delay="0"/>
-                                          </p:stCondLst>
-                                        </p:cTn>
-                                        <p:tgtEl>
-                                          <p:spTgt spid="3">
-                                            <p:txEl>
-                                              <p:pRg st="1" end="1"/>
-                                            </p:txEl>
-                                          </p:spTgt>
-                                        </p:tgtEl>
-                                        <p:attrNameLst>
-                                          <p:attrName>style.visibility</p:attrName>
-                                        </p:attrNameLst>
-                                      </p:cBhvr>
-                                      <p:to>
-                                        <p:strVal val="visible"/>
-                                      </p:to>
-                                    </p:set>
-                                  </p:childTnLst>
-                                </p:cTn>
-                              </p:par>
-                            </p:childTnLst>
-                          </p:cTn>
-                        </p:par>
-                      </p:childTnLst>
-                    </p:cTn>
-                  </p:par>
-                  <p:par>
-                    <p:cTn id="11" fill="hold">
-                      <p:stCondLst>
-                        <p:cond delay="indefinite"/>
-                      </p:stCondLst>
-                      <p:childTnLst>
-                        <p:par>
-                          <p:cTn id="12" fill="hold">
-                            <p:stCondLst>
-                              <p:cond delay="0"/>
-                            </p:stCondLst>
-                            <p:childTnLst>
-                              <p:par>
-                                <p:cTn id="13" presetID="1" presetClass="entr" presetSubtype="0" fill="hold" grpId="0" nodeType="clickEffect">
-                                  <p:stCondLst>
-                                    <p:cond delay="0"/>
-                                  </p:stCondLst>
-                                  <p:childTnLst>
-                                    <p:set>
-                                      <p:cBhvr>
-                                        <p:cTn id="14" dur="1" fill="hold">
-                                          <p:stCondLst>
-                                            <p:cond delay="0"/>
-                                          </p:stCondLst>
-                                        </p:cTn>
-                                        <p:tgtEl>
-                                          <p:spTgt spid="3">
-                                            <p:txEl>
-                                              <p:pRg st="2" end="2"/>
-                                            </p:txEl>
-                                          </p:spTgt>
-                                        </p:tgtEl>
-                                        <p:attrNameLst>
-                                          <p:attrName>style.visibility</p:attrName>
-                                        </p:attrNameLst>
-                                      </p:cBhvr>
-                                      <p:to>
-                                        <p:strVal val="visible"/>
-                                      </p:to>
-                                    </p:set>
-                                  </p:childTnLst>
-                                </p:cTn>
-                              </p:par>
-                            </p:childTnLst>
-                          </p:cTn>
-                        </p:par>
-                      </p:childTnLst>
-                    </p:cTn>
-                  </p:par>
-                  <p:par>
-                    <p:cTn id="15" fill="hold">
-                      <p:stCondLst>
-                        <p:cond delay="indefinite"/>
-                      </p:stCondLst>
-                      <p:childTnLst>
-                        <p:par>
-                          <p:cTn id="16" fill="hold">
-                            <p:stCondLst>
-                              <p:cond delay="0"/>
-                            </p:stCondLst>
-                            <p:childTnLst>
-                              <p:par>
-                                <p:cTn id="17" presetID="1" presetClass="entr" presetSubtype="0" fill="hold" grpId="0" nodeType="clickEffect">
-                                  <p:stCondLst>
-                                    <p:cond delay="0"/>
-                                  </p:stCondLst>
-                                  <p:childTnLst>
-                                    <p:set>
-                                      <p:cBhvr>
-                                        <p:cTn id="18" dur="1" fill="hold">
-                                          <p:stCondLst>
-                                            <p:cond delay="0"/>
-                                          </p:stCondLst>
-                                        </p:cTn>
-                                        <p:tgtEl>
-                                          <p:spTgt spid="3">
-                                            <p:txEl>
-                                              <p:pRg st="3" end="3"/>
-                                            </p:txEl>
-                                          </p:spTgt>
-                                        </p:tgtEl>
-                                        <p:attrNameLst>
-                                          <p:attrName>style.visibility</p:attrName>
-                                        </p:attrNameLst>
-                                      </p:cBhvr>
-                                      <p:to>
-                                        <p:strVal val="visible"/>
-                                      </p:to>
-                                    </p:set>
-                                  </p:childTnLst>
-                                </p:cTn>
-                              </p:par>
-                            </p:childTnLst>
-                          </p:cTn>
-                        </p:par>
-                      </p:childTnLst>
-                    </p:cTn>
-                  </p:par>
-                  <p:par>
-                    <p:cTn id="19" fill="hold">
-                      <p:stCondLst>
-                        <p:cond delay="indefinite"/>
-                      </p:stCondLst>
-                      <p:childTnLst>
-                        <p:par>
-                          <p:cTn id="20" fill="hold">
-                            <p:stCondLst>
-                              <p:cond delay="0"/>
-                            </p:stCondLst>
-                            <p:childTnLst>
-                              <p:par>
-                                <p:cTn id="21" presetID="1" presetClass="entr" presetSubtype="0" fill="hold" grpId="0" nodeType="clickEffect">
-                                  <p:stCondLst>
-                                    <p:cond delay="0"/>
-                                  </p:stCondLst>
-                                  <p:childTnLst>
-                                    <p:set>
-                                      <p:cBhvr>
-                                        <p:cTn id="22" dur="1" fill="hold">
-                                          <p:stCondLst>
-                                            <p:cond delay="0"/>
-                                          </p:stCondLst>
-                                        </p:cTn>
-                                        <p:tgtEl>
-                                          <p:spTgt spid="3">
-                                            <p:txEl>
-                                              <p:pRg st="4" end="4"/>
-                                            </p:txEl>
-                                          </p:spTgt>
-                                        </p:tgtEl>
-                                        <p:attrNameLst>
-                                          <p:attrName>style.visibility</p:attrName>
-                                        </p:attrNameLst>
-                                      </p:cBhvr>
-                                      <p:to>
-                                        <p:strVal val="visible"/>
-                                      </p:to>
-                                    </p:set>
-                                  </p:childTnLst>
-                                </p:cTn>
-                              </p:par>
-                            </p:childTnLst>
-                          </p:cTn>
-                        </p:par>
-                      </p:childTnLst>
-                    </p:cTn>
-                  </p:par>
-                  <p:par>
-                    <p:cTn id="23" fill="hold">
-                      <p:stCondLst>
-                        <p:cond delay="indefinite"/>
-                      </p:stCondLst>
-                      <p:childTnLst>
-                        <p:par>
-                          <p:cTn id="24" fill="hold">
-                            <p:stCondLst>
-                              <p:cond delay="0"/>
-                            </p:stCondLst>
-                            <p:childTnLst>
-                              <p:par>
-                                <p:cTn id="25" presetID="1" presetClass="entr" presetSubtype="0" fill="hold" grpId="0" nodeType="clickEffect">
-                                  <p:stCondLst>
-                                    <p:cond delay="0"/>
-                                  </p:stCondLst>
-                                  <p:childTnLst>
-                                    <p:set>
-                                      <p:cBhvr>
-                                        <p:cTn id="26" dur="1" fill="hold">
-                                          <p:stCondLst>
-                                            <p:cond delay="0"/>
-                                          </p:stCondLst>
-                                        </p:cTn>
-                                        <p:tgtEl>
-                                          <p:spTgt spid="3">
-                                            <p:txEl>
-                                              <p:pRg st="5" end="5"/>
-                                            </p:txEl>
-                                          </p:spTgt>
-                                        </p:tgtEl>
-                                        <p:attrNameLst>
-                                          <p:attrName>style.visibility</p:attrName>
-                                        </p:attrNameLst>
-                                      </p:cBhvr>
-                                      <p:to>
-                                        <p:strVal val="visible"/>
-                                      </p:to>
-                                    </p:set>
-                                  </p:childTnLst>
-                                </p:cTn>
-                              </p:par>
-                            </p:childTnLst>
-                          </p:cTn>
-                        </p:par>
-                      </p:childTnLst>
-                    </p:cTn>
-                  </p:par>
-                  <p:par>
-                    <p:cTn id="27" fill="hold">
-                      <p:stCondLst>
-                        <p:cond delay="indefinite"/>
-                      </p:stCondLst>
-                      <p:childTnLst>
-                        <p:par>
-                          <p:cTn id="28" fill="hold">
-                            <p:stCondLst>
-                              <p:cond delay="0"/>
-                            </p:stCondLst>
-                            <p:childTnLst>
-                              <p:par>
-                                <p:cTn id="29" presetID="1" presetClass="entr" presetSubtype="0" fill="hold" grpId="0" nodeType="clickEffect">
-                                  <p:stCondLst>
-                                    <p:cond delay="0"/>
-                                  </p:stCondLst>
-                                  <p:childTnLst>
-                                    <p:set>
-                                      <p:cBhvr>
-                                        <p:cTn id="30" dur="1" fill="hold">
-                                          <p:stCondLst>
-                                            <p:cond delay="0"/>
-                                          </p:stCondLst>
-                                        </p:cTn>
-                                        <p:tgtEl>
-                                          <p:spTgt spid="3">
-                                            <p:txEl>
-                                              <p:pRg st="6" end="6"/>
-                                            </p:txEl>
-                                          </p:spTgt>
-                                        </p:tgtEl>
-                                        <p:attrNameLst>
-                                          <p:attrName>style.visibility</p:attrName>
-                                        </p:attrNameLst>
-                                      </p:cBhvr>
-                                      <p:to>
-                                        <p:strVal val="visible"/>
-                                      </p:to>
-                                    </p:set>
-                                  </p:childTnLst>
-                                </p:cTn>
-                              </p:par>
-                            </p:childTnLst>
-                          </p:cTn>
-                        </p:par>
-                      </p:childTnLst>
-                    </p:cTn>
-                  </p:par>
-                  <p:par>
-                    <p:cTn id="31" fill="hold">
-                      <p:stCondLst>
-                        <p:cond delay="indefinite"/>
-                      </p:stCondLst>
-                      <p:childTnLst>
-                        <p:par>
-                          <p:cTn id="32" fill="hold">
-                            <p:stCondLst>
-                              <p:cond delay="0"/>
-                            </p:stCondLst>
-                            <p:childTnLst>
-                              <p:par>
-                                <p:cTn id="33" presetID="1" presetClass="entr" presetSubtype="0" fill="hold" grpId="0" nodeType="clickEffect">
-                                  <p:stCondLst>
-                                    <p:cond delay="0"/>
-                                  </p:stCondLst>
-                                  <p:childTnLst>
-                                    <p:set>
-                                      <p:cBhvr>
-                                        <p:cTn id="34" dur="1" fill="hold">
-                                          <p:stCondLst>
-                                            <p:cond delay="0"/>
-                                          </p:stCondLst>
-                                        </p:cTn>
-                                        <p:tgtEl>
-                                          <p:spTgt spid="3">
-                                            <p:txEl>
-                                              <p:pRg st="7" end="7"/>
-                                            </p:txEl>
-                                          </p:spTgt>
-                                        </p:tgtEl>
-                                        <p:attrNameLst>
-                                          <p:attrName>style.visibility</p:attrName>
-                                        </p:attrNameLst>
-                                      </p:cBhvr>
-                                      <p:to>
-                                        <p:strVal val="visible"/>
-                                      </p:to>
-                                    </p:set>
-                                  </p:childTnLst>
-                                </p:cTn>
-                              </p:par>
-                            </p:childTnLst>
-                          </p:cTn>
-                        </p:par>
-                      </p:childTnLst>
-                    </p:cTn>
-                  </p:par>
-                  <p:par>
-                    <p:cTn id="35" fill="hold">
-                      <p:stCondLst>
-                        <p:cond delay="indefinite"/>
-                      </p:stCondLst>
-                      <p:childTnLst>
-                        <p:par>
-                          <p:cTn id="36" fill="hold">
-                            <p:stCondLst>
-                              <p:cond delay="0"/>
-                            </p:stCondLst>
-                            <p:childTnLst>
-                              <p:par>
-                                <p:cTn id="37" presetID="1" presetClass="entr" presetSubtype="0" fill="hold" grpId="0" nodeType="clickEffect">
-                                  <p:stCondLst>
-                                    <p:cond delay="0"/>
-                                  </p:stCondLst>
-                                  <p:childTnLst>
-                                    <p:set>
-                                      <p:cBhvr>
-                                        <p:cTn id="38" dur="1" fill="hold">
-                                          <p:stCondLst>
-                                            <p:cond delay="0"/>
-                                          </p:stCondLst>
-                                        </p:cTn>
-                                        <p:tgtEl>
-                                          <p:spTgt spid="3">
-                                            <p:txEl>
-                                              <p:pRg st="8" end="8"/>
-                                            </p:txEl>
-                                          </p:spTgt>
-                                        </p:tgtEl>
-                                        <p:attrNameLst>
-                                          <p:attrName>style.visibility</p:attrName>
-                                        </p:attrNameLst>
-                                      </p:cBhvr>
-                                      <p:to>
-                                        <p:strVal val="visible"/>
-                                      </p:to>
-                                    </p:set>
-                                  </p:childTnLst>
-                                </p:cTn>
-                              </p:par>
-                            </p:childTnLst>
-                          </p:cTn>
-                        </p:par>
-                      </p:childTnLst>
-                    </p:cTn>
-                  </p:par>
-                  <p:par>
-                    <p:cTn id="39" fill="hold">
-                      <p:stCondLst>
-                        <p:cond delay="indefinite"/>
-                      </p:stCondLst>
-                      <p:childTnLst>
-                        <p:par>
-                          <p:cTn id="40" fill="hold">
-                            <p:stCondLst>
-                              <p:cond delay="0"/>
-                            </p:stCondLst>
-                            <p:childTnLst>
-                              <p:par>
-                                <p:cTn id="41" presetID="1" presetClass="entr" presetSubtype="0" fill="hold" grpId="0" nodeType="clickEffect">
-                                  <p:stCondLst>
-                                    <p:cond delay="0"/>
-                                  </p:stCondLst>
-                                  <p:childTnLst>
-                                    <p:set>
-                                      <p:cBhvr>
-                                        <p:cTn id="42" dur="1" fill="hold">
-                                          <p:stCondLst>
-                                            <p:cond delay="0"/>
-                                          </p:stCondLst>
-                                        </p:cTn>
-                                        <p:tgtEl>
-                                          <p:spTgt spid="3">
-                                            <p:txEl>
-                                              <p:pRg st="9" end="9"/>
-                                            </p:txEl>
-                                          </p:spTgt>
-                                        </p:tgtEl>
-                                        <p:attrNameLst>
-                                          <p:attrName>style.visibility</p:attrName>
-                                        </p:attrNameLst>
-                                      </p:cBhvr>
-                                      <p:to>
-                                        <p:strVal val="visible"/>
-                                      </p:to>
-                                    </p:set>
-                                  </p:childTnLst>
-                                </p:cTn>
-                              </p:par>
-                            </p:childTnLst>
-                          </p:cTn>
-                        </p:par>
-                      </p:childTnLst>
-                    </p:cTn>
-                  </p:par>
-                  <p:par>
-                    <p:cTn id="43" fill="hold">
-                      <p:stCondLst>
-                        <p:cond delay="indefinite"/>
-                      </p:stCondLst>
-                      <p:childTnLst>
-                        <p:par>
-                          <p:cTn id="44" fill="hold">
-                            <p:stCondLst>
-                              <p:cond delay="0"/>
-                            </p:stCondLst>
-                            <p:childTnLst>
-                              <p:par>
-                                <p:cTn id="45" presetID="1" presetClass="entr" presetSubtype="0" fill="hold" grpId="0" nodeType="clickEffect">
-                                  <p:stCondLst>
-                                    <p:cond delay="0"/>
-                                  </p:stCondLst>
-                                  <p:childTnLst>
-                                    <p:set>
-                                      <p:cBhvr>
-                                        <p:cTn id="46" dur="1" fill="hold">
-                                          <p:stCondLst>
-                                            <p:cond delay="0"/>
-                                          </p:stCondLst>
-                                        </p:cTn>
-                                        <p:tgtEl>
-                                          <p:spTgt spid="3">
-                                            <p:txEl>
-                                              <p:pRg st="10" end="10"/>
-                                            </p:txEl>
-                                          </p:spTgt>
-                                        </p:tgtEl>
-                                        <p:attrNameLst>
-                                          <p:attrName>style.visibility</p:attrName>
-                                        </p:attrNameLst>
-                                      </p:cBhvr>
-                                      <p:to>
-                                        <p:strVal val="visible"/>
-                                      </p:to>
-                                    </p:set>
-                                  </p:childTnLst>
-                                </p:cTn>
-                              </p:par>
-                            </p:childTnLst>
-                          </p:cTn>
-                        </p:par>
-                      </p:childTnLst>
-                    </p:cTn>
-                  </p:par>
-                  <p:par>
-                    <p:cTn id="47" fill="hold">
-                      <p:stCondLst>
-                        <p:cond delay="indefinite"/>
-                      </p:stCondLst>
-                      <p:childTnLst>
-                        <p:par>
-                          <p:cTn id="48" fill="hold">
-                            <p:stCondLst>
-                              <p:cond delay="0"/>
-                            </p:stCondLst>
-                            <p:childTnLst>
-                              <p:par>
-                                <p:cTn id="49" presetID="1" presetClass="entr" presetSubtype="0" fill="hold" grpId="0" nodeType="clickEffect">
-                                  <p:stCondLst>
-                                    <p:cond delay="0"/>
-                                  </p:stCondLst>
-                                  <p:childTnLst>
-                                    <p:set>
-                                      <p:cBhvr>
-                                        <p:cTn id="50" dur="1" fill="hold">
-                                          <p:stCondLst>
-                                            <p:cond delay="0"/>
-                                          </p:stCondLst>
-                                        </p:cTn>
-                                        <p:tgtEl>
-                                          <p:spTgt spid="3">
-                                            <p:txEl>
-                                              <p:pRg st="11" end="11"/>
                                             </p:txEl>
                                           </p:spTgt>
                                         </p:tgtEl>

</xml_diff>

<commit_message>
백업 완료: 2023-11-25 02:36:51
Affected files:
.obsidian/workspace.json
노코드 엔지니어링/노코드 개론.md
노코드 엔지니어링/노코드 개론.pptx
</commit_message>
<xml_diff>
--- a/노코드 엔지니어링/노코드 개론.pptx
+++ b/노코드 엔지니어링/노코드 개론.pptx
@@ -19,6 +19,8 @@
     <p:sldId id="267" r:id="rId13"/>
     <p:sldId id="268" r:id="rId14"/>
     <p:sldId id="269" r:id="rId15"/>
+    <p:sldId id="270" r:id="rId16"/>
+    <p:sldId id="271" r:id="rId17"/>
   </p:sldIdLst>
   <p:sldSz cx="12192000" cy="6858000"/>
   <p:notesSz cx="6858000" cy="9144000"/>
@@ -3740,13 +3742,13 @@
             <a:spLocks noGrp="1"/>
           </p:cNvSpPr>
           <p:nvPr>
-            <p:ph type="ctrTitle"/>
+            <p:ph type="title"/>
           </p:nvPr>
         </p:nvSpPr>
         <p:spPr>
           <a:xfrm>
-            <a:off x="2417779" y="802298"/>
-            <a:ext cx="8637073" cy="2541431"/>
+            <a:off x="1454239" y="1756130"/>
+            <a:ext cx="8643154" cy="1887950"/>
           </a:xfrm>
         </p:spPr>
         <p:txBody>
@@ -3760,34 +3762,6 @@
               <a:rPr/>
               <a:t>노코드 개론</a:t>
             </a:r>
-          </a:p>
-        </p:txBody>
-      </p:sp>
-      <p:sp>
-        <p:nvSpPr>
-          <p:cNvPr id="3" name="Subtitle 2"/>
-          <p:cNvSpPr>
-            <a:spLocks noGrp="1"/>
-          </p:cNvSpPr>
-          <p:nvPr>
-            <p:ph idx="1" type="subTitle"/>
-          </p:nvPr>
-        </p:nvSpPr>
-        <p:spPr>
-          <a:xfrm>
-            <a:off x="2417780" y="3531204"/>
-            <a:ext cx="8637072" cy="977621"/>
-          </a:xfrm>
-        </p:spPr>
-        <p:txBody>
-          <a:bodyPr/>
-          <a:lstStyle/>
-          <a:p>
-            <a:pPr lvl="0" indent="0" marL="0">
-              <a:buNone/>
-            </a:pPr>
-            <a:br/>
-            <a:br/>
           </a:p>
         </p:txBody>
       </p:sp>
@@ -3828,43 +3802,45 @@
           <a:bodyPr/>
           <a:lstStyle/>
           <a:p>
-            <a:pPr lvl="0" indent="0" marL="0">
-              <a:spcBef>
-                <a:spcPts val="3000"/>
-              </a:spcBef>
-              <a:buNone/>
-            </a:pPr>
-            <a:r>
-              <a:rPr b="1"/>
-              <a:t>다이아 ~ 플래티넘</a:t>
-            </a:r>
-          </a:p>
-          <a:p>
             <a:pPr lvl="0"/>
             <a:r>
               <a:rPr/>
-              <a:t>프레이머: 리액트 컴포넌트를 사용하는 웹페이지 빌더. 코드 사용 가능(Low-code)</a:t>
-            </a:r>
-          </a:p>
-          <a:p>
-            <a:pPr lvl="0"/>
+              <a:t>코로나 이후의 변화</a:t>
+            </a:r>
+          </a:p>
+          <a:p>
+            <a:pPr lvl="1"/>
             <a:r>
               <a:rPr/>
-              <a:t>웹플로우: Code export를 지원하는 노코드 웹 빌더</a:t>
-            </a:r>
-          </a:p>
-          <a:p>
-            <a:pPr lvl="0"/>
+              <a:t>개발비용 증가</a:t>
+            </a:r>
+          </a:p>
+          <a:p>
+            <a:pPr lvl="1"/>
             <a:r>
               <a:rPr/>
-              <a:t>에어테이블: 스프레드시트와 같은 테이블 데이터를 기록/관리.</a:t>
-            </a:r>
-          </a:p>
-          <a:p>
-            <a:pPr lvl="0"/>
+              <a:t>온라인 의존도 높아짐</a:t>
+            </a:r>
+          </a:p>
+          <a:p>
+            <a:pPr lvl="2"/>
             <a:r>
               <a:rPr/>
-              <a:t>재피어: 업무 자동화와 백엔드 기능을 구현할 수 있는 노코드 도구</a:t>
+              <a:t>온라인 커뮤니티의 부상</a:t>
+            </a:r>
+          </a:p>
+          <a:p>
+            <a:pPr lvl="2"/>
+            <a:r>
+              <a:rPr/>
+              <a:t>위성 형태로 세분화되는 인터넷</a:t>
+            </a:r>
+          </a:p>
+          <a:p>
+            <a:pPr lvl="3"/>
+            <a:r>
+              <a:rPr/>
+              <a:t>작은 규모의 인터넷 커뮤니티를 만들기 위한 노코드</a:t>
             </a:r>
           </a:p>
         </p:txBody>
@@ -3907,7 +3883,7 @@
                                         <p:tgtEl>
                                           <p:spTgt spid="3">
                                             <p:txEl>
-                                              <p:pRg st="1" end="1"/>
+                                              <p:pRg st="0" end="0"/>
                                             </p:txEl>
                                           </p:spTgt>
                                         </p:tgtEl>
@@ -3956,7 +3932,7 @@
                                         <p:tgtEl>
                                           <p:spTgt spid="3">
                                             <p:txEl>
-                                              <p:pRg st="2" end="2"/>
+                                              <p:pRg st="1" end="1"/>
                                             </p:txEl>
                                           </p:spTgt>
                                         </p:tgtEl>
@@ -4005,7 +3981,7 @@
                                         <p:tgtEl>
                                           <p:spTgt spid="3">
                                             <p:txEl>
-                                              <p:pRg st="3" end="3"/>
+                                              <p:pRg st="2" end="2"/>
                                             </p:txEl>
                                           </p:spTgt>
                                         </p:tgtEl>
@@ -4054,7 +4030,105 @@
                                         <p:tgtEl>
                                           <p:spTgt spid="3">
                                             <p:txEl>
+                                              <p:pRg st="3" end="3"/>
+                                            </p:txEl>
+                                          </p:spTgt>
+                                        </p:tgtEl>
+                                        <p:attrNameLst>
+                                          <p:attrName>style.visibility</p:attrName>
+                                        </p:attrNameLst>
+                                      </p:cBhvr>
+                                      <p:to>
+                                        <p:strVal val="visible"/>
+                                      </p:to>
+                                    </p:set>
+                                  </p:childTnLst>
+                                </p:cTn>
+                              </p:par>
+                            </p:childTnLst>
+                          </p:cTn>
+                        </p:par>
+                      </p:childTnLst>
+                    </p:cTn>
+                  </p:par>
+                  <p:par>
+                    <p:cTn id="19" fill="hold">
+                      <p:stCondLst>
+                        <p:cond delay="indefinite"/>
+                      </p:stCondLst>
+                      <p:childTnLst>
+                        <p:par>
+                          <p:cTn id="20" fill="hold">
+                            <p:stCondLst>
+                              <p:cond delay="0"/>
+                            </p:stCondLst>
+                            <p:childTnLst>
+                              <p:par>
+                                <p:cTn id="21" presetID="1" presetClass="entr" presetSubtype="0" fill="hold" grpId="0" nodeType="clickEffect">
+                                  <p:stCondLst>
+                                    <p:cond delay="0"/>
+                                  </p:stCondLst>
+                                  <p:childTnLst>
+                                    <p:set>
+                                      <p:cBhvr>
+                                        <p:cTn id="22" dur="1" fill="hold">
+                                          <p:stCondLst>
+                                            <p:cond delay="0"/>
+                                          </p:stCondLst>
+                                        </p:cTn>
+                                        <p:tgtEl>
+                                          <p:spTgt spid="3">
+                                            <p:txEl>
                                               <p:pRg st="4" end="4"/>
+                                            </p:txEl>
+                                          </p:spTgt>
+                                        </p:tgtEl>
+                                        <p:attrNameLst>
+                                          <p:attrName>style.visibility</p:attrName>
+                                        </p:attrNameLst>
+                                      </p:cBhvr>
+                                      <p:to>
+                                        <p:strVal val="visible"/>
+                                      </p:to>
+                                    </p:set>
+                                  </p:childTnLst>
+                                </p:cTn>
+                              </p:par>
+                            </p:childTnLst>
+                          </p:cTn>
+                        </p:par>
+                      </p:childTnLst>
+                    </p:cTn>
+                  </p:par>
+                  <p:par>
+                    <p:cTn id="23" fill="hold">
+                      <p:stCondLst>
+                        <p:cond delay="indefinite"/>
+                      </p:stCondLst>
+                      <p:childTnLst>
+                        <p:par>
+                          <p:cTn id="24" fill="hold">
+                            <p:stCondLst>
+                              <p:cond delay="0"/>
+                            </p:stCondLst>
+                            <p:childTnLst>
+                              <p:par>
+                                <p:cTn id="25" presetID="1" presetClass="entr" presetSubtype="0" fill="hold" grpId="0" nodeType="clickEffect">
+                                  <p:stCondLst>
+                                    <p:cond delay="0"/>
+                                  </p:stCondLst>
+                                  <p:childTnLst>
+                                    <p:set>
+                                      <p:cBhvr>
+                                        <p:cTn id="26" dur="1" fill="hold">
+                                          <p:stCondLst>
+                                            <p:cond delay="0"/>
+                                          </p:stCondLst>
+                                        </p:cTn>
+                                        <p:tgtEl>
+                                          <p:spTgt spid="3">
+                                            <p:txEl>
+                                              <p:pRg st="5" end="5"/>
                                             </p:txEl>
                                           </p:spTgt>
                                         </p:tgtEl>
@@ -4122,6 +4196,31 @@
       </p:grpSpPr>
       <p:sp>
         <p:nvSpPr>
+          <p:cNvPr id="2" name="Title 1"/>
+          <p:cNvSpPr>
+            <a:spLocks noGrp="1"/>
+          </p:cNvSpPr>
+          <p:nvPr>
+            <p:ph type="title"/>
+          </p:nvPr>
+        </p:nvSpPr>
+        <p:spPr/>
+        <p:txBody>
+          <a:bodyPr/>
+          <a:lstStyle/>
+          <a:p>
+            <a:pPr lvl="0" indent="0" marL="0">
+              <a:buNone/>
+            </a:pPr>
+            <a:r>
+              <a:rPr/>
+              <a:t>노코드 도구의 종류</a:t>
+            </a:r>
+          </a:p>
+        </p:txBody>
+      </p:sp>
+      <p:sp>
+        <p:nvSpPr>
           <p:cNvPr id="3" name="Content Placeholder 2"/>
           <p:cNvSpPr>
             <a:spLocks noGrp="1"/>
@@ -4135,36 +4234,38 @@
           <a:bodyPr/>
           <a:lstStyle/>
           <a:p>
-            <a:pPr lvl="0" indent="0" marL="0">
-              <a:spcBef>
-                <a:spcPts val="3000"/>
-              </a:spcBef>
-              <a:buNone/>
-            </a:pPr>
-            <a:r>
-              <a:rPr b="1"/>
-              <a:t>마스터</a:t>
-            </a:r>
-          </a:p>
-          <a:p>
             <a:pPr lvl="0"/>
             <a:r>
               <a:rPr/>
-              <a:t>버블: 프론트엔드/백엔드/DB를 모두 가진 전천후 웹 애플리케이션 빌더</a:t>
-            </a:r>
-          </a:p>
-          <a:p>
-            <a:pPr lvl="0"/>
+              <a:t>브론즈 ~ 골드</a:t>
+            </a:r>
+          </a:p>
+          <a:p>
+            <a:pPr lvl="1"/>
             <a:r>
               <a:rPr/>
-              <a:t>플러터 플로우: 플러터(Flutter) 기반의 노코드 도구. 코드 사용가능(Low-code)</a:t>
-            </a:r>
-          </a:p>
-          <a:p>
-            <a:pPr lvl="0"/>
+              <a:t>노션 : 정보 제공 위주의 웹 페이지 제작, 데이터베이스 활용</a:t>
+            </a:r>
+          </a:p>
+          <a:p>
+            <a:pPr lvl="1"/>
             <a:r>
               <a:rPr/>
-              <a:t>싱크트리: 블록코딩형 백엔드 노코드 도구</a:t>
+              <a:t>피그마 : 벡터 디자인 및 UI 제작 도구</a:t>
+            </a:r>
+          </a:p>
+          <a:p>
+            <a:pPr lvl="1"/>
+            <a:r>
+              <a:rPr/>
+              <a:t>구글 시트 : 스프레드시트 형식으로 데이터를 관리하며, API를 통해 DB로도 활용</a:t>
+            </a:r>
+          </a:p>
+          <a:p>
+            <a:pPr lvl="1"/>
+            <a:r>
+              <a:rPr/>
+              <a:t>소프터/글라이드/아임웹 : 초심자도 쓰기 좋은 웹 빌더</a:t>
             </a:r>
           </a:p>
         </p:txBody>
@@ -4207,7 +4308,7 @@
                                         <p:tgtEl>
                                           <p:spTgt spid="3">
                                             <p:txEl>
-                                              <p:pRg st="1" end="1"/>
+                                              <p:pRg st="0" end="0"/>
                                             </p:txEl>
                                           </p:spTgt>
                                         </p:tgtEl>
@@ -4256,7 +4357,7 @@
                                         <p:tgtEl>
                                           <p:spTgt spid="3">
                                             <p:txEl>
-                                              <p:pRg st="2" end="2"/>
+                                              <p:pRg st="1" end="1"/>
                                             </p:txEl>
                                           </p:spTgt>
                                         </p:tgtEl>
@@ -4298,6 +4399,750 @@
                                     <p:set>
                                       <p:cBhvr>
                                         <p:cTn id="14" dur="1" fill="hold">
+                                          <p:stCondLst>
+                                            <p:cond delay="0"/>
+                                          </p:stCondLst>
+                                        </p:cTn>
+                                        <p:tgtEl>
+                                          <p:spTgt spid="3">
+                                            <p:txEl>
+                                              <p:pRg st="2" end="2"/>
+                                            </p:txEl>
+                                          </p:spTgt>
+                                        </p:tgtEl>
+                                        <p:attrNameLst>
+                                          <p:attrName>style.visibility</p:attrName>
+                                        </p:attrNameLst>
+                                      </p:cBhvr>
+                                      <p:to>
+                                        <p:strVal val="visible"/>
+                                      </p:to>
+                                    </p:set>
+                                  </p:childTnLst>
+                                </p:cTn>
+                              </p:par>
+                            </p:childTnLst>
+                          </p:cTn>
+                        </p:par>
+                      </p:childTnLst>
+                    </p:cTn>
+                  </p:par>
+                  <p:par>
+                    <p:cTn id="15" fill="hold">
+                      <p:stCondLst>
+                        <p:cond delay="indefinite"/>
+                      </p:stCondLst>
+                      <p:childTnLst>
+                        <p:par>
+                          <p:cTn id="16" fill="hold">
+                            <p:stCondLst>
+                              <p:cond delay="0"/>
+                            </p:stCondLst>
+                            <p:childTnLst>
+                              <p:par>
+                                <p:cTn id="17" presetID="1" presetClass="entr" presetSubtype="0" fill="hold" grpId="0" nodeType="clickEffect">
+                                  <p:stCondLst>
+                                    <p:cond delay="0"/>
+                                  </p:stCondLst>
+                                  <p:childTnLst>
+                                    <p:set>
+                                      <p:cBhvr>
+                                        <p:cTn id="18" dur="1" fill="hold">
+                                          <p:stCondLst>
+                                            <p:cond delay="0"/>
+                                          </p:stCondLst>
+                                        </p:cTn>
+                                        <p:tgtEl>
+                                          <p:spTgt spid="3">
+                                            <p:txEl>
+                                              <p:pRg st="3" end="3"/>
+                                            </p:txEl>
+                                          </p:spTgt>
+                                        </p:tgtEl>
+                                        <p:attrNameLst>
+                                          <p:attrName>style.visibility</p:attrName>
+                                        </p:attrNameLst>
+                                      </p:cBhvr>
+                                      <p:to>
+                                        <p:strVal val="visible"/>
+                                      </p:to>
+                                    </p:set>
+                                  </p:childTnLst>
+                                </p:cTn>
+                              </p:par>
+                            </p:childTnLst>
+                          </p:cTn>
+                        </p:par>
+                      </p:childTnLst>
+                    </p:cTn>
+                  </p:par>
+                  <p:par>
+                    <p:cTn id="19" fill="hold">
+                      <p:stCondLst>
+                        <p:cond delay="indefinite"/>
+                      </p:stCondLst>
+                      <p:childTnLst>
+                        <p:par>
+                          <p:cTn id="20" fill="hold">
+                            <p:stCondLst>
+                              <p:cond delay="0"/>
+                            </p:stCondLst>
+                            <p:childTnLst>
+                              <p:par>
+                                <p:cTn id="21" presetID="1" presetClass="entr" presetSubtype="0" fill="hold" grpId="0" nodeType="clickEffect">
+                                  <p:stCondLst>
+                                    <p:cond delay="0"/>
+                                  </p:stCondLst>
+                                  <p:childTnLst>
+                                    <p:set>
+                                      <p:cBhvr>
+                                        <p:cTn id="22" dur="1" fill="hold">
+                                          <p:stCondLst>
+                                            <p:cond delay="0"/>
+                                          </p:stCondLst>
+                                        </p:cTn>
+                                        <p:tgtEl>
+                                          <p:spTgt spid="3">
+                                            <p:txEl>
+                                              <p:pRg st="4" end="4"/>
+                                            </p:txEl>
+                                          </p:spTgt>
+                                        </p:tgtEl>
+                                        <p:attrNameLst>
+                                          <p:attrName>style.visibility</p:attrName>
+                                        </p:attrNameLst>
+                                      </p:cBhvr>
+                                      <p:to>
+                                        <p:strVal val="visible"/>
+                                      </p:to>
+                                    </p:set>
+                                  </p:childTnLst>
+                                </p:cTn>
+                              </p:par>
+                            </p:childTnLst>
+                          </p:cTn>
+                        </p:par>
+                      </p:childTnLst>
+                    </p:cTn>
+                  </p:par>
+                </p:childTnLst>
+              </p:cTn>
+              <p:prevCondLst>
+                <p:cond evt="onPrev" delay="0">
+                  <p:tgtEl>
+                    <p:sldTgt/>
+                  </p:tgtEl>
+                </p:cond>
+              </p:prevCondLst>
+              <p:nextCondLst>
+                <p:cond evt="onNext" delay="0">
+                  <p:tgtEl>
+                    <p:sldTgt/>
+                  </p:tgtEl>
+                </p:cond>
+              </p:nextCondLst>
+            </p:seq>
+          </p:childTnLst>
+        </p:cTn>
+      </p:par>
+    </p:tnLst>
+    <p:bldLst>
+      <p:bldP spid="3" grpId="0" uiExpand="1" build="p"/>
+    </p:bldLst>
+  </p:timing>
+</p:sld>
+</file>
+
+<file path=ppt/slides/slide12.xml><?xml version="1.0" encoding="utf-8"?>
+<p:sld xmlns:a="http://schemas.openxmlformats.org/drawingml/2006/main" xmlns:r="http://schemas.openxmlformats.org/officeDocument/2006/relationships" xmlns:p="http://schemas.openxmlformats.org/presentationml/2006/main">
+  <p:cSld>
+    <p:spTree>
+      <p:nvGrpSpPr>
+        <p:cNvPr id="1" name=""/>
+        <p:cNvGrpSpPr/>
+        <p:nvPr/>
+      </p:nvGrpSpPr>
+      <p:grpSpPr>
+        <a:xfrm>
+          <a:off x="0" y="0"/>
+          <a:ext cx="0" cy="0"/>
+          <a:chOff x="0" y="0"/>
+          <a:chExt cx="0" cy="0"/>
+        </a:xfrm>
+      </p:grpSpPr>
+      <p:sp>
+        <p:nvSpPr>
+          <p:cNvPr id="3" name="Content Placeholder 2"/>
+          <p:cNvSpPr>
+            <a:spLocks noGrp="1"/>
+          </p:cNvSpPr>
+          <p:nvPr>
+            <p:ph idx="1"/>
+          </p:nvPr>
+        </p:nvSpPr>
+        <p:spPr/>
+        <p:txBody>
+          <a:bodyPr/>
+          <a:lstStyle/>
+          <a:p>
+            <a:pPr lvl="0"/>
+            <a:r>
+              <a:rPr/>
+              <a:t>다이아 ~ 플래티넘</a:t>
+            </a:r>
+          </a:p>
+          <a:p>
+            <a:pPr lvl="1"/>
+            <a:r>
+              <a:rPr/>
+              <a:t>프레이머: 리액트 컴포넌트를 사용하는 웹페이지 빌더. 코드 사용 가능(Low-code)</a:t>
+            </a:r>
+          </a:p>
+          <a:p>
+            <a:pPr lvl="1"/>
+            <a:r>
+              <a:rPr/>
+              <a:t>웹플로우: Code export를 지원하는 노코드 웹 빌더</a:t>
+            </a:r>
+          </a:p>
+          <a:p>
+            <a:pPr lvl="1"/>
+            <a:r>
+              <a:rPr/>
+              <a:t>에어테이블: 스프레드시트와 같은 테이블 데이터를 기록/관리.</a:t>
+            </a:r>
+          </a:p>
+          <a:p>
+            <a:pPr lvl="1"/>
+            <a:r>
+              <a:rPr/>
+              <a:t>재피어: 업무 자동화와 백엔드 기능을 구현할 수 있는 노코드 도구</a:t>
+            </a:r>
+          </a:p>
+        </p:txBody>
+      </p:sp>
+    </p:spTree>
+  </p:cSld>
+  <p:timing>
+    <p:tnLst>
+      <p:par>
+        <p:cTn id="1" dur="indefinite" restart="never" nodeType="tmRoot">
+          <p:childTnLst>
+            <p:seq concurrent="1" nextAc="seek">
+              <p:cTn id="2" dur="indefinite" nodeType="mainSeq">
+                <p:childTnLst>
+                  <p:par>
+                    <p:cTn id="3" fill="hold">
+                      <p:stCondLst>
+                        <p:cond delay="indefinite"/>
+                      </p:stCondLst>
+                      <p:childTnLst>
+                        <p:par>
+                          <p:cTn id="4" fill="hold">
+                            <p:stCondLst>
+                              <p:cond delay="0"/>
+                            </p:stCondLst>
+                            <p:childTnLst>
+                              <p:par>
+                                <p:cTn id="5" presetID="1" presetClass="entr" presetSubtype="0" fill="hold" grpId="0" nodeType="clickEffect">
+                                  <p:stCondLst>
+                                    <p:cond delay="0"/>
+                                  </p:stCondLst>
+                                  <p:childTnLst>
+                                    <p:set>
+                                      <p:cBhvr>
+                                        <p:cTn id="6" dur="1" fill="hold">
+                                          <p:stCondLst>
+                                            <p:cond delay="0"/>
+                                          </p:stCondLst>
+                                        </p:cTn>
+                                        <p:tgtEl>
+                                          <p:spTgt spid="3">
+                                            <p:txEl>
+                                              <p:pRg st="0" end="0"/>
+                                            </p:txEl>
+                                          </p:spTgt>
+                                        </p:tgtEl>
+                                        <p:attrNameLst>
+                                          <p:attrName>style.visibility</p:attrName>
+                                        </p:attrNameLst>
+                                      </p:cBhvr>
+                                      <p:to>
+                                        <p:strVal val="visible"/>
+                                      </p:to>
+                                    </p:set>
+                                  </p:childTnLst>
+                                </p:cTn>
+                              </p:par>
+                            </p:childTnLst>
+                          </p:cTn>
+                        </p:par>
+                      </p:childTnLst>
+                    </p:cTn>
+                  </p:par>
+                  <p:par>
+                    <p:cTn id="7" fill="hold">
+                      <p:stCondLst>
+                        <p:cond delay="indefinite"/>
+                      </p:stCondLst>
+                      <p:childTnLst>
+                        <p:par>
+                          <p:cTn id="8" fill="hold">
+                            <p:stCondLst>
+                              <p:cond delay="0"/>
+                            </p:stCondLst>
+                            <p:childTnLst>
+                              <p:par>
+                                <p:cTn id="9" presetID="1" presetClass="entr" presetSubtype="0" fill="hold" grpId="0" nodeType="clickEffect">
+                                  <p:stCondLst>
+                                    <p:cond delay="0"/>
+                                  </p:stCondLst>
+                                  <p:childTnLst>
+                                    <p:set>
+                                      <p:cBhvr>
+                                        <p:cTn id="10" dur="1" fill="hold">
+                                          <p:stCondLst>
+                                            <p:cond delay="0"/>
+                                          </p:stCondLst>
+                                        </p:cTn>
+                                        <p:tgtEl>
+                                          <p:spTgt spid="3">
+                                            <p:txEl>
+                                              <p:pRg st="1" end="1"/>
+                                            </p:txEl>
+                                          </p:spTgt>
+                                        </p:tgtEl>
+                                        <p:attrNameLst>
+                                          <p:attrName>style.visibility</p:attrName>
+                                        </p:attrNameLst>
+                                      </p:cBhvr>
+                                      <p:to>
+                                        <p:strVal val="visible"/>
+                                      </p:to>
+                                    </p:set>
+                                  </p:childTnLst>
+                                </p:cTn>
+                              </p:par>
+                            </p:childTnLst>
+                          </p:cTn>
+                        </p:par>
+                      </p:childTnLst>
+                    </p:cTn>
+                  </p:par>
+                  <p:par>
+                    <p:cTn id="11" fill="hold">
+                      <p:stCondLst>
+                        <p:cond delay="indefinite"/>
+                      </p:stCondLst>
+                      <p:childTnLst>
+                        <p:par>
+                          <p:cTn id="12" fill="hold">
+                            <p:stCondLst>
+                              <p:cond delay="0"/>
+                            </p:stCondLst>
+                            <p:childTnLst>
+                              <p:par>
+                                <p:cTn id="13" presetID="1" presetClass="entr" presetSubtype="0" fill="hold" grpId="0" nodeType="clickEffect">
+                                  <p:stCondLst>
+                                    <p:cond delay="0"/>
+                                  </p:stCondLst>
+                                  <p:childTnLst>
+                                    <p:set>
+                                      <p:cBhvr>
+                                        <p:cTn id="14" dur="1" fill="hold">
+                                          <p:stCondLst>
+                                            <p:cond delay="0"/>
+                                          </p:stCondLst>
+                                        </p:cTn>
+                                        <p:tgtEl>
+                                          <p:spTgt spid="3">
+                                            <p:txEl>
+                                              <p:pRg st="2" end="2"/>
+                                            </p:txEl>
+                                          </p:spTgt>
+                                        </p:tgtEl>
+                                        <p:attrNameLst>
+                                          <p:attrName>style.visibility</p:attrName>
+                                        </p:attrNameLst>
+                                      </p:cBhvr>
+                                      <p:to>
+                                        <p:strVal val="visible"/>
+                                      </p:to>
+                                    </p:set>
+                                  </p:childTnLst>
+                                </p:cTn>
+                              </p:par>
+                            </p:childTnLst>
+                          </p:cTn>
+                        </p:par>
+                      </p:childTnLst>
+                    </p:cTn>
+                  </p:par>
+                  <p:par>
+                    <p:cTn id="15" fill="hold">
+                      <p:stCondLst>
+                        <p:cond delay="indefinite"/>
+                      </p:stCondLst>
+                      <p:childTnLst>
+                        <p:par>
+                          <p:cTn id="16" fill="hold">
+                            <p:stCondLst>
+                              <p:cond delay="0"/>
+                            </p:stCondLst>
+                            <p:childTnLst>
+                              <p:par>
+                                <p:cTn id="17" presetID="1" presetClass="entr" presetSubtype="0" fill="hold" grpId="0" nodeType="clickEffect">
+                                  <p:stCondLst>
+                                    <p:cond delay="0"/>
+                                  </p:stCondLst>
+                                  <p:childTnLst>
+                                    <p:set>
+                                      <p:cBhvr>
+                                        <p:cTn id="18" dur="1" fill="hold">
+                                          <p:stCondLst>
+                                            <p:cond delay="0"/>
+                                          </p:stCondLst>
+                                        </p:cTn>
+                                        <p:tgtEl>
+                                          <p:spTgt spid="3">
+                                            <p:txEl>
+                                              <p:pRg st="3" end="3"/>
+                                            </p:txEl>
+                                          </p:spTgt>
+                                        </p:tgtEl>
+                                        <p:attrNameLst>
+                                          <p:attrName>style.visibility</p:attrName>
+                                        </p:attrNameLst>
+                                      </p:cBhvr>
+                                      <p:to>
+                                        <p:strVal val="visible"/>
+                                      </p:to>
+                                    </p:set>
+                                  </p:childTnLst>
+                                </p:cTn>
+                              </p:par>
+                            </p:childTnLst>
+                          </p:cTn>
+                        </p:par>
+                      </p:childTnLst>
+                    </p:cTn>
+                  </p:par>
+                  <p:par>
+                    <p:cTn id="19" fill="hold">
+                      <p:stCondLst>
+                        <p:cond delay="indefinite"/>
+                      </p:stCondLst>
+                      <p:childTnLst>
+                        <p:par>
+                          <p:cTn id="20" fill="hold">
+                            <p:stCondLst>
+                              <p:cond delay="0"/>
+                            </p:stCondLst>
+                            <p:childTnLst>
+                              <p:par>
+                                <p:cTn id="21" presetID="1" presetClass="entr" presetSubtype="0" fill="hold" grpId="0" nodeType="clickEffect">
+                                  <p:stCondLst>
+                                    <p:cond delay="0"/>
+                                  </p:stCondLst>
+                                  <p:childTnLst>
+                                    <p:set>
+                                      <p:cBhvr>
+                                        <p:cTn id="22" dur="1" fill="hold">
+                                          <p:stCondLst>
+                                            <p:cond delay="0"/>
+                                          </p:stCondLst>
+                                        </p:cTn>
+                                        <p:tgtEl>
+                                          <p:spTgt spid="3">
+                                            <p:txEl>
+                                              <p:pRg st="4" end="4"/>
+                                            </p:txEl>
+                                          </p:spTgt>
+                                        </p:tgtEl>
+                                        <p:attrNameLst>
+                                          <p:attrName>style.visibility</p:attrName>
+                                        </p:attrNameLst>
+                                      </p:cBhvr>
+                                      <p:to>
+                                        <p:strVal val="visible"/>
+                                      </p:to>
+                                    </p:set>
+                                  </p:childTnLst>
+                                </p:cTn>
+                              </p:par>
+                            </p:childTnLst>
+                          </p:cTn>
+                        </p:par>
+                      </p:childTnLst>
+                    </p:cTn>
+                  </p:par>
+                </p:childTnLst>
+              </p:cTn>
+              <p:prevCondLst>
+                <p:cond evt="onPrev" delay="0">
+                  <p:tgtEl>
+                    <p:sldTgt/>
+                  </p:tgtEl>
+                </p:cond>
+              </p:prevCondLst>
+              <p:nextCondLst>
+                <p:cond evt="onNext" delay="0">
+                  <p:tgtEl>
+                    <p:sldTgt/>
+                  </p:tgtEl>
+                </p:cond>
+              </p:nextCondLst>
+            </p:seq>
+          </p:childTnLst>
+        </p:cTn>
+      </p:par>
+    </p:tnLst>
+    <p:bldLst>
+      <p:bldP spid="3" grpId="0" uiExpand="1" build="p"/>
+    </p:bldLst>
+  </p:timing>
+</p:sld>
+</file>
+
+<file path=ppt/slides/slide13.xml><?xml version="1.0" encoding="utf-8"?>
+<p:sld xmlns:a="http://schemas.openxmlformats.org/drawingml/2006/main" xmlns:r="http://schemas.openxmlformats.org/officeDocument/2006/relationships" xmlns:p="http://schemas.openxmlformats.org/presentationml/2006/main">
+  <p:cSld>
+    <p:spTree>
+      <p:nvGrpSpPr>
+        <p:cNvPr id="1" name=""/>
+        <p:cNvGrpSpPr/>
+        <p:nvPr/>
+      </p:nvGrpSpPr>
+      <p:grpSpPr>
+        <a:xfrm>
+          <a:off x="0" y="0"/>
+          <a:ext cx="0" cy="0"/>
+          <a:chOff x="0" y="0"/>
+          <a:chExt cx="0" cy="0"/>
+        </a:xfrm>
+      </p:grpSpPr>
+      <p:sp>
+        <p:nvSpPr>
+          <p:cNvPr id="3" name="Content Placeholder 2"/>
+          <p:cNvSpPr>
+            <a:spLocks noGrp="1"/>
+          </p:cNvSpPr>
+          <p:nvPr>
+            <p:ph idx="1"/>
+          </p:nvPr>
+        </p:nvSpPr>
+        <p:spPr/>
+        <p:txBody>
+          <a:bodyPr/>
+          <a:lstStyle/>
+          <a:p>
+            <a:pPr lvl="0"/>
+            <a:r>
+              <a:rPr/>
+              <a:t>마스터</a:t>
+            </a:r>
+          </a:p>
+          <a:p>
+            <a:pPr lvl="1"/>
+            <a:r>
+              <a:rPr/>
+              <a:t>버블: 프론트엔드/백엔드/DB를 모두 가진 전천후 웹 애플리케이션 빌더</a:t>
+            </a:r>
+          </a:p>
+          <a:p>
+            <a:pPr lvl="1"/>
+            <a:r>
+              <a:rPr/>
+              <a:t>플러터 플로우: 플러터(Flutter) 기반의 노코드 도구. 코드 사용가능(Low-code)</a:t>
+            </a:r>
+          </a:p>
+          <a:p>
+            <a:pPr lvl="1"/>
+            <a:r>
+              <a:rPr/>
+              <a:t>싱크트리: 블록코딩형 백엔드 노코드 도구</a:t>
+            </a:r>
+          </a:p>
+        </p:txBody>
+      </p:sp>
+    </p:spTree>
+  </p:cSld>
+  <p:timing>
+    <p:tnLst>
+      <p:par>
+        <p:cTn id="1" dur="indefinite" restart="never" nodeType="tmRoot">
+          <p:childTnLst>
+            <p:seq concurrent="1" nextAc="seek">
+              <p:cTn id="2" dur="indefinite" nodeType="mainSeq">
+                <p:childTnLst>
+                  <p:par>
+                    <p:cTn id="3" fill="hold">
+                      <p:stCondLst>
+                        <p:cond delay="indefinite"/>
+                      </p:stCondLst>
+                      <p:childTnLst>
+                        <p:par>
+                          <p:cTn id="4" fill="hold">
+                            <p:stCondLst>
+                              <p:cond delay="0"/>
+                            </p:stCondLst>
+                            <p:childTnLst>
+                              <p:par>
+                                <p:cTn id="5" presetID="1" presetClass="entr" presetSubtype="0" fill="hold" grpId="0" nodeType="clickEffect">
+                                  <p:stCondLst>
+                                    <p:cond delay="0"/>
+                                  </p:stCondLst>
+                                  <p:childTnLst>
+                                    <p:set>
+                                      <p:cBhvr>
+                                        <p:cTn id="6" dur="1" fill="hold">
+                                          <p:stCondLst>
+                                            <p:cond delay="0"/>
+                                          </p:stCondLst>
+                                        </p:cTn>
+                                        <p:tgtEl>
+                                          <p:spTgt spid="3">
+                                            <p:txEl>
+                                              <p:pRg st="0" end="0"/>
+                                            </p:txEl>
+                                          </p:spTgt>
+                                        </p:tgtEl>
+                                        <p:attrNameLst>
+                                          <p:attrName>style.visibility</p:attrName>
+                                        </p:attrNameLst>
+                                      </p:cBhvr>
+                                      <p:to>
+                                        <p:strVal val="visible"/>
+                                      </p:to>
+                                    </p:set>
+                                  </p:childTnLst>
+                                </p:cTn>
+                              </p:par>
+                            </p:childTnLst>
+                          </p:cTn>
+                        </p:par>
+                      </p:childTnLst>
+                    </p:cTn>
+                  </p:par>
+                  <p:par>
+                    <p:cTn id="7" fill="hold">
+                      <p:stCondLst>
+                        <p:cond delay="indefinite"/>
+                      </p:stCondLst>
+                      <p:childTnLst>
+                        <p:par>
+                          <p:cTn id="8" fill="hold">
+                            <p:stCondLst>
+                              <p:cond delay="0"/>
+                            </p:stCondLst>
+                            <p:childTnLst>
+                              <p:par>
+                                <p:cTn id="9" presetID="1" presetClass="entr" presetSubtype="0" fill="hold" grpId="0" nodeType="clickEffect">
+                                  <p:stCondLst>
+                                    <p:cond delay="0"/>
+                                  </p:stCondLst>
+                                  <p:childTnLst>
+                                    <p:set>
+                                      <p:cBhvr>
+                                        <p:cTn id="10" dur="1" fill="hold">
+                                          <p:stCondLst>
+                                            <p:cond delay="0"/>
+                                          </p:stCondLst>
+                                        </p:cTn>
+                                        <p:tgtEl>
+                                          <p:spTgt spid="3">
+                                            <p:txEl>
+                                              <p:pRg st="1" end="1"/>
+                                            </p:txEl>
+                                          </p:spTgt>
+                                        </p:tgtEl>
+                                        <p:attrNameLst>
+                                          <p:attrName>style.visibility</p:attrName>
+                                        </p:attrNameLst>
+                                      </p:cBhvr>
+                                      <p:to>
+                                        <p:strVal val="visible"/>
+                                      </p:to>
+                                    </p:set>
+                                  </p:childTnLst>
+                                </p:cTn>
+                              </p:par>
+                            </p:childTnLst>
+                          </p:cTn>
+                        </p:par>
+                      </p:childTnLst>
+                    </p:cTn>
+                  </p:par>
+                  <p:par>
+                    <p:cTn id="11" fill="hold">
+                      <p:stCondLst>
+                        <p:cond delay="indefinite"/>
+                      </p:stCondLst>
+                      <p:childTnLst>
+                        <p:par>
+                          <p:cTn id="12" fill="hold">
+                            <p:stCondLst>
+                              <p:cond delay="0"/>
+                            </p:stCondLst>
+                            <p:childTnLst>
+                              <p:par>
+                                <p:cTn id="13" presetID="1" presetClass="entr" presetSubtype="0" fill="hold" grpId="0" nodeType="clickEffect">
+                                  <p:stCondLst>
+                                    <p:cond delay="0"/>
+                                  </p:stCondLst>
+                                  <p:childTnLst>
+                                    <p:set>
+                                      <p:cBhvr>
+                                        <p:cTn id="14" dur="1" fill="hold">
+                                          <p:stCondLst>
+                                            <p:cond delay="0"/>
+                                          </p:stCondLst>
+                                        </p:cTn>
+                                        <p:tgtEl>
+                                          <p:spTgt spid="3">
+                                            <p:txEl>
+                                              <p:pRg st="2" end="2"/>
+                                            </p:txEl>
+                                          </p:spTgt>
+                                        </p:tgtEl>
+                                        <p:attrNameLst>
+                                          <p:attrName>style.visibility</p:attrName>
+                                        </p:attrNameLst>
+                                      </p:cBhvr>
+                                      <p:to>
+                                        <p:strVal val="visible"/>
+                                      </p:to>
+                                    </p:set>
+                                  </p:childTnLst>
+                                </p:cTn>
+                              </p:par>
+                            </p:childTnLst>
+                          </p:cTn>
+                        </p:par>
+                      </p:childTnLst>
+                    </p:cTn>
+                  </p:par>
+                  <p:par>
+                    <p:cTn id="15" fill="hold">
+                      <p:stCondLst>
+                        <p:cond delay="indefinite"/>
+                      </p:stCondLst>
+                      <p:childTnLst>
+                        <p:par>
+                          <p:cTn id="16" fill="hold">
+                            <p:stCondLst>
+                              <p:cond delay="0"/>
+                            </p:stCondLst>
+                            <p:childTnLst>
+                              <p:par>
+                                <p:cTn id="17" presetID="1" presetClass="entr" presetSubtype="0" fill="hold" grpId="0" nodeType="clickEffect">
+                                  <p:stCondLst>
+                                    <p:cond delay="0"/>
+                                  </p:stCondLst>
+                                  <p:childTnLst>
+                                    <p:set>
+                                      <p:cBhvr>
+                                        <p:cTn id="18" dur="1" fill="hold">
                                           <p:stCondLst>
                                             <p:cond delay="0"/>
                                           </p:stCondLst>
@@ -4354,7 +5199,7 @@
 </p:sld>
 </file>
 
-<file path=ppt/slides/slide12.xml><?xml version="1.0" encoding="utf-8"?>
+<file path=ppt/slides/slide14.xml><?xml version="1.0" encoding="utf-8"?>
 <p:sld xmlns:a="http://schemas.openxmlformats.org/drawingml/2006/main" xmlns:r="http://schemas.openxmlformats.org/officeDocument/2006/relationships" xmlns:p="http://schemas.openxmlformats.org/presentationml/2006/main">
   <p:cSld>
     <p:spTree>
@@ -4709,7 +5554,7 @@
 </p:sld>
 </file>
 
-<file path=ppt/slides/slide13.xml><?xml version="1.0" encoding="utf-8"?>
+<file path=ppt/slides/slide15.xml><?xml version="1.0" encoding="utf-8"?>
 <p:sld xmlns:a="http://schemas.openxmlformats.org/drawingml/2006/main" xmlns:r="http://schemas.openxmlformats.org/officeDocument/2006/relationships" xmlns:p="http://schemas.openxmlformats.org/presentationml/2006/main">
   <p:cSld>
     <p:spTree>
@@ -4917,7 +5762,7 @@
 </p:sld>
 </file>
 
-<file path=ppt/slides/slide14.xml><?xml version="1.0" encoding="utf-8"?>
+<file path=ppt/slides/slide16.xml><?xml version="1.0" encoding="utf-8"?>
 <p:sld xmlns:a="http://schemas.openxmlformats.org/drawingml/2006/main" xmlns:r="http://schemas.openxmlformats.org/officeDocument/2006/relationships" xmlns:p="http://schemas.openxmlformats.org/presentationml/2006/main">
   <p:cSld>
     <p:spTree>
@@ -4949,26 +5794,21 @@
           <a:bodyPr/>
           <a:lstStyle/>
           <a:p>
-            <a:pPr lvl="0" indent="0" marL="0">
-              <a:spcBef>
-                <a:spcPts val="3000"/>
-              </a:spcBef>
-              <a:buNone/>
-            </a:pPr>
-            <a:r>
-              <a:rPr b="1"/>
+            <a:pPr lvl="0"/>
+            <a:r>
+              <a:rPr/>
               <a:t>프리토타입 (Pretotype)</a:t>
             </a:r>
           </a:p>
           <a:p>
-            <a:pPr lvl="0"/>
+            <a:pPr lvl="1"/>
             <a:r>
               <a:rPr/>
               <a:t>아주 기초적인 수준으로 작동하거나, 심지어는 작동하지 않아도 작동하는 것처럼 보이는 가짜 제품</a:t>
             </a:r>
           </a:p>
           <a:p>
-            <a:pPr lvl="0"/>
+            <a:pPr lvl="1"/>
             <a:r>
               <a:rPr b="1"/>
               <a:t>“fake it</a:t>
@@ -4979,7 +5819,7 @@
             </a:r>
           </a:p>
           <a:p>
-            <a:pPr lvl="1"/>
+            <a:pPr lvl="2"/>
             <a:r>
               <a:rPr>
                 <a:hlinkClick r:id="rId2"/>
@@ -4988,19 +5828,14 @@
             </a:r>
           </a:p>
           <a:p>
-            <a:pPr lvl="0" indent="0" marL="0">
-              <a:spcBef>
-                <a:spcPts val="3000"/>
-              </a:spcBef>
-              <a:buNone/>
-            </a:pPr>
-            <a:r>
-              <a:rPr b="1"/>
+            <a:pPr lvl="0"/>
+            <a:r>
+              <a:rPr/>
               <a:t>MVP (Minimum Viable Product)</a:t>
             </a:r>
           </a:p>
           <a:p>
-            <a:pPr lvl="0"/>
+            <a:pPr lvl="1"/>
             <a:r>
               <a:rPr/>
               <a:t>최소한의 가치를 달성하는 것을 목표로 하는 최소 기능 제품</a:t>
@@ -5046,7 +5881,7 @@
                                         <p:tgtEl>
                                           <p:spTgt spid="3">
                                             <p:txEl>
-                                              <p:pRg st="1" end="1"/>
+                                              <p:pRg st="0" end="0"/>
                                             </p:txEl>
                                           </p:spTgt>
                                         </p:tgtEl>
@@ -5095,7 +5930,7 @@
                                         <p:tgtEl>
                                           <p:spTgt spid="3">
                                             <p:txEl>
-                                              <p:pRg st="2" end="2"/>
+                                              <p:pRg st="1" end="1"/>
                                             </p:txEl>
                                           </p:spTgt>
                                         </p:tgtEl>
@@ -5144,7 +5979,7 @@
                                         <p:tgtEl>
                                           <p:spTgt spid="3">
                                             <p:txEl>
-                                              <p:pRg st="3" end="3"/>
+                                              <p:pRg st="2" end="2"/>
                                             </p:txEl>
                                           </p:spTgt>
                                         </p:tgtEl>
@@ -5186,6 +6021,104 @@
                                     <p:set>
                                       <p:cBhvr>
                                         <p:cTn id="18" dur="1" fill="hold">
+                                          <p:stCondLst>
+                                            <p:cond delay="0"/>
+                                          </p:stCondLst>
+                                        </p:cTn>
+                                        <p:tgtEl>
+                                          <p:spTgt spid="3">
+                                            <p:txEl>
+                                              <p:pRg st="3" end="3"/>
+                                            </p:txEl>
+                                          </p:spTgt>
+                                        </p:tgtEl>
+                                        <p:attrNameLst>
+                                          <p:attrName>style.visibility</p:attrName>
+                                        </p:attrNameLst>
+                                      </p:cBhvr>
+                                      <p:to>
+                                        <p:strVal val="visible"/>
+                                      </p:to>
+                                    </p:set>
+                                  </p:childTnLst>
+                                </p:cTn>
+                              </p:par>
+                            </p:childTnLst>
+                          </p:cTn>
+                        </p:par>
+                      </p:childTnLst>
+                    </p:cTn>
+                  </p:par>
+                  <p:par>
+                    <p:cTn id="19" fill="hold">
+                      <p:stCondLst>
+                        <p:cond delay="indefinite"/>
+                      </p:stCondLst>
+                      <p:childTnLst>
+                        <p:par>
+                          <p:cTn id="20" fill="hold">
+                            <p:stCondLst>
+                              <p:cond delay="0"/>
+                            </p:stCondLst>
+                            <p:childTnLst>
+                              <p:par>
+                                <p:cTn id="21" presetID="1" presetClass="entr" presetSubtype="0" fill="hold" grpId="0" nodeType="clickEffect">
+                                  <p:stCondLst>
+                                    <p:cond delay="0"/>
+                                  </p:stCondLst>
+                                  <p:childTnLst>
+                                    <p:set>
+                                      <p:cBhvr>
+                                        <p:cTn id="22" dur="1" fill="hold">
+                                          <p:stCondLst>
+                                            <p:cond delay="0"/>
+                                          </p:stCondLst>
+                                        </p:cTn>
+                                        <p:tgtEl>
+                                          <p:spTgt spid="3">
+                                            <p:txEl>
+                                              <p:pRg st="4" end="4"/>
+                                            </p:txEl>
+                                          </p:spTgt>
+                                        </p:tgtEl>
+                                        <p:attrNameLst>
+                                          <p:attrName>style.visibility</p:attrName>
+                                        </p:attrNameLst>
+                                      </p:cBhvr>
+                                      <p:to>
+                                        <p:strVal val="visible"/>
+                                      </p:to>
+                                    </p:set>
+                                  </p:childTnLst>
+                                </p:cTn>
+                              </p:par>
+                            </p:childTnLst>
+                          </p:cTn>
+                        </p:par>
+                      </p:childTnLst>
+                    </p:cTn>
+                  </p:par>
+                  <p:par>
+                    <p:cTn id="23" fill="hold">
+                      <p:stCondLst>
+                        <p:cond delay="indefinite"/>
+                      </p:stCondLst>
+                      <p:childTnLst>
+                        <p:par>
+                          <p:cTn id="24" fill="hold">
+                            <p:stCondLst>
+                              <p:cond delay="0"/>
+                            </p:stCondLst>
+                            <p:childTnLst>
+                              <p:par>
+                                <p:cTn id="25" presetID="1" presetClass="entr" presetSubtype="0" fill="hold" grpId="0" nodeType="clickEffect">
+                                  <p:stCondLst>
+                                    <p:cond delay="0"/>
+                                  </p:stCondLst>
+                                  <p:childTnLst>
+                                    <p:set>
+                                      <p:cBhvr>
+                                        <p:cTn id="26" dur="1" fill="hold">
                                           <p:stCondLst>
                                             <p:cond delay="0"/>
                                           </p:stCondLst>
@@ -7913,115 +8846,52 @@
           <a:bodyPr/>
           <a:lstStyle/>
           <a:p>
-            <a:pPr lvl="0" indent="0" marL="0">
-              <a:buNone/>
-            </a:pPr>
+            <a:pPr lvl="0"/>
             <a:r>
               <a:rPr/>
-              <a:t>:::::::::::::: ::: - 오랜 시간 성숙된 애자일 문화 - 워터폴 방식 개발 방법론의 한계를 해결하기 위한 대안 - 빠른 프로토타입과 테스트를 반복해가며 개발 - 노코드의 신속성과 직관성이 필요한 영역 - 생성형 AI의 출현 - 생성형 AI는 코드 또는 발화의 형태로 대답을 할 수 있음 - 이 대답을 노코드(GUI)로 할 때 사람과 대화하기가 훨씬 유리 ::: ::: - 코로나 이후의 변화 - 세계경제 악화 - 투자 시장의 변화 - 기존: 미래가치에 투자 - 현재: 현재수익/성과에 투자 - 검증된 아이디어에 투자 - 검증의 필요성 증가 - 개발비용 증가 - 온라인 의존도 높아짐 - 온라인 커뮤니티의 부상 - 위성 형태로 세분화되는 인터넷 - 작은 규모의 인터넷 커뮤니티를 만들기 위한 노코드 ::: ::::::::::::::</a:t>
-            </a:r>
-          </a:p>
-        </p:txBody>
-      </p:sp>
-    </p:spTree>
-  </p:cSld>
-</p:sld>
-</file>
-
-<file path=ppt/slides/slide9.xml><?xml version="1.0" encoding="utf-8"?>
-<p:sld xmlns:a="http://schemas.openxmlformats.org/drawingml/2006/main" xmlns:r="http://schemas.openxmlformats.org/officeDocument/2006/relationships" xmlns:p="http://schemas.openxmlformats.org/presentationml/2006/main">
-  <p:cSld>
-    <p:spTree>
-      <p:nvGrpSpPr>
-        <p:cNvPr id="1" name=""/>
-        <p:cNvGrpSpPr/>
-        <p:nvPr/>
-      </p:nvGrpSpPr>
-      <p:grpSpPr>
-        <a:xfrm>
-          <a:off x="0" y="0"/>
-          <a:ext cx="0" cy="0"/>
-          <a:chOff x="0" y="0"/>
-          <a:chExt cx="0" cy="0"/>
-        </a:xfrm>
-      </p:grpSpPr>
-      <p:sp>
-        <p:nvSpPr>
-          <p:cNvPr id="2" name="Title 1"/>
-          <p:cNvSpPr>
-            <a:spLocks noGrp="1"/>
-          </p:cNvSpPr>
-          <p:nvPr>
-            <p:ph type="title"/>
-          </p:nvPr>
-        </p:nvSpPr>
-        <p:spPr/>
-        <p:txBody>
-          <a:bodyPr/>
-          <a:lstStyle/>
-          <a:p>
-            <a:pPr lvl="0" indent="0" marL="0">
-              <a:buNone/>
-            </a:pPr>
+              <a:t>오랜 시간 성숙된 애자일 문화</a:t>
+            </a:r>
+          </a:p>
+          <a:p>
+            <a:pPr lvl="1"/>
             <a:r>
               <a:rPr/>
-              <a:t>노코드 도구의 종류</a:t>
-            </a:r>
-          </a:p>
-        </p:txBody>
-      </p:sp>
-      <p:sp>
-        <p:nvSpPr>
-          <p:cNvPr id="3" name="Content Placeholder 2"/>
-          <p:cNvSpPr>
-            <a:spLocks noGrp="1"/>
-          </p:cNvSpPr>
-          <p:nvPr>
-            <p:ph idx="1"/>
-          </p:nvPr>
-        </p:nvSpPr>
-        <p:spPr/>
-        <p:txBody>
-          <a:bodyPr/>
-          <a:lstStyle/>
-          <a:p>
-            <a:pPr lvl="0" indent="0" marL="0">
-              <a:spcBef>
-                <a:spcPts val="3000"/>
-              </a:spcBef>
-              <a:buNone/>
-            </a:pPr>
-            <a:r>
-              <a:rPr b="1"/>
-              <a:t>브론즈 ~ 골드</a:t>
+              <a:t>워터폴 방식 개발 방법론의 한계를 해결하기 위한 대안</a:t>
+            </a:r>
+          </a:p>
+          <a:p>
+            <a:pPr lvl="1"/>
+            <a:r>
+              <a:rPr/>
+              <a:t>빠른 프로토타입과 테스트를 반복해가며 개발</a:t>
+            </a:r>
+          </a:p>
+          <a:p>
+            <a:pPr lvl="2"/>
+            <a:r>
+              <a:rPr/>
+              <a:t>노코드의 신속성과 직관성이 필요한 영역</a:t>
             </a:r>
           </a:p>
           <a:p>
             <a:pPr lvl="0"/>
             <a:r>
               <a:rPr/>
-              <a:t>노션 : 정보 제공 위주의 웹 페이지 제작, 데이터베이스 활용</a:t>
-            </a:r>
-          </a:p>
-          <a:p>
-            <a:pPr lvl="0"/>
+              <a:t>생성형 AI의 출현</a:t>
+            </a:r>
+          </a:p>
+          <a:p>
+            <a:pPr lvl="1"/>
             <a:r>
               <a:rPr/>
-              <a:t>피그마 : 벡터 디자인 및 UI 제작 도구</a:t>
-            </a:r>
-          </a:p>
-          <a:p>
-            <a:pPr lvl="0"/>
+              <a:t>생성형 AI는 코드 또는 발화의 형태로 대답을 할 수 있음</a:t>
+            </a:r>
+          </a:p>
+          <a:p>
+            <a:pPr lvl="1"/>
             <a:r>
               <a:rPr/>
-              <a:t>구글 시트 : 스프레드시트 형식으로 데이터를 관리하며, API를 통해 DB로도 활용</a:t>
-            </a:r>
-          </a:p>
-          <a:p>
-            <a:pPr lvl="0"/>
-            <a:r>
-              <a:rPr/>
-              <a:t>소프터/글라이드/아임웹 : 초심자도 쓰기 좋은 웹 빌더</a:t>
+              <a:t>이 대답을 노코드(GUI)로 할 때 사람과 대화하기가 훨씬 유리</a:t>
             </a:r>
           </a:p>
         </p:txBody>
@@ -8064,7 +8934,7 @@
                                         <p:tgtEl>
                                           <p:spTgt spid="3">
                                             <p:txEl>
-                                              <p:pRg st="1" end="1"/>
+                                              <p:pRg st="0" end="0"/>
                                             </p:txEl>
                                           </p:spTgt>
                                         </p:tgtEl>
@@ -8113,7 +8983,7 @@
                                         <p:tgtEl>
                                           <p:spTgt spid="3">
                                             <p:txEl>
-                                              <p:pRg st="2" end="2"/>
+                                              <p:pRg st="1" end="1"/>
                                             </p:txEl>
                                           </p:spTgt>
                                         </p:tgtEl>
@@ -8162,7 +9032,7 @@
                                         <p:tgtEl>
                                           <p:spTgt spid="3">
                                             <p:txEl>
-                                              <p:pRg st="3" end="3"/>
+                                              <p:pRg st="2" end="2"/>
                                             </p:txEl>
                                           </p:spTgt>
                                         </p:tgtEl>
@@ -8211,7 +9081,617 @@
                                         <p:tgtEl>
                                           <p:spTgt spid="3">
                                             <p:txEl>
+                                              <p:pRg st="3" end="3"/>
+                                            </p:txEl>
+                                          </p:spTgt>
+                                        </p:tgtEl>
+                                        <p:attrNameLst>
+                                          <p:attrName>style.visibility</p:attrName>
+                                        </p:attrNameLst>
+                                      </p:cBhvr>
+                                      <p:to>
+                                        <p:strVal val="visible"/>
+                                      </p:to>
+                                    </p:set>
+                                  </p:childTnLst>
+                                </p:cTn>
+                              </p:par>
+                            </p:childTnLst>
+                          </p:cTn>
+                        </p:par>
+                      </p:childTnLst>
+                    </p:cTn>
+                  </p:par>
+                  <p:par>
+                    <p:cTn id="19" fill="hold">
+                      <p:stCondLst>
+                        <p:cond delay="indefinite"/>
+                      </p:stCondLst>
+                      <p:childTnLst>
+                        <p:par>
+                          <p:cTn id="20" fill="hold">
+                            <p:stCondLst>
+                              <p:cond delay="0"/>
+                            </p:stCondLst>
+                            <p:childTnLst>
+                              <p:par>
+                                <p:cTn id="21" presetID="1" presetClass="entr" presetSubtype="0" fill="hold" grpId="0" nodeType="clickEffect">
+                                  <p:stCondLst>
+                                    <p:cond delay="0"/>
+                                  </p:stCondLst>
+                                  <p:childTnLst>
+                                    <p:set>
+                                      <p:cBhvr>
+                                        <p:cTn id="22" dur="1" fill="hold">
+                                          <p:stCondLst>
+                                            <p:cond delay="0"/>
+                                          </p:stCondLst>
+                                        </p:cTn>
+                                        <p:tgtEl>
+                                          <p:spTgt spid="3">
+                                            <p:txEl>
                                               <p:pRg st="4" end="4"/>
+                                            </p:txEl>
+                                          </p:spTgt>
+                                        </p:tgtEl>
+                                        <p:attrNameLst>
+                                          <p:attrName>style.visibility</p:attrName>
+                                        </p:attrNameLst>
+                                      </p:cBhvr>
+                                      <p:to>
+                                        <p:strVal val="visible"/>
+                                      </p:to>
+                                    </p:set>
+                                  </p:childTnLst>
+                                </p:cTn>
+                              </p:par>
+                            </p:childTnLst>
+                          </p:cTn>
+                        </p:par>
+                      </p:childTnLst>
+                    </p:cTn>
+                  </p:par>
+                  <p:par>
+                    <p:cTn id="23" fill="hold">
+                      <p:stCondLst>
+                        <p:cond delay="indefinite"/>
+                      </p:stCondLst>
+                      <p:childTnLst>
+                        <p:par>
+                          <p:cTn id="24" fill="hold">
+                            <p:stCondLst>
+                              <p:cond delay="0"/>
+                            </p:stCondLst>
+                            <p:childTnLst>
+                              <p:par>
+                                <p:cTn id="25" presetID="1" presetClass="entr" presetSubtype="0" fill="hold" grpId="0" nodeType="clickEffect">
+                                  <p:stCondLst>
+                                    <p:cond delay="0"/>
+                                  </p:stCondLst>
+                                  <p:childTnLst>
+                                    <p:set>
+                                      <p:cBhvr>
+                                        <p:cTn id="26" dur="1" fill="hold">
+                                          <p:stCondLst>
+                                            <p:cond delay="0"/>
+                                          </p:stCondLst>
+                                        </p:cTn>
+                                        <p:tgtEl>
+                                          <p:spTgt spid="3">
+                                            <p:txEl>
+                                              <p:pRg st="5" end="5"/>
+                                            </p:txEl>
+                                          </p:spTgt>
+                                        </p:tgtEl>
+                                        <p:attrNameLst>
+                                          <p:attrName>style.visibility</p:attrName>
+                                        </p:attrNameLst>
+                                      </p:cBhvr>
+                                      <p:to>
+                                        <p:strVal val="visible"/>
+                                      </p:to>
+                                    </p:set>
+                                  </p:childTnLst>
+                                </p:cTn>
+                              </p:par>
+                            </p:childTnLst>
+                          </p:cTn>
+                        </p:par>
+                      </p:childTnLst>
+                    </p:cTn>
+                  </p:par>
+                  <p:par>
+                    <p:cTn id="27" fill="hold">
+                      <p:stCondLst>
+                        <p:cond delay="indefinite"/>
+                      </p:stCondLst>
+                      <p:childTnLst>
+                        <p:par>
+                          <p:cTn id="28" fill="hold">
+                            <p:stCondLst>
+                              <p:cond delay="0"/>
+                            </p:stCondLst>
+                            <p:childTnLst>
+                              <p:par>
+                                <p:cTn id="29" presetID="1" presetClass="entr" presetSubtype="0" fill="hold" grpId="0" nodeType="clickEffect">
+                                  <p:stCondLst>
+                                    <p:cond delay="0"/>
+                                  </p:stCondLst>
+                                  <p:childTnLst>
+                                    <p:set>
+                                      <p:cBhvr>
+                                        <p:cTn id="30" dur="1" fill="hold">
+                                          <p:stCondLst>
+                                            <p:cond delay="0"/>
+                                          </p:stCondLst>
+                                        </p:cTn>
+                                        <p:tgtEl>
+                                          <p:spTgt spid="3">
+                                            <p:txEl>
+                                              <p:pRg st="6" end="6"/>
+                                            </p:txEl>
+                                          </p:spTgt>
+                                        </p:tgtEl>
+                                        <p:attrNameLst>
+                                          <p:attrName>style.visibility</p:attrName>
+                                        </p:attrNameLst>
+                                      </p:cBhvr>
+                                      <p:to>
+                                        <p:strVal val="visible"/>
+                                      </p:to>
+                                    </p:set>
+                                  </p:childTnLst>
+                                </p:cTn>
+                              </p:par>
+                            </p:childTnLst>
+                          </p:cTn>
+                        </p:par>
+                      </p:childTnLst>
+                    </p:cTn>
+                  </p:par>
+                </p:childTnLst>
+              </p:cTn>
+              <p:prevCondLst>
+                <p:cond evt="onPrev" delay="0">
+                  <p:tgtEl>
+                    <p:sldTgt/>
+                  </p:tgtEl>
+                </p:cond>
+              </p:prevCondLst>
+              <p:nextCondLst>
+                <p:cond evt="onNext" delay="0">
+                  <p:tgtEl>
+                    <p:sldTgt/>
+                  </p:tgtEl>
+                </p:cond>
+              </p:nextCondLst>
+            </p:seq>
+          </p:childTnLst>
+        </p:cTn>
+      </p:par>
+    </p:tnLst>
+    <p:bldLst>
+      <p:bldP spid="3" grpId="0" uiExpand="1" build="p"/>
+    </p:bldLst>
+  </p:timing>
+</p:sld>
+</file>
+
+<file path=ppt/slides/slide9.xml><?xml version="1.0" encoding="utf-8"?>
+<p:sld xmlns:a="http://schemas.openxmlformats.org/drawingml/2006/main" xmlns:r="http://schemas.openxmlformats.org/officeDocument/2006/relationships" xmlns:p="http://schemas.openxmlformats.org/presentationml/2006/main">
+  <p:cSld>
+    <p:spTree>
+      <p:nvGrpSpPr>
+        <p:cNvPr id="1" name=""/>
+        <p:cNvGrpSpPr/>
+        <p:nvPr/>
+      </p:nvGrpSpPr>
+      <p:grpSpPr>
+        <a:xfrm>
+          <a:off x="0" y="0"/>
+          <a:ext cx="0" cy="0"/>
+          <a:chOff x="0" y="0"/>
+          <a:chExt cx="0" cy="0"/>
+        </a:xfrm>
+      </p:grpSpPr>
+      <p:sp>
+        <p:nvSpPr>
+          <p:cNvPr id="3" name="Content Placeholder 2"/>
+          <p:cNvSpPr>
+            <a:spLocks noGrp="1"/>
+          </p:cNvSpPr>
+          <p:nvPr>
+            <p:ph idx="1"/>
+          </p:nvPr>
+        </p:nvSpPr>
+        <p:spPr/>
+        <p:txBody>
+          <a:bodyPr/>
+          <a:lstStyle/>
+          <a:p>
+            <a:pPr lvl="0"/>
+            <a:r>
+              <a:rPr/>
+              <a:t>코로나 이후의 변화</a:t>
+            </a:r>
+          </a:p>
+          <a:p>
+            <a:pPr lvl="1"/>
+            <a:r>
+              <a:rPr/>
+              <a:t>세계경제 악화</a:t>
+            </a:r>
+          </a:p>
+          <a:p>
+            <a:pPr lvl="1"/>
+            <a:r>
+              <a:rPr/>
+              <a:t>투자 시장의 변화</a:t>
+            </a:r>
+          </a:p>
+          <a:p>
+            <a:pPr lvl="2"/>
+            <a:r>
+              <a:rPr/>
+              <a:t>기존: 미래가치에 투자</a:t>
+            </a:r>
+          </a:p>
+          <a:p>
+            <a:pPr lvl="2"/>
+            <a:r>
+              <a:rPr/>
+              <a:t>현재: 현재수익/성과에 투자</a:t>
+            </a:r>
+          </a:p>
+          <a:p>
+            <a:pPr lvl="3"/>
+            <a:r>
+              <a:rPr/>
+              <a:t>검증된 아이디어. 검증의 필요성 증가</a:t>
+            </a:r>
+          </a:p>
+          <a:p>
+            <a:pPr lvl="4"/>
+            <a:r>
+              <a:rPr/>
+              <a:t>빠른 검증(MVP)을 위한 노코드</a:t>
+            </a:r>
+          </a:p>
+        </p:txBody>
+      </p:sp>
+    </p:spTree>
+  </p:cSld>
+  <p:timing>
+    <p:tnLst>
+      <p:par>
+        <p:cTn id="1" dur="indefinite" restart="never" nodeType="tmRoot">
+          <p:childTnLst>
+            <p:seq concurrent="1" nextAc="seek">
+              <p:cTn id="2" dur="indefinite" nodeType="mainSeq">
+                <p:childTnLst>
+                  <p:par>
+                    <p:cTn id="3" fill="hold">
+                      <p:stCondLst>
+                        <p:cond delay="indefinite"/>
+                      </p:stCondLst>
+                      <p:childTnLst>
+                        <p:par>
+                          <p:cTn id="4" fill="hold">
+                            <p:stCondLst>
+                              <p:cond delay="0"/>
+                            </p:stCondLst>
+                            <p:childTnLst>
+                              <p:par>
+                                <p:cTn id="5" presetID="1" presetClass="entr" presetSubtype="0" fill="hold" grpId="0" nodeType="clickEffect">
+                                  <p:stCondLst>
+                                    <p:cond delay="0"/>
+                                  </p:stCondLst>
+                                  <p:childTnLst>
+                                    <p:set>
+                                      <p:cBhvr>
+                                        <p:cTn id="6" dur="1" fill="hold">
+                                          <p:stCondLst>
+                                            <p:cond delay="0"/>
+                                          </p:stCondLst>
+                                        </p:cTn>
+                                        <p:tgtEl>
+                                          <p:spTgt spid="3">
+                                            <p:txEl>
+                                              <p:pRg st="0" end="0"/>
+                                            </p:txEl>
+                                          </p:spTgt>
+                                        </p:tgtEl>
+                                        <p:attrNameLst>
+                                          <p:attrName>style.visibility</p:attrName>
+                                        </p:attrNameLst>
+                                      </p:cBhvr>
+                                      <p:to>
+                                        <p:strVal val="visible"/>
+                                      </p:to>
+                                    </p:set>
+                                  </p:childTnLst>
+                                </p:cTn>
+                              </p:par>
+                            </p:childTnLst>
+                          </p:cTn>
+                        </p:par>
+                      </p:childTnLst>
+                    </p:cTn>
+                  </p:par>
+                  <p:par>
+                    <p:cTn id="7" fill="hold">
+                      <p:stCondLst>
+                        <p:cond delay="indefinite"/>
+                      </p:stCondLst>
+                      <p:childTnLst>
+                        <p:par>
+                          <p:cTn id="8" fill="hold">
+                            <p:stCondLst>
+                              <p:cond delay="0"/>
+                            </p:stCondLst>
+                            <p:childTnLst>
+                              <p:par>
+                                <p:cTn id="9" presetID="1" presetClass="entr" presetSubtype="0" fill="hold" grpId="0" nodeType="clickEffect">
+                                  <p:stCondLst>
+                                    <p:cond delay="0"/>
+                                  </p:stCondLst>
+                                  <p:childTnLst>
+                                    <p:set>
+                                      <p:cBhvr>
+                                        <p:cTn id="10" dur="1" fill="hold">
+                                          <p:stCondLst>
+                                            <p:cond delay="0"/>
+                                          </p:stCondLst>
+                                        </p:cTn>
+                                        <p:tgtEl>
+                                          <p:spTgt spid="3">
+                                            <p:txEl>
+                                              <p:pRg st="1" end="1"/>
+                                            </p:txEl>
+                                          </p:spTgt>
+                                        </p:tgtEl>
+                                        <p:attrNameLst>
+                                          <p:attrName>style.visibility</p:attrName>
+                                        </p:attrNameLst>
+                                      </p:cBhvr>
+                                      <p:to>
+                                        <p:strVal val="visible"/>
+                                      </p:to>
+                                    </p:set>
+                                  </p:childTnLst>
+                                </p:cTn>
+                              </p:par>
+                            </p:childTnLst>
+                          </p:cTn>
+                        </p:par>
+                      </p:childTnLst>
+                    </p:cTn>
+                  </p:par>
+                  <p:par>
+                    <p:cTn id="11" fill="hold">
+                      <p:stCondLst>
+                        <p:cond delay="indefinite"/>
+                      </p:stCondLst>
+                      <p:childTnLst>
+                        <p:par>
+                          <p:cTn id="12" fill="hold">
+                            <p:stCondLst>
+                              <p:cond delay="0"/>
+                            </p:stCondLst>
+                            <p:childTnLst>
+                              <p:par>
+                                <p:cTn id="13" presetID="1" presetClass="entr" presetSubtype="0" fill="hold" grpId="0" nodeType="clickEffect">
+                                  <p:stCondLst>
+                                    <p:cond delay="0"/>
+                                  </p:stCondLst>
+                                  <p:childTnLst>
+                                    <p:set>
+                                      <p:cBhvr>
+                                        <p:cTn id="14" dur="1" fill="hold">
+                                          <p:stCondLst>
+                                            <p:cond delay="0"/>
+                                          </p:stCondLst>
+                                        </p:cTn>
+                                        <p:tgtEl>
+                                          <p:spTgt spid="3">
+                                            <p:txEl>
+                                              <p:pRg st="2" end="2"/>
+                                            </p:txEl>
+                                          </p:spTgt>
+                                        </p:tgtEl>
+                                        <p:attrNameLst>
+                                          <p:attrName>style.visibility</p:attrName>
+                                        </p:attrNameLst>
+                                      </p:cBhvr>
+                                      <p:to>
+                                        <p:strVal val="visible"/>
+                                      </p:to>
+                                    </p:set>
+                                  </p:childTnLst>
+                                </p:cTn>
+                              </p:par>
+                            </p:childTnLst>
+                          </p:cTn>
+                        </p:par>
+                      </p:childTnLst>
+                    </p:cTn>
+                  </p:par>
+                  <p:par>
+                    <p:cTn id="15" fill="hold">
+                      <p:stCondLst>
+                        <p:cond delay="indefinite"/>
+                      </p:stCondLst>
+                      <p:childTnLst>
+                        <p:par>
+                          <p:cTn id="16" fill="hold">
+                            <p:stCondLst>
+                              <p:cond delay="0"/>
+                            </p:stCondLst>
+                            <p:childTnLst>
+                              <p:par>
+                                <p:cTn id="17" presetID="1" presetClass="entr" presetSubtype="0" fill="hold" grpId="0" nodeType="clickEffect">
+                                  <p:stCondLst>
+                                    <p:cond delay="0"/>
+                                  </p:stCondLst>
+                                  <p:childTnLst>
+                                    <p:set>
+                                      <p:cBhvr>
+                                        <p:cTn id="18" dur="1" fill="hold">
+                                          <p:stCondLst>
+                                            <p:cond delay="0"/>
+                                          </p:stCondLst>
+                                        </p:cTn>
+                                        <p:tgtEl>
+                                          <p:spTgt spid="3">
+                                            <p:txEl>
+                                              <p:pRg st="3" end="3"/>
+                                            </p:txEl>
+                                          </p:spTgt>
+                                        </p:tgtEl>
+                                        <p:attrNameLst>
+                                          <p:attrName>style.visibility</p:attrName>
+                                        </p:attrNameLst>
+                                      </p:cBhvr>
+                                      <p:to>
+                                        <p:strVal val="visible"/>
+                                      </p:to>
+                                    </p:set>
+                                  </p:childTnLst>
+                                </p:cTn>
+                              </p:par>
+                            </p:childTnLst>
+                          </p:cTn>
+                        </p:par>
+                      </p:childTnLst>
+                    </p:cTn>
+                  </p:par>
+                  <p:par>
+                    <p:cTn id="19" fill="hold">
+                      <p:stCondLst>
+                        <p:cond delay="indefinite"/>
+                      </p:stCondLst>
+                      <p:childTnLst>
+                        <p:par>
+                          <p:cTn id="20" fill="hold">
+                            <p:stCondLst>
+                              <p:cond delay="0"/>
+                            </p:stCondLst>
+                            <p:childTnLst>
+                              <p:par>
+                                <p:cTn id="21" presetID="1" presetClass="entr" presetSubtype="0" fill="hold" grpId="0" nodeType="clickEffect">
+                                  <p:stCondLst>
+                                    <p:cond delay="0"/>
+                                  </p:stCondLst>
+                                  <p:childTnLst>
+                                    <p:set>
+                                      <p:cBhvr>
+                                        <p:cTn id="22" dur="1" fill="hold">
+                                          <p:stCondLst>
+                                            <p:cond delay="0"/>
+                                          </p:stCondLst>
+                                        </p:cTn>
+                                        <p:tgtEl>
+                                          <p:spTgt spid="3">
+                                            <p:txEl>
+                                              <p:pRg st="4" end="4"/>
+                                            </p:txEl>
+                                          </p:spTgt>
+                                        </p:tgtEl>
+                                        <p:attrNameLst>
+                                          <p:attrName>style.visibility</p:attrName>
+                                        </p:attrNameLst>
+                                      </p:cBhvr>
+                                      <p:to>
+                                        <p:strVal val="visible"/>
+                                      </p:to>
+                                    </p:set>
+                                  </p:childTnLst>
+                                </p:cTn>
+                              </p:par>
+                            </p:childTnLst>
+                          </p:cTn>
+                        </p:par>
+                      </p:childTnLst>
+                    </p:cTn>
+                  </p:par>
+                  <p:par>
+                    <p:cTn id="23" fill="hold">
+                      <p:stCondLst>
+                        <p:cond delay="indefinite"/>
+                      </p:stCondLst>
+                      <p:childTnLst>
+                        <p:par>
+                          <p:cTn id="24" fill="hold">
+                            <p:stCondLst>
+                              <p:cond delay="0"/>
+                            </p:stCondLst>
+                            <p:childTnLst>
+                              <p:par>
+                                <p:cTn id="25" presetID="1" presetClass="entr" presetSubtype="0" fill="hold" grpId="0" nodeType="clickEffect">
+                                  <p:stCondLst>
+                                    <p:cond delay="0"/>
+                                  </p:stCondLst>
+                                  <p:childTnLst>
+                                    <p:set>
+                                      <p:cBhvr>
+                                        <p:cTn id="26" dur="1" fill="hold">
+                                          <p:stCondLst>
+                                            <p:cond delay="0"/>
+                                          </p:stCondLst>
+                                        </p:cTn>
+                                        <p:tgtEl>
+                                          <p:spTgt spid="3">
+                                            <p:txEl>
+                                              <p:pRg st="5" end="5"/>
+                                            </p:txEl>
+                                          </p:spTgt>
+                                        </p:tgtEl>
+                                        <p:attrNameLst>
+                                          <p:attrName>style.visibility</p:attrName>
+                                        </p:attrNameLst>
+                                      </p:cBhvr>
+                                      <p:to>
+                                        <p:strVal val="visible"/>
+                                      </p:to>
+                                    </p:set>
+                                  </p:childTnLst>
+                                </p:cTn>
+                              </p:par>
+                            </p:childTnLst>
+                          </p:cTn>
+                        </p:par>
+                      </p:childTnLst>
+                    </p:cTn>
+                  </p:par>
+                  <p:par>
+                    <p:cTn id="27" fill="hold">
+                      <p:stCondLst>
+                        <p:cond delay="indefinite"/>
+                      </p:stCondLst>
+                      <p:childTnLst>
+                        <p:par>
+                          <p:cTn id="28" fill="hold">
+                            <p:stCondLst>
+                              <p:cond delay="0"/>
+                            </p:stCondLst>
+                            <p:childTnLst>
+                              <p:par>
+                                <p:cTn id="29" presetID="1" presetClass="entr" presetSubtype="0" fill="hold" grpId="0" nodeType="clickEffect">
+                                  <p:stCondLst>
+                                    <p:cond delay="0"/>
+                                  </p:stCondLst>
+                                  <p:childTnLst>
+                                    <p:set>
+                                      <p:cBhvr>
+                                        <p:cTn id="30" dur="1" fill="hold">
+                                          <p:stCondLst>
+                                            <p:cond delay="0"/>
+                                          </p:stCondLst>
+                                        </p:cTn>
+                                        <p:tgtEl>
+                                          <p:spTgt spid="3">
+                                            <p:txEl>
+                                              <p:pRg st="6" end="6"/>
                                             </p:txEl>
                                           </p:spTgt>
                                         </p:tgtEl>

</xml_diff>

<commit_message>
백업 완료: 2023-11-25 03:10:02
Affected files:
노코드 엔지니어링/노코드 개론.md
노코드 엔지니어링/노코드 개론.pptx
</commit_message>
<xml_diff>
--- a/노코드 엔지니어링/노코드 개론.pptx
+++ b/노코드 엔지니어링/노코드 개론.pptx
@@ -6583,63 +6583,73 @@
           <a:bodyPr/>
           <a:lstStyle/>
           <a:p>
+            <a:pPr lvl="0" indent="0" marL="0">
+              <a:spcBef>
+                <a:spcPts val="3000"/>
+              </a:spcBef>
+              <a:buNone/>
+            </a:pPr>
+            <a:r>
+              <a:rPr b="1"/>
+              <a:t>쉽다</a:t>
+            </a:r>
+          </a:p>
+          <a:p>
             <a:pPr lvl="0"/>
-            <a:r>
-              <a:rPr/>
-              <a:t>쉽다.</a:t>
-            </a:r>
-          </a:p>
-          <a:p>
-            <a:pPr lvl="1"/>
             <a:r>
               <a:rPr/>
               <a:t>검은 화면에 텍스트를 보며 작업하는 것이 코딩의 진입장벽</a:t>
             </a:r>
           </a:p>
           <a:p>
-            <a:pPr lvl="2"/>
+            <a:pPr lvl="1"/>
             <a:r>
               <a:rPr/>
               <a:t>노코드 툴은 GUI를 사용해서 WYSIWYG 환경을 구축</a:t>
             </a:r>
           </a:p>
           <a:p>
-            <a:pPr lvl="3"/>
+            <a:pPr lvl="2"/>
             <a:r>
               <a:rPr/>
               <a:t>What you see is what you get</a:t>
             </a:r>
           </a:p>
           <a:p>
-            <a:pPr lvl="1"/>
+            <a:pPr lvl="0"/>
             <a:r>
               <a:rPr/>
               <a:t>쉽기 때문에 프로그래밍의 학습을 보조하거나 진입장벽을 낮춰주는 효과가 있음</a:t>
             </a:r>
           </a:p>
           <a:p>
+            <a:pPr lvl="0" indent="0" marL="0">
+              <a:spcBef>
+                <a:spcPts val="3000"/>
+              </a:spcBef>
+              <a:buNone/>
+            </a:pPr>
+            <a:r>
+              <a:rPr b="1"/>
+              <a:t>빠르다</a:t>
+            </a:r>
+          </a:p>
+          <a:p>
             <a:pPr lvl="0"/>
-            <a:r>
-              <a:rPr/>
-              <a:t>빠르다.</a:t>
-            </a:r>
-          </a:p>
-          <a:p>
-            <a:pPr lvl="1"/>
             <a:r>
               <a:rPr/>
               <a:t>개발의 많은 부분이 컴포넌트화, 모듈화되어 있고</a:t>
             </a:r>
           </a:p>
           <a:p>
-            <a:pPr lvl="2"/>
+            <a:pPr lvl="1"/>
             <a:r>
               <a:rPr/>
               <a:t>뚝딱뚝딱 가져다 쓰면 됨</a:t>
             </a:r>
           </a:p>
           <a:p>
-            <a:pPr lvl="1"/>
+            <a:pPr lvl="0"/>
             <a:r>
               <a:rPr/>
               <a:t>GUI를 사용하기 때문에 설계가 직관적임.</a:t>
@@ -6685,7 +6695,7 @@
                                         <p:tgtEl>
                                           <p:spTgt spid="3">
                                             <p:txEl>
-                                              <p:pRg st="0" end="0"/>
+                                              <p:pRg st="1" end="1"/>
                                             </p:txEl>
                                           </p:spTgt>
                                         </p:tgtEl>
@@ -6734,7 +6744,7 @@
                                         <p:tgtEl>
                                           <p:spTgt spid="3">
                                             <p:txEl>
-                                              <p:pRg st="1" end="1"/>
+                                              <p:pRg st="2" end="2"/>
                                             </p:txEl>
                                           </p:spTgt>
                                         </p:tgtEl>
@@ -6783,7 +6793,7 @@
                                         <p:tgtEl>
                                           <p:spTgt spid="3">
                                             <p:txEl>
-                                              <p:pRg st="2" end="2"/>
+                                              <p:pRg st="3" end="3"/>
                                             </p:txEl>
                                           </p:spTgt>
                                         </p:tgtEl>
@@ -6832,7 +6842,7 @@
                                         <p:tgtEl>
                                           <p:spTgt spid="3">
                                             <p:txEl>
-                                              <p:pRg st="3" end="3"/>
+                                              <p:pRg st="4" end="4"/>
                                             </p:txEl>
                                           </p:spTgt>
                                         </p:tgtEl>
@@ -6881,7 +6891,7 @@
                                         <p:tgtEl>
                                           <p:spTgt spid="3">
                                             <p:txEl>
-                                              <p:pRg st="4" end="4"/>
+                                              <p:pRg st="6" end="6"/>
                                             </p:txEl>
                                           </p:spTgt>
                                         </p:tgtEl>
@@ -6930,7 +6940,7 @@
                                         <p:tgtEl>
                                           <p:spTgt spid="3">
                                             <p:txEl>
-                                              <p:pRg st="5" end="5"/>
+                                              <p:pRg st="7" end="7"/>
                                             </p:txEl>
                                           </p:spTgt>
                                         </p:tgtEl>
@@ -6972,104 +6982,6 @@
                                     <p:set>
                                       <p:cBhvr>
                                         <p:cTn id="30" dur="1" fill="hold">
-                                          <p:stCondLst>
-                                            <p:cond delay="0"/>
-                                          </p:stCondLst>
-                                        </p:cTn>
-                                        <p:tgtEl>
-                                          <p:spTgt spid="3">
-                                            <p:txEl>
-                                              <p:pRg st="6" end="6"/>
-                                            </p:txEl>
-                                          </p:spTgt>
-                                        </p:tgtEl>
-                                        <p:attrNameLst>
-                                          <p:attrName>style.visibility</p:attrName>
-                                        </p:attrNameLst>
-                                      </p:cBhvr>
-                                      <p:to>
-                                        <p:strVal val="visible"/>
-                                      </p:to>
-                                    </p:set>
-                                  </p:childTnLst>
-                                </p:cTn>
-                              </p:par>
-                            </p:childTnLst>
-                          </p:cTn>
-                        </p:par>
-                      </p:childTnLst>
-                    </p:cTn>
-                  </p:par>
-                  <p:par>
-                    <p:cTn id="31" fill="hold">
-                      <p:stCondLst>
-                        <p:cond delay="indefinite"/>
-                      </p:stCondLst>
-                      <p:childTnLst>
-                        <p:par>
-                          <p:cTn id="32" fill="hold">
-                            <p:stCondLst>
-                              <p:cond delay="0"/>
-                            </p:stCondLst>
-                            <p:childTnLst>
-                              <p:par>
-                                <p:cTn id="33" presetID="1" presetClass="entr" presetSubtype="0" fill="hold" grpId="0" nodeType="clickEffect">
-                                  <p:stCondLst>
-                                    <p:cond delay="0"/>
-                                  </p:stCondLst>
-                                  <p:childTnLst>
-                                    <p:set>
-                                      <p:cBhvr>
-                                        <p:cTn id="34" dur="1" fill="hold">
-                                          <p:stCondLst>
-                                            <p:cond delay="0"/>
-                                          </p:stCondLst>
-                                        </p:cTn>
-                                        <p:tgtEl>
-                                          <p:spTgt spid="3">
-                                            <p:txEl>
-                                              <p:pRg st="7" end="7"/>
-                                            </p:txEl>
-                                          </p:spTgt>
-                                        </p:tgtEl>
-                                        <p:attrNameLst>
-                                          <p:attrName>style.visibility</p:attrName>
-                                        </p:attrNameLst>
-                                      </p:cBhvr>
-                                      <p:to>
-                                        <p:strVal val="visible"/>
-                                      </p:to>
-                                    </p:set>
-                                  </p:childTnLst>
-                                </p:cTn>
-                              </p:par>
-                            </p:childTnLst>
-                          </p:cTn>
-                        </p:par>
-                      </p:childTnLst>
-                    </p:cTn>
-                  </p:par>
-                  <p:par>
-                    <p:cTn id="35" fill="hold">
-                      <p:stCondLst>
-                        <p:cond delay="indefinite"/>
-                      </p:stCondLst>
-                      <p:childTnLst>
-                        <p:par>
-                          <p:cTn id="36" fill="hold">
-                            <p:stCondLst>
-                              <p:cond delay="0"/>
-                            </p:stCondLst>
-                            <p:childTnLst>
-                              <p:par>
-                                <p:cTn id="37" presetID="1" presetClass="entr" presetSubtype="0" fill="hold" grpId="0" nodeType="clickEffect">
-                                  <p:stCondLst>
-                                    <p:cond delay="0"/>
-                                  </p:stCondLst>
-                                  <p:childTnLst>
-                                    <p:set>
-                                      <p:cBhvr>
-                                        <p:cTn id="38" dur="1" fill="hold">
                                           <p:stCondLst>
                                             <p:cond delay="0"/>
                                           </p:stCondLst>
@@ -7143,6 +7055,31 @@
           <a:chExt cx="0" cy="0"/>
         </a:xfrm>
       </p:grpSpPr>
+      <p:sp>
+        <p:nvSpPr>
+          <p:cNvPr id="2" name="Title 1"/>
+          <p:cNvSpPr>
+            <a:spLocks noGrp="1"/>
+          </p:cNvSpPr>
+          <p:nvPr>
+            <p:ph type="title"/>
+          </p:nvPr>
+        </p:nvSpPr>
+        <p:spPr/>
+        <p:txBody>
+          <a:bodyPr/>
+          <a:lstStyle/>
+          <a:p>
+            <a:pPr lvl="0" indent="0" marL="0">
+              <a:buNone/>
+            </a:pPr>
+            <a:r>
+              <a:rPr/>
+              <a:t>왜 노코드인가?</a:t>
+            </a:r>
+          </a:p>
+        </p:txBody>
+      </p:sp>
       <p:sp>
         <p:nvSpPr>
           <p:cNvPr id="3" name="Content Placeholder 2"/>

</xml_diff>

<commit_message>
백업 완료: 2023-11-25 03:19:15
Affected files:
노코드 엔지니어링/노코드 개론.md
노코드 엔지니어링/노코드 개론.pptx
</commit_message>
<xml_diff>
--- a/노코드 엔지니어링/노코드 개론.pptx
+++ b/노코드 엔지니어링/노코드 개론.pptx
@@ -1552,7 +1552,7 @@
           <a:p>
             <a:pPr lvl="0"/>
             <a:r>
-              <a:rPr lang="en-US" altLang="ko-KR"/>
+              <a:rPr lang="en-US" altLang="ko-KR" dirty="0"/>
               <a:t>Click to edit Master text styles</a:t>
             </a:r>
           </a:p>
@@ -2521,7 +2521,7 @@
               <a:rPr lang="ko-KR" altLang="en-US" smtClean="0"/>
               <a:t>‹#›</a:t>
             </a:fld>
-            <a:endParaRPr lang="ko-KR" altLang="en-US"/>
+            <a:endParaRPr lang="ko-KR" altLang="en-US" dirty="0"/>
           </a:p>
         </p:txBody>
       </p:sp>
@@ -3411,9 +3411,9 @@
       </a:lvl1pPr>
     </p:titleStyle>
     <p:bodyStyle>
-      <a:lvl1pPr algn="l" defTabSz="914400" eaLnBrk="1" hangingPunct="1" indent="0" latinLnBrk="1" marL="0" rtl="0">
+      <a:lvl1pPr algn="l" defTabSz="914400" eaLnBrk="1" hangingPunct="1" indent="-180000" latinLnBrk="1" marL="180000" rtl="0">
         <a:lnSpc>
-          <a:spcPct val="120000"/>
+          <a:spcPct val="110000"/>
         </a:lnSpc>
         <a:spcBef>
           <a:spcPts val="1000"/>
@@ -3423,8 +3423,8 @@
         </a:buClr>
         <a:buSzPct val="100000"/>
         <a:buFont charset="0" panose="020B0604020202020204" pitchFamily="34" typeface="Arial"/>
-        <a:buNone/>
-        <a:defRPr b="1" kern="1200" sz="1600">
+        <a:buChar char="•"/>
+        <a:defRPr b="0" kern="1200" sz="1400">
           <a:solidFill>
             <a:schemeClr val="tx1"/>
           </a:solidFill>
@@ -3436,7 +3436,7 @@
       </a:lvl1pPr>
       <a:lvl2pPr algn="l" defTabSz="914400" eaLnBrk="1" hangingPunct="1" indent="-180000" latinLnBrk="1" marL="450000" rtl="0">
         <a:lnSpc>
-          <a:spcPct val="120000"/>
+          <a:spcPct val="110000"/>
         </a:lnSpc>
         <a:spcBef>
           <a:spcPts val="500"/>
@@ -3447,7 +3447,7 @@
         <a:buSzPct val="100000"/>
         <a:buFont charset="0" panose="020B0604020202020204" pitchFamily="34" typeface="Arial"/>
         <a:buChar char="•"/>
-        <a:defRPr baseline="0" cap="none" kern="1200" sz="1600">
+        <a:defRPr baseline="0" cap="none" kern="1200" sz="1400">
           <a:solidFill>
             <a:schemeClr val="tx1"/>
           </a:solidFill>
@@ -3459,7 +3459,7 @@
       </a:lvl2pPr>
       <a:lvl3pPr algn="l" defTabSz="914400" eaLnBrk="1" hangingPunct="1" indent="-180000" latinLnBrk="1" marL="720000" rtl="0">
         <a:lnSpc>
-          <a:spcPct val="120000"/>
+          <a:spcPct val="110000"/>
         </a:lnSpc>
         <a:spcBef>
           <a:spcPts val="500"/>
@@ -3470,7 +3470,7 @@
         <a:buSzPct val="100000"/>
         <a:buFont charset="0" panose="020B0604020202020204" pitchFamily="34" typeface="Arial"/>
         <a:buChar char="•"/>
-        <a:defRPr kern="1200" sz="1600">
+        <a:defRPr kern="1200" sz="1400">
           <a:solidFill>
             <a:schemeClr val="tx1"/>
           </a:solidFill>
@@ -3482,7 +3482,7 @@
       </a:lvl3pPr>
       <a:lvl4pPr algn="l" defTabSz="914400" eaLnBrk="1" hangingPunct="1" indent="-180000" latinLnBrk="1" marL="990000" rtl="0">
         <a:lnSpc>
-          <a:spcPct val="120000"/>
+          <a:spcPct val="110000"/>
         </a:lnSpc>
         <a:spcBef>
           <a:spcPts val="500"/>
@@ -3493,7 +3493,7 @@
         <a:buSzPct val="100000"/>
         <a:buFont charset="0" panose="020B0604020202020204" pitchFamily="34" typeface="Arial"/>
         <a:buChar char="•"/>
-        <a:defRPr baseline="0" cap="none" kern="1200" sz="1600">
+        <a:defRPr baseline="0" cap="none" kern="1200" sz="1400">
           <a:solidFill>
             <a:schemeClr val="tx1"/>
           </a:solidFill>
@@ -3505,7 +3505,7 @@
       </a:lvl4pPr>
       <a:lvl5pPr algn="l" defTabSz="914400" eaLnBrk="1" hangingPunct="1" indent="-180000" latinLnBrk="1" marL="1260000" rtl="0">
         <a:lnSpc>
-          <a:spcPct val="120000"/>
+          <a:spcPct val="110000"/>
         </a:lnSpc>
         <a:spcBef>
           <a:spcPts val="500"/>
@@ -3516,7 +3516,7 @@
         <a:buSzPct val="100000"/>
         <a:buFont charset="0" panose="020B0604020202020204" pitchFamily="34" typeface="Arial"/>
         <a:buChar char="•"/>
-        <a:defRPr kern="1200" sz="1600">
+        <a:defRPr kern="1200" sz="1400">
           <a:solidFill>
             <a:schemeClr val="tx1"/>
           </a:solidFill>
@@ -7095,56 +7095,66 @@
           <a:bodyPr/>
           <a:lstStyle/>
           <a:p>
+            <a:pPr lvl="0" indent="0" marL="0">
+              <a:spcBef>
+                <a:spcPts val="3000"/>
+              </a:spcBef>
+              <a:buNone/>
+            </a:pPr>
+            <a:r>
+              <a:rPr b="1"/>
+              <a:t>저렴하다.</a:t>
+            </a:r>
+          </a:p>
+          <a:p>
             <a:pPr lvl="0"/>
-            <a:r>
-              <a:rPr/>
-              <a:t>저렴하다.</a:t>
-            </a:r>
-          </a:p>
-          <a:p>
-            <a:pPr lvl="1"/>
             <a:r>
               <a:rPr/>
               <a:t>개발 작업 측면:</a:t>
             </a:r>
           </a:p>
           <a:p>
-            <a:pPr lvl="2"/>
+            <a:pPr lvl="1"/>
             <a:r>
               <a:rPr/>
               <a:t>쉽고 빠르기 때문에 인력 부담 적음</a:t>
             </a:r>
           </a:p>
           <a:p>
-            <a:pPr lvl="1"/>
+            <a:pPr lvl="0"/>
             <a:r>
               <a:rPr/>
               <a:t>서비스 측면:</a:t>
             </a:r>
           </a:p>
           <a:p>
-            <a:pPr lvl="2"/>
+            <a:pPr lvl="1"/>
             <a:r>
               <a:rPr/>
               <a:t>작은 서비스인 경우 인프라 구축에 대한 유지비용이 적음</a:t>
             </a:r>
           </a:p>
           <a:p>
+            <a:pPr lvl="0" indent="0" marL="0">
+              <a:spcBef>
+                <a:spcPts val="3000"/>
+              </a:spcBef>
+              <a:buNone/>
+            </a:pPr>
+            <a:r>
+              <a:rPr b="1"/>
+              <a:t>1인 창업</a:t>
+            </a:r>
+          </a:p>
+          <a:p>
             <a:pPr lvl="0"/>
-            <a:r>
-              <a:rPr/>
-              <a:t>1인 창업</a:t>
-            </a:r>
-          </a:p>
-          <a:p>
-            <a:pPr lvl="1"/>
             <a:r>
               <a:rPr/>
               <a:t>많은 인력이 필요치 않기에 혼자서도 MVP 등의 제작을 통해 PMF 검증 가능</a:t>
             </a:r>
           </a:p>
           <a:p>
-            <a:pPr lvl="2"/>
+            <a:pPr lvl="1"/>
             <a:r>
               <a:rPr/>
               <a:t>Product-Market Fit</a:t>
@@ -7190,7 +7200,7 @@
                                         <p:tgtEl>
                                           <p:spTgt spid="3">
                                             <p:txEl>
-                                              <p:pRg st="0" end="0"/>
+                                              <p:pRg st="1" end="1"/>
                                             </p:txEl>
                                           </p:spTgt>
                                         </p:tgtEl>
@@ -7239,7 +7249,7 @@
                                         <p:tgtEl>
                                           <p:spTgt spid="3">
                                             <p:txEl>
-                                              <p:pRg st="1" end="1"/>
+                                              <p:pRg st="2" end="2"/>
                                             </p:txEl>
                                           </p:spTgt>
                                         </p:tgtEl>
@@ -7288,7 +7298,7 @@
                                         <p:tgtEl>
                                           <p:spTgt spid="3">
                                             <p:txEl>
-                                              <p:pRg st="2" end="2"/>
+                                              <p:pRg st="3" end="3"/>
                                             </p:txEl>
                                           </p:spTgt>
                                         </p:tgtEl>
@@ -7337,7 +7347,7 @@
                                         <p:tgtEl>
                                           <p:spTgt spid="3">
                                             <p:txEl>
-                                              <p:pRg st="3" end="3"/>
+                                              <p:pRg st="4" end="4"/>
                                             </p:txEl>
                                           </p:spTgt>
                                         </p:tgtEl>
@@ -7386,7 +7396,7 @@
                                         <p:tgtEl>
                                           <p:spTgt spid="3">
                                             <p:txEl>
-                                              <p:pRg st="4" end="4"/>
+                                              <p:pRg st="6" end="6"/>
                                             </p:txEl>
                                           </p:spTgt>
                                         </p:tgtEl>
@@ -7428,104 +7438,6 @@
                                     <p:set>
                                       <p:cBhvr>
                                         <p:cTn id="26" dur="1" fill="hold">
-                                          <p:stCondLst>
-                                            <p:cond delay="0"/>
-                                          </p:stCondLst>
-                                        </p:cTn>
-                                        <p:tgtEl>
-                                          <p:spTgt spid="3">
-                                            <p:txEl>
-                                              <p:pRg st="5" end="5"/>
-                                            </p:txEl>
-                                          </p:spTgt>
-                                        </p:tgtEl>
-                                        <p:attrNameLst>
-                                          <p:attrName>style.visibility</p:attrName>
-                                        </p:attrNameLst>
-                                      </p:cBhvr>
-                                      <p:to>
-                                        <p:strVal val="visible"/>
-                                      </p:to>
-                                    </p:set>
-                                  </p:childTnLst>
-                                </p:cTn>
-                              </p:par>
-                            </p:childTnLst>
-                          </p:cTn>
-                        </p:par>
-                      </p:childTnLst>
-                    </p:cTn>
-                  </p:par>
-                  <p:par>
-                    <p:cTn id="27" fill="hold">
-                      <p:stCondLst>
-                        <p:cond delay="indefinite"/>
-                      </p:stCondLst>
-                      <p:childTnLst>
-                        <p:par>
-                          <p:cTn id="28" fill="hold">
-                            <p:stCondLst>
-                              <p:cond delay="0"/>
-                            </p:stCondLst>
-                            <p:childTnLst>
-                              <p:par>
-                                <p:cTn id="29" presetID="1" presetClass="entr" presetSubtype="0" fill="hold" grpId="0" nodeType="clickEffect">
-                                  <p:stCondLst>
-                                    <p:cond delay="0"/>
-                                  </p:stCondLst>
-                                  <p:childTnLst>
-                                    <p:set>
-                                      <p:cBhvr>
-                                        <p:cTn id="30" dur="1" fill="hold">
-                                          <p:stCondLst>
-                                            <p:cond delay="0"/>
-                                          </p:stCondLst>
-                                        </p:cTn>
-                                        <p:tgtEl>
-                                          <p:spTgt spid="3">
-                                            <p:txEl>
-                                              <p:pRg st="6" end="6"/>
-                                            </p:txEl>
-                                          </p:spTgt>
-                                        </p:tgtEl>
-                                        <p:attrNameLst>
-                                          <p:attrName>style.visibility</p:attrName>
-                                        </p:attrNameLst>
-                                      </p:cBhvr>
-                                      <p:to>
-                                        <p:strVal val="visible"/>
-                                      </p:to>
-                                    </p:set>
-                                  </p:childTnLst>
-                                </p:cTn>
-                              </p:par>
-                            </p:childTnLst>
-                          </p:cTn>
-                        </p:par>
-                      </p:childTnLst>
-                    </p:cTn>
-                  </p:par>
-                  <p:par>
-                    <p:cTn id="31" fill="hold">
-                      <p:stCondLst>
-                        <p:cond delay="indefinite"/>
-                      </p:stCondLst>
-                      <p:childTnLst>
-                        <p:par>
-                          <p:cTn id="32" fill="hold">
-                            <p:stCondLst>
-                              <p:cond delay="0"/>
-                            </p:stCondLst>
-                            <p:childTnLst>
-                              <p:par>
-                                <p:cTn id="33" presetID="1" presetClass="entr" presetSubtype="0" fill="hold" grpId="0" nodeType="clickEffect">
-                                  <p:stCondLst>
-                                    <p:cond delay="0"/>
-                                  </p:stCondLst>
-                                  <p:childTnLst>
-                                    <p:set>
-                                      <p:cBhvr>
-                                        <p:cTn id="34" dur="1" fill="hold">
                                           <p:stCondLst>
                                             <p:cond delay="0"/>
                                           </p:stCondLst>
@@ -7639,70 +7551,85 @@
           <a:bodyPr/>
           <a:lstStyle/>
           <a:p>
+            <a:pPr lvl="0" indent="0" marL="0">
+              <a:spcBef>
+                <a:spcPts val="3000"/>
+              </a:spcBef>
+              <a:buNone/>
+            </a:pPr>
+            <a:r>
+              <a:rPr b="1"/>
+              <a:t>느리다.</a:t>
+            </a:r>
+          </a:p>
+          <a:p>
             <a:pPr lvl="0"/>
-            <a:r>
-              <a:rPr/>
-              <a:t>느리다.</a:t>
-            </a:r>
-          </a:p>
-          <a:p>
-            <a:pPr lvl="1"/>
             <a:r>
               <a:rPr/>
               <a:t>대체로 노코드 프로덕트 구동을 위한 상위 레이어 기술을 필요로 하므로 순수 코드로 작성된 앱보다 느릴 수 있음.</a:t>
             </a:r>
           </a:p>
           <a:p>
-            <a:pPr lvl="1"/>
+            <a:pPr lvl="0"/>
             <a:r>
               <a:rPr/>
               <a:t>느리고 로직을 최적화하기 어렵기 때문에 대용량 처리에 불리함</a:t>
             </a:r>
           </a:p>
           <a:p>
+            <a:pPr lvl="0" indent="0" marL="0">
+              <a:spcBef>
+                <a:spcPts val="3000"/>
+              </a:spcBef>
+              <a:buNone/>
+            </a:pPr>
+            <a:r>
+              <a:rPr b="1"/>
+              <a:t>확장이 어렵다.</a:t>
+            </a:r>
+          </a:p>
+          <a:p>
             <a:pPr lvl="0"/>
-            <a:r>
-              <a:rPr/>
-              <a:t>확장이 어렵다.</a:t>
-            </a:r>
-          </a:p>
-          <a:p>
-            <a:pPr lvl="1"/>
             <a:r>
               <a:rPr/>
               <a:t>제품의 검증 후 사용자가 늘어나거나 트래픽이 늘어나서 확장이 필요한 경우 구조 변경이나 기능 확장이 제한됨</a:t>
             </a:r>
           </a:p>
           <a:p>
-            <a:pPr lvl="2"/>
+            <a:pPr lvl="1"/>
             <a:r>
               <a:rPr/>
               <a:t>규칙(컨벤션)을 잘 지켜서 만들어야 한다.</a:t>
             </a:r>
           </a:p>
           <a:p>
+            <a:pPr lvl="0" indent="0" marL="0">
+              <a:spcBef>
+                <a:spcPts val="3000"/>
+              </a:spcBef>
+              <a:buNone/>
+            </a:pPr>
+            <a:r>
+              <a:rPr b="1"/>
+              <a:t>코딩에 비해 제한된 기능</a:t>
+            </a:r>
+          </a:p>
+          <a:p>
             <a:pPr lvl="0"/>
-            <a:r>
-              <a:rPr/>
-              <a:t>코딩에 비해 제한된 기능</a:t>
-            </a:r>
-          </a:p>
-          <a:p>
-            <a:pPr lvl="1"/>
             <a:r>
               <a:rPr/>
               <a:t>마음껏 코드를 사용해 기능을 구현할 수 있는 것에 비해, 기능이 제한되고 타협해야하는 필요 있음.</a:t>
             </a:r>
           </a:p>
           <a:p>
-            <a:pPr lvl="2"/>
+            <a:pPr lvl="1"/>
             <a:r>
               <a:rPr/>
               <a:t>와 이게 돼?</a:t>
             </a:r>
           </a:p>
           <a:p>
-            <a:pPr lvl="2"/>
+            <a:pPr lvl="1"/>
             <a:r>
               <a:rPr/>
               <a:t>와 이게 안돼?</a:t>
@@ -7748,7 +7675,7 @@
                                         <p:tgtEl>
                                           <p:spTgt spid="3">
                                             <p:txEl>
-                                              <p:pRg st="0" end="0"/>
+                                              <p:pRg st="1" end="1"/>
                                             </p:txEl>
                                           </p:spTgt>
                                         </p:tgtEl>
@@ -7797,7 +7724,7 @@
                                         <p:tgtEl>
                                           <p:spTgt spid="3">
                                             <p:txEl>
-                                              <p:pRg st="1" end="1"/>
+                                              <p:pRg st="2" end="2"/>
                                             </p:txEl>
                                           </p:spTgt>
                                         </p:tgtEl>
@@ -7846,7 +7773,7 @@
                                         <p:tgtEl>
                                           <p:spTgt spid="3">
                                             <p:txEl>
-                                              <p:pRg st="2" end="2"/>
+                                              <p:pRg st="4" end="4"/>
                                             </p:txEl>
                                           </p:spTgt>
                                         </p:tgtEl>
@@ -7895,7 +7822,7 @@
                                         <p:tgtEl>
                                           <p:spTgt spid="3">
                                             <p:txEl>
-                                              <p:pRg st="3" end="3"/>
+                                              <p:pRg st="5" end="5"/>
                                             </p:txEl>
                                           </p:spTgt>
                                         </p:tgtEl>
@@ -7944,7 +7871,7 @@
                                         <p:tgtEl>
                                           <p:spTgt spid="3">
                                             <p:txEl>
-                                              <p:pRg st="4" end="4"/>
+                                              <p:pRg st="7" end="7"/>
                                             </p:txEl>
                                           </p:spTgt>
                                         </p:tgtEl>
@@ -7993,7 +7920,7 @@
                                         <p:tgtEl>
                                           <p:spTgt spid="3">
                                             <p:txEl>
-                                              <p:pRg st="5" end="5"/>
+                                              <p:pRg st="8" end="8"/>
                                             </p:txEl>
                                           </p:spTgt>
                                         </p:tgtEl>
@@ -8035,153 +7962,6 @@
                                     <p:set>
                                       <p:cBhvr>
                                         <p:cTn id="30" dur="1" fill="hold">
-                                          <p:stCondLst>
-                                            <p:cond delay="0"/>
-                                          </p:stCondLst>
-                                        </p:cTn>
-                                        <p:tgtEl>
-                                          <p:spTgt spid="3">
-                                            <p:txEl>
-                                              <p:pRg st="6" end="6"/>
-                                            </p:txEl>
-                                          </p:spTgt>
-                                        </p:tgtEl>
-                                        <p:attrNameLst>
-                                          <p:attrName>style.visibility</p:attrName>
-                                        </p:attrNameLst>
-                                      </p:cBhvr>
-                                      <p:to>
-                                        <p:strVal val="visible"/>
-                                      </p:to>
-                                    </p:set>
-                                  </p:childTnLst>
-                                </p:cTn>
-                              </p:par>
-                            </p:childTnLst>
-                          </p:cTn>
-                        </p:par>
-                      </p:childTnLst>
-                    </p:cTn>
-                  </p:par>
-                  <p:par>
-                    <p:cTn id="31" fill="hold">
-                      <p:stCondLst>
-                        <p:cond delay="indefinite"/>
-                      </p:stCondLst>
-                      <p:childTnLst>
-                        <p:par>
-                          <p:cTn id="32" fill="hold">
-                            <p:stCondLst>
-                              <p:cond delay="0"/>
-                            </p:stCondLst>
-                            <p:childTnLst>
-                              <p:par>
-                                <p:cTn id="33" presetID="1" presetClass="entr" presetSubtype="0" fill="hold" grpId="0" nodeType="clickEffect">
-                                  <p:stCondLst>
-                                    <p:cond delay="0"/>
-                                  </p:stCondLst>
-                                  <p:childTnLst>
-                                    <p:set>
-                                      <p:cBhvr>
-                                        <p:cTn id="34" dur="1" fill="hold">
-                                          <p:stCondLst>
-                                            <p:cond delay="0"/>
-                                          </p:stCondLst>
-                                        </p:cTn>
-                                        <p:tgtEl>
-                                          <p:spTgt spid="3">
-                                            <p:txEl>
-                                              <p:pRg st="7" end="7"/>
-                                            </p:txEl>
-                                          </p:spTgt>
-                                        </p:tgtEl>
-                                        <p:attrNameLst>
-                                          <p:attrName>style.visibility</p:attrName>
-                                        </p:attrNameLst>
-                                      </p:cBhvr>
-                                      <p:to>
-                                        <p:strVal val="visible"/>
-                                      </p:to>
-                                    </p:set>
-                                  </p:childTnLst>
-                                </p:cTn>
-                              </p:par>
-                            </p:childTnLst>
-                          </p:cTn>
-                        </p:par>
-                      </p:childTnLst>
-                    </p:cTn>
-                  </p:par>
-                  <p:par>
-                    <p:cTn id="35" fill="hold">
-                      <p:stCondLst>
-                        <p:cond delay="indefinite"/>
-                      </p:stCondLst>
-                      <p:childTnLst>
-                        <p:par>
-                          <p:cTn id="36" fill="hold">
-                            <p:stCondLst>
-                              <p:cond delay="0"/>
-                            </p:stCondLst>
-                            <p:childTnLst>
-                              <p:par>
-                                <p:cTn id="37" presetID="1" presetClass="entr" presetSubtype="0" fill="hold" grpId="0" nodeType="clickEffect">
-                                  <p:stCondLst>
-                                    <p:cond delay="0"/>
-                                  </p:stCondLst>
-                                  <p:childTnLst>
-                                    <p:set>
-                                      <p:cBhvr>
-                                        <p:cTn id="38" dur="1" fill="hold">
-                                          <p:stCondLst>
-                                            <p:cond delay="0"/>
-                                          </p:stCondLst>
-                                        </p:cTn>
-                                        <p:tgtEl>
-                                          <p:spTgt spid="3">
-                                            <p:txEl>
-                                              <p:pRg st="8" end="8"/>
-                                            </p:txEl>
-                                          </p:spTgt>
-                                        </p:tgtEl>
-                                        <p:attrNameLst>
-                                          <p:attrName>style.visibility</p:attrName>
-                                        </p:attrNameLst>
-                                      </p:cBhvr>
-                                      <p:to>
-                                        <p:strVal val="visible"/>
-                                      </p:to>
-                                    </p:set>
-                                  </p:childTnLst>
-                                </p:cTn>
-                              </p:par>
-                            </p:childTnLst>
-                          </p:cTn>
-                        </p:par>
-                      </p:childTnLst>
-                    </p:cTn>
-                  </p:par>
-                  <p:par>
-                    <p:cTn id="39" fill="hold">
-                      <p:stCondLst>
-                        <p:cond delay="indefinite"/>
-                      </p:stCondLst>
-                      <p:childTnLst>
-                        <p:par>
-                          <p:cTn id="40" fill="hold">
-                            <p:stCondLst>
-                              <p:cond delay="0"/>
-                            </p:stCondLst>
-                            <p:childTnLst>
-                              <p:par>
-                                <p:cTn id="41" presetID="1" presetClass="entr" presetSubtype="0" fill="hold" grpId="0" nodeType="clickEffect">
-                                  <p:stCondLst>
-                                    <p:cond delay="0"/>
-                                  </p:stCondLst>
-                                  <p:childTnLst>
-                                    <p:set>
-                                      <p:cBhvr>
-                                        <p:cTn id="42" dur="1" fill="hold">
                                           <p:stCondLst>
                                             <p:cond delay="0"/>
                                           </p:stCondLst>
@@ -8295,49 +8075,64 @@
           <a:bodyPr/>
           <a:lstStyle/>
           <a:p>
+            <a:pPr lvl="0" indent="0" marL="0">
+              <a:spcBef>
+                <a:spcPts val="3000"/>
+              </a:spcBef>
+              <a:buNone/>
+            </a:pPr>
+            <a:r>
+              <a:rPr b="1"/>
+              <a:t>생성형 AI의 출현은 컴퓨터에게 ’대답을 하는 능력’을 준 것이라고 볼 수 있음</a:t>
+            </a:r>
+          </a:p>
+          <a:p>
             <a:pPr lvl="0"/>
-            <a:r>
-              <a:rPr/>
-              <a:t>생성형 AI의 출현은 컴퓨터에게 ’대답을 하는 능력’을 준 것이라고 볼 수 있음</a:t>
-            </a:r>
-          </a:p>
-          <a:p>
-            <a:pPr lvl="1"/>
             <a:r>
               <a:rPr/>
               <a:t>사람이 직접적으로 컴퓨터에게 명령을 하는 것에서 컴퓨터에게 목적을 말하는 형태로 이행해갈 것.</a:t>
             </a:r>
           </a:p>
           <a:p>
+            <a:pPr lvl="0" indent="0" marL="0">
+              <a:spcBef>
+                <a:spcPts val="3000"/>
+              </a:spcBef>
+              <a:buNone/>
+            </a:pPr>
+            <a:r>
+              <a:rPr b="1"/>
+              <a:t>강인공지능 (스스로 코딩하는 인공지능)으로 가기 위한 중단단계로서의 노코드.</a:t>
+            </a:r>
+          </a:p>
+          <a:p>
             <a:pPr lvl="0"/>
-            <a:r>
-              <a:rPr/>
-              <a:t>강인공지능 (스스로 코딩하는 인공지능)으로 가기 위한 중단단계로서의 노코드.</a:t>
-            </a:r>
-          </a:p>
-          <a:p>
-            <a:pPr lvl="1"/>
             <a:r>
               <a:rPr/>
               <a:t>현재는 약 인공지능과 노 코드 툴로 사람이 직접 필요한 기능을 개발하는 과도기에 있음.</a:t>
             </a:r>
           </a:p>
           <a:p>
+            <a:pPr lvl="0" indent="0" marL="0">
+              <a:spcBef>
+                <a:spcPts val="3000"/>
+              </a:spcBef>
+              <a:buNone/>
+            </a:pPr>
+            <a:r>
+              <a:rPr b="1"/>
+              <a:t>강인공지능이 대중화되었을 때, 그 땐 앱이라는 게 존재할까?</a:t>
+            </a:r>
+          </a:p>
+          <a:p>
             <a:pPr lvl="0"/>
-            <a:r>
-              <a:rPr/>
-              <a:t>강인공지능이 대중화되었을 때, 그 땐 앱이라는 게 존재할까?</a:t>
-            </a:r>
-          </a:p>
-          <a:p>
-            <a:pPr lvl="1"/>
             <a:r>
               <a:rPr/>
               <a:t>애플리케이션, 웹 사이트 등의 인터페이스는 사람이 쓰기 위한 것. 사용자가 직접 서비스에 접근하지 않고 비서 형태의 AI가 스스로 사람을 위한 해결책을 구상하고 실행하는 시대가 오면, 애플리케이션이나 웹 사이트 등의 필요도 없어질 가능성이 큼.</a:t>
             </a:r>
           </a:p>
           <a:p>
-            <a:pPr lvl="1"/>
+            <a:pPr lvl="0"/>
             <a:r>
               <a:rPr/>
               <a:t>물론 사람이 직접 개발할 일도 없어질 것</a:t>
@@ -8383,7 +8178,7 @@
                                         <p:tgtEl>
                                           <p:spTgt spid="3">
                                             <p:txEl>
-                                              <p:pRg st="0" end="0"/>
+                                              <p:pRg st="1" end="1"/>
                                             </p:txEl>
                                           </p:spTgt>
                                         </p:tgtEl>
@@ -8432,7 +8227,7 @@
                                         <p:tgtEl>
                                           <p:spTgt spid="3">
                                             <p:txEl>
-                                              <p:pRg st="1" end="1"/>
+                                              <p:pRg st="3" end="3"/>
                                             </p:txEl>
                                           </p:spTgt>
                                         </p:tgtEl>
@@ -8481,7 +8276,7 @@
                                         <p:tgtEl>
                                           <p:spTgt spid="3">
                                             <p:txEl>
-                                              <p:pRg st="2" end="2"/>
+                                              <p:pRg st="5" end="5"/>
                                             </p:txEl>
                                           </p:spTgt>
                                         </p:tgtEl>
@@ -8523,153 +8318,6 @@
                                     <p:set>
                                       <p:cBhvr>
                                         <p:cTn id="18" dur="1" fill="hold">
-                                          <p:stCondLst>
-                                            <p:cond delay="0"/>
-                                          </p:stCondLst>
-                                        </p:cTn>
-                                        <p:tgtEl>
-                                          <p:spTgt spid="3">
-                                            <p:txEl>
-                                              <p:pRg st="3" end="3"/>
-                                            </p:txEl>
-                                          </p:spTgt>
-                                        </p:tgtEl>
-                                        <p:attrNameLst>
-                                          <p:attrName>style.visibility</p:attrName>
-                                        </p:attrNameLst>
-                                      </p:cBhvr>
-                                      <p:to>
-                                        <p:strVal val="visible"/>
-                                      </p:to>
-                                    </p:set>
-                                  </p:childTnLst>
-                                </p:cTn>
-                              </p:par>
-                            </p:childTnLst>
-                          </p:cTn>
-                        </p:par>
-                      </p:childTnLst>
-                    </p:cTn>
-                  </p:par>
-                  <p:par>
-                    <p:cTn id="19" fill="hold">
-                      <p:stCondLst>
-                        <p:cond delay="indefinite"/>
-                      </p:stCondLst>
-                      <p:childTnLst>
-                        <p:par>
-                          <p:cTn id="20" fill="hold">
-                            <p:stCondLst>
-                              <p:cond delay="0"/>
-                            </p:stCondLst>
-                            <p:childTnLst>
-                              <p:par>
-                                <p:cTn id="21" presetID="1" presetClass="entr" presetSubtype="0" fill="hold" grpId="0" nodeType="clickEffect">
-                                  <p:stCondLst>
-                                    <p:cond delay="0"/>
-                                  </p:stCondLst>
-                                  <p:childTnLst>
-                                    <p:set>
-                                      <p:cBhvr>
-                                        <p:cTn id="22" dur="1" fill="hold">
-                                          <p:stCondLst>
-                                            <p:cond delay="0"/>
-                                          </p:stCondLst>
-                                        </p:cTn>
-                                        <p:tgtEl>
-                                          <p:spTgt spid="3">
-                                            <p:txEl>
-                                              <p:pRg st="4" end="4"/>
-                                            </p:txEl>
-                                          </p:spTgt>
-                                        </p:tgtEl>
-                                        <p:attrNameLst>
-                                          <p:attrName>style.visibility</p:attrName>
-                                        </p:attrNameLst>
-                                      </p:cBhvr>
-                                      <p:to>
-                                        <p:strVal val="visible"/>
-                                      </p:to>
-                                    </p:set>
-                                  </p:childTnLst>
-                                </p:cTn>
-                              </p:par>
-                            </p:childTnLst>
-                          </p:cTn>
-                        </p:par>
-                      </p:childTnLst>
-                    </p:cTn>
-                  </p:par>
-                  <p:par>
-                    <p:cTn id="23" fill="hold">
-                      <p:stCondLst>
-                        <p:cond delay="indefinite"/>
-                      </p:stCondLst>
-                      <p:childTnLst>
-                        <p:par>
-                          <p:cTn id="24" fill="hold">
-                            <p:stCondLst>
-                              <p:cond delay="0"/>
-                            </p:stCondLst>
-                            <p:childTnLst>
-                              <p:par>
-                                <p:cTn id="25" presetID="1" presetClass="entr" presetSubtype="0" fill="hold" grpId="0" nodeType="clickEffect">
-                                  <p:stCondLst>
-                                    <p:cond delay="0"/>
-                                  </p:stCondLst>
-                                  <p:childTnLst>
-                                    <p:set>
-                                      <p:cBhvr>
-                                        <p:cTn id="26" dur="1" fill="hold">
-                                          <p:stCondLst>
-                                            <p:cond delay="0"/>
-                                          </p:stCondLst>
-                                        </p:cTn>
-                                        <p:tgtEl>
-                                          <p:spTgt spid="3">
-                                            <p:txEl>
-                                              <p:pRg st="5" end="5"/>
-                                            </p:txEl>
-                                          </p:spTgt>
-                                        </p:tgtEl>
-                                        <p:attrNameLst>
-                                          <p:attrName>style.visibility</p:attrName>
-                                        </p:attrNameLst>
-                                      </p:cBhvr>
-                                      <p:to>
-                                        <p:strVal val="visible"/>
-                                      </p:to>
-                                    </p:set>
-                                  </p:childTnLst>
-                                </p:cTn>
-                              </p:par>
-                            </p:childTnLst>
-                          </p:cTn>
-                        </p:par>
-                      </p:childTnLst>
-                    </p:cTn>
-                  </p:par>
-                  <p:par>
-                    <p:cTn id="27" fill="hold">
-                      <p:stCondLst>
-                        <p:cond delay="indefinite"/>
-                      </p:stCondLst>
-                      <p:childTnLst>
-                        <p:par>
-                          <p:cTn id="28" fill="hold">
-                            <p:stCondLst>
-                              <p:cond delay="0"/>
-                            </p:stCondLst>
-                            <p:childTnLst>
-                              <p:par>
-                                <p:cTn id="29" presetID="1" presetClass="entr" presetSubtype="0" fill="hold" grpId="0" nodeType="clickEffect">
-                                  <p:stCondLst>
-                                    <p:cond delay="0"/>
-                                  </p:stCondLst>
-                                  <p:childTnLst>
-                                    <p:set>
-                                      <p:cBhvr>
-                                        <p:cTn id="30" dur="1" fill="hold">
                                           <p:stCondLst>
                                             <p:cond delay="0"/>
                                           </p:stCondLst>

</xml_diff>

<commit_message>
백업 완료: 2023-11-25 03:46:04
Affected files:
.obsidian/appearance.json
.obsidian/workspace.json
노코드 엔지니어링/노션으로 랜딩페이지 만들기.md
노코드 엔지니어링/노션으로 랜딩페이지 만들기.pptx
노코드 엔지니어링/노코드 개론.md
노코드 엔지니어링/노코드 개론.pptx
</commit_message>
<xml_diff>
--- a/노코드 엔지니어링/노코드 개론.pptx
+++ b/노코드 엔지니어링/노코드 개론.pptx
@@ -3802,28 +3802,33 @@
           <a:bodyPr/>
           <a:lstStyle/>
           <a:p>
+            <a:pPr lvl="0" indent="0" marL="0">
+              <a:spcBef>
+                <a:spcPts val="3000"/>
+              </a:spcBef>
+              <a:buNone/>
+            </a:pPr>
+            <a:r>
+              <a:rPr b="1"/>
+              <a:t>코로나 이후의 변화</a:t>
+            </a:r>
+          </a:p>
+          <a:p>
             <a:pPr lvl="0"/>
-            <a:r>
-              <a:rPr/>
-              <a:t>코로나 이후의 변화</a:t>
-            </a:r>
-          </a:p>
-          <a:p>
-            <a:pPr lvl="1"/>
             <a:r>
               <a:rPr/>
               <a:t>개발비용 증가</a:t>
             </a:r>
           </a:p>
           <a:p>
-            <a:pPr lvl="1"/>
+            <a:pPr lvl="0"/>
             <a:r>
               <a:rPr/>
               <a:t>온라인 의존도 높아짐</a:t>
             </a:r>
           </a:p>
           <a:p>
-            <a:pPr lvl="2"/>
+            <a:pPr lvl="1"/>
             <a:r>
               <a:rPr/>
               <a:t>온라인 커뮤니티의 부상</a:t>
@@ -3837,7 +3842,7 @@
             </a:r>
           </a:p>
           <a:p>
-            <a:pPr lvl="3"/>
+            <a:pPr lvl="2"/>
             <a:r>
               <a:rPr/>
               <a:t>작은 규모의 인터넷 커뮤니티를 만들기 위한 노코드</a:t>
@@ -3883,7 +3888,7 @@
                                         <p:tgtEl>
                                           <p:spTgt spid="3">
                                             <p:txEl>
-                                              <p:pRg st="0" end="0"/>
+                                              <p:pRg st="1" end="1"/>
                                             </p:txEl>
                                           </p:spTgt>
                                         </p:tgtEl>
@@ -3932,7 +3937,7 @@
                                         <p:tgtEl>
                                           <p:spTgt spid="3">
                                             <p:txEl>
-                                              <p:pRg st="1" end="1"/>
+                                              <p:pRg st="2" end="2"/>
                                             </p:txEl>
                                           </p:spTgt>
                                         </p:tgtEl>
@@ -3981,7 +3986,7 @@
                                         <p:tgtEl>
                                           <p:spTgt spid="3">
                                             <p:txEl>
-                                              <p:pRg st="2" end="2"/>
+                                              <p:pRg st="3" end="3"/>
                                             </p:txEl>
                                           </p:spTgt>
                                         </p:tgtEl>
@@ -4030,7 +4035,7 @@
                                         <p:tgtEl>
                                           <p:spTgt spid="3">
                                             <p:txEl>
-                                              <p:pRg st="3" end="3"/>
+                                              <p:pRg st="4" end="4"/>
                                             </p:txEl>
                                           </p:spTgt>
                                         </p:tgtEl>
@@ -4072,55 +4077,6 @@
                                     <p:set>
                                       <p:cBhvr>
                                         <p:cTn id="22" dur="1" fill="hold">
-                                          <p:stCondLst>
-                                            <p:cond delay="0"/>
-                                          </p:stCondLst>
-                                        </p:cTn>
-                                        <p:tgtEl>
-                                          <p:spTgt spid="3">
-                                            <p:txEl>
-                                              <p:pRg st="4" end="4"/>
-                                            </p:txEl>
-                                          </p:spTgt>
-                                        </p:tgtEl>
-                                        <p:attrNameLst>
-                                          <p:attrName>style.visibility</p:attrName>
-                                        </p:attrNameLst>
-                                      </p:cBhvr>
-                                      <p:to>
-                                        <p:strVal val="visible"/>
-                                      </p:to>
-                                    </p:set>
-                                  </p:childTnLst>
-                                </p:cTn>
-                              </p:par>
-                            </p:childTnLst>
-                          </p:cTn>
-                        </p:par>
-                      </p:childTnLst>
-                    </p:cTn>
-                  </p:par>
-                  <p:par>
-                    <p:cTn id="23" fill="hold">
-                      <p:stCondLst>
-                        <p:cond delay="indefinite"/>
-                      </p:stCondLst>
-                      <p:childTnLst>
-                        <p:par>
-                          <p:cTn id="24" fill="hold">
-                            <p:stCondLst>
-                              <p:cond delay="0"/>
-                            </p:stCondLst>
-                            <p:childTnLst>
-                              <p:par>
-                                <p:cTn id="25" presetID="1" presetClass="entr" presetSubtype="0" fill="hold" grpId="0" nodeType="clickEffect">
-                                  <p:stCondLst>
-                                    <p:cond delay="0"/>
-                                  </p:stCondLst>
-                                  <p:childTnLst>
-                                    <p:set>
-                                      <p:cBhvr>
-                                        <p:cTn id="26" dur="1" fill="hold">
                                           <p:stCondLst>
                                             <p:cond delay="0"/>
                                           </p:stCondLst>
@@ -4234,35 +4190,40 @@
           <a:bodyPr/>
           <a:lstStyle/>
           <a:p>
+            <a:pPr lvl="0" indent="0" marL="0">
+              <a:spcBef>
+                <a:spcPts val="3000"/>
+              </a:spcBef>
+              <a:buNone/>
+            </a:pPr>
+            <a:r>
+              <a:rPr b="1"/>
+              <a:t>브론즈 ~ 골드</a:t>
+            </a:r>
+          </a:p>
+          <a:p>
             <a:pPr lvl="0"/>
-            <a:r>
-              <a:rPr/>
-              <a:t>브론즈 ~ 골드</a:t>
-            </a:r>
-          </a:p>
-          <a:p>
-            <a:pPr lvl="1"/>
             <a:r>
               <a:rPr/>
               <a:t>노션 : 정보 제공 위주의 웹 페이지 제작, 데이터베이스 활용</a:t>
             </a:r>
           </a:p>
           <a:p>
-            <a:pPr lvl="1"/>
+            <a:pPr lvl="0"/>
             <a:r>
               <a:rPr/>
               <a:t>피그마 : 벡터 디자인 및 UI 제작 도구</a:t>
             </a:r>
           </a:p>
           <a:p>
-            <a:pPr lvl="1"/>
+            <a:pPr lvl="0"/>
             <a:r>
               <a:rPr/>
               <a:t>구글 시트 : 스프레드시트 형식으로 데이터를 관리하며, API를 통해 DB로도 활용</a:t>
             </a:r>
           </a:p>
           <a:p>
-            <a:pPr lvl="1"/>
+            <a:pPr lvl="0"/>
             <a:r>
               <a:rPr/>
               <a:t>소프터/글라이드/아임웹 : 초심자도 쓰기 좋은 웹 빌더</a:t>
@@ -4308,7 +4269,7 @@
                                         <p:tgtEl>
                                           <p:spTgt spid="3">
                                             <p:txEl>
-                                              <p:pRg st="0" end="0"/>
+                                              <p:pRg st="1" end="1"/>
                                             </p:txEl>
                                           </p:spTgt>
                                         </p:tgtEl>
@@ -4357,7 +4318,7 @@
                                         <p:tgtEl>
                                           <p:spTgt spid="3">
                                             <p:txEl>
-                                              <p:pRg st="1" end="1"/>
+                                              <p:pRg st="2" end="2"/>
                                             </p:txEl>
                                           </p:spTgt>
                                         </p:tgtEl>
@@ -4406,7 +4367,7 @@
                                         <p:tgtEl>
                                           <p:spTgt spid="3">
                                             <p:txEl>
-                                              <p:pRg st="2" end="2"/>
+                                              <p:pRg st="3" end="3"/>
                                             </p:txEl>
                                           </p:spTgt>
                                         </p:tgtEl>
@@ -4448,55 +4409,6 @@
                                     <p:set>
                                       <p:cBhvr>
                                         <p:cTn id="18" dur="1" fill="hold">
-                                          <p:stCondLst>
-                                            <p:cond delay="0"/>
-                                          </p:stCondLst>
-                                        </p:cTn>
-                                        <p:tgtEl>
-                                          <p:spTgt spid="3">
-                                            <p:txEl>
-                                              <p:pRg st="3" end="3"/>
-                                            </p:txEl>
-                                          </p:spTgt>
-                                        </p:tgtEl>
-                                        <p:attrNameLst>
-                                          <p:attrName>style.visibility</p:attrName>
-                                        </p:attrNameLst>
-                                      </p:cBhvr>
-                                      <p:to>
-                                        <p:strVal val="visible"/>
-                                      </p:to>
-                                    </p:set>
-                                  </p:childTnLst>
-                                </p:cTn>
-                              </p:par>
-                            </p:childTnLst>
-                          </p:cTn>
-                        </p:par>
-                      </p:childTnLst>
-                    </p:cTn>
-                  </p:par>
-                  <p:par>
-                    <p:cTn id="19" fill="hold">
-                      <p:stCondLst>
-                        <p:cond delay="indefinite"/>
-                      </p:stCondLst>
-                      <p:childTnLst>
-                        <p:par>
-                          <p:cTn id="20" fill="hold">
-                            <p:stCondLst>
-                              <p:cond delay="0"/>
-                            </p:stCondLst>
-                            <p:childTnLst>
-                              <p:par>
-                                <p:cTn id="21" presetID="1" presetClass="entr" presetSubtype="0" fill="hold" grpId="0" nodeType="clickEffect">
-                                  <p:stCondLst>
-                                    <p:cond delay="0"/>
-                                  </p:stCondLst>
-                                  <p:childTnLst>
-                                    <p:set>
-                                      <p:cBhvr>
-                                        <p:cTn id="22" dur="1" fill="hold">
                                           <p:stCondLst>
                                             <p:cond delay="0"/>
                                           </p:stCondLst>
@@ -4585,35 +4497,40 @@
           <a:bodyPr/>
           <a:lstStyle/>
           <a:p>
+            <a:pPr lvl="0" indent="0" marL="0">
+              <a:spcBef>
+                <a:spcPts val="3000"/>
+              </a:spcBef>
+              <a:buNone/>
+            </a:pPr>
+            <a:r>
+              <a:rPr b="1"/>
+              <a:t>다이아 ~ 플래티넘</a:t>
+            </a:r>
+          </a:p>
+          <a:p>
             <a:pPr lvl="0"/>
-            <a:r>
-              <a:rPr/>
-              <a:t>다이아 ~ 플래티넘</a:t>
-            </a:r>
-          </a:p>
-          <a:p>
-            <a:pPr lvl="1"/>
             <a:r>
               <a:rPr/>
               <a:t>프레이머: 리액트 컴포넌트를 사용하는 웹페이지 빌더. 코드 사용 가능(Low-code)</a:t>
             </a:r>
           </a:p>
           <a:p>
-            <a:pPr lvl="1"/>
+            <a:pPr lvl="0"/>
             <a:r>
               <a:rPr/>
               <a:t>웹플로우: Code export를 지원하는 노코드 웹 빌더</a:t>
             </a:r>
           </a:p>
           <a:p>
-            <a:pPr lvl="1"/>
+            <a:pPr lvl="0"/>
             <a:r>
               <a:rPr/>
               <a:t>에어테이블: 스프레드시트와 같은 테이블 데이터를 기록/관리.</a:t>
             </a:r>
           </a:p>
           <a:p>
-            <a:pPr lvl="1"/>
+            <a:pPr lvl="0"/>
             <a:r>
               <a:rPr/>
               <a:t>재피어: 업무 자동화와 백엔드 기능을 구현할 수 있는 노코드 도구</a:t>
@@ -4659,7 +4576,7 @@
                                         <p:tgtEl>
                                           <p:spTgt spid="3">
                                             <p:txEl>
-                                              <p:pRg st="0" end="0"/>
+                                              <p:pRg st="1" end="1"/>
                                             </p:txEl>
                                           </p:spTgt>
                                         </p:tgtEl>
@@ -4708,7 +4625,7 @@
                                         <p:tgtEl>
                                           <p:spTgt spid="3">
                                             <p:txEl>
-                                              <p:pRg st="1" end="1"/>
+                                              <p:pRg st="2" end="2"/>
                                             </p:txEl>
                                           </p:spTgt>
                                         </p:tgtEl>
@@ -4757,7 +4674,7 @@
                                         <p:tgtEl>
                                           <p:spTgt spid="3">
                                             <p:txEl>
-                                              <p:pRg st="2" end="2"/>
+                                              <p:pRg st="3" end="3"/>
                                             </p:txEl>
                                           </p:spTgt>
                                         </p:tgtEl>
@@ -4799,55 +4716,6 @@
                                     <p:set>
                                       <p:cBhvr>
                                         <p:cTn id="18" dur="1" fill="hold">
-                                          <p:stCondLst>
-                                            <p:cond delay="0"/>
-                                          </p:stCondLst>
-                                        </p:cTn>
-                                        <p:tgtEl>
-                                          <p:spTgt spid="3">
-                                            <p:txEl>
-                                              <p:pRg st="3" end="3"/>
-                                            </p:txEl>
-                                          </p:spTgt>
-                                        </p:tgtEl>
-                                        <p:attrNameLst>
-                                          <p:attrName>style.visibility</p:attrName>
-                                        </p:attrNameLst>
-                                      </p:cBhvr>
-                                      <p:to>
-                                        <p:strVal val="visible"/>
-                                      </p:to>
-                                    </p:set>
-                                  </p:childTnLst>
-                                </p:cTn>
-                              </p:par>
-                            </p:childTnLst>
-                          </p:cTn>
-                        </p:par>
-                      </p:childTnLst>
-                    </p:cTn>
-                  </p:par>
-                  <p:par>
-                    <p:cTn id="19" fill="hold">
-                      <p:stCondLst>
-                        <p:cond delay="indefinite"/>
-                      </p:stCondLst>
-                      <p:childTnLst>
-                        <p:par>
-                          <p:cTn id="20" fill="hold">
-                            <p:stCondLst>
-                              <p:cond delay="0"/>
-                            </p:stCondLst>
-                            <p:childTnLst>
-                              <p:par>
-                                <p:cTn id="21" presetID="1" presetClass="entr" presetSubtype="0" fill="hold" grpId="0" nodeType="clickEffect">
-                                  <p:stCondLst>
-                                    <p:cond delay="0"/>
-                                  </p:stCondLst>
-                                  <p:childTnLst>
-                                    <p:set>
-                                      <p:cBhvr>
-                                        <p:cTn id="22" dur="1" fill="hold">
                                           <p:stCondLst>
                                             <p:cond delay="0"/>
                                           </p:stCondLst>
@@ -4936,28 +4804,33 @@
           <a:bodyPr/>
           <a:lstStyle/>
           <a:p>
+            <a:pPr lvl="0" indent="0" marL="0">
+              <a:spcBef>
+                <a:spcPts val="3000"/>
+              </a:spcBef>
+              <a:buNone/>
+            </a:pPr>
+            <a:r>
+              <a:rPr b="1"/>
+              <a:t>마스터</a:t>
+            </a:r>
+          </a:p>
+          <a:p>
             <a:pPr lvl="0"/>
-            <a:r>
-              <a:rPr/>
-              <a:t>마스터</a:t>
-            </a:r>
-          </a:p>
-          <a:p>
-            <a:pPr lvl="1"/>
             <a:r>
               <a:rPr/>
               <a:t>버블: 프론트엔드/백엔드/DB를 모두 가진 전천후 웹 애플리케이션 빌더</a:t>
             </a:r>
           </a:p>
           <a:p>
-            <a:pPr lvl="1"/>
+            <a:pPr lvl="0"/>
             <a:r>
               <a:rPr/>
               <a:t>플러터 플로우: 플러터(Flutter) 기반의 노코드 도구. 코드 사용가능(Low-code)</a:t>
             </a:r>
           </a:p>
           <a:p>
-            <a:pPr lvl="1"/>
+            <a:pPr lvl="0"/>
             <a:r>
               <a:rPr/>
               <a:t>싱크트리: 블록코딩형 백엔드 노코드 도구</a:t>
@@ -5003,7 +4876,7 @@
                                         <p:tgtEl>
                                           <p:spTgt spid="3">
                                             <p:txEl>
-                                              <p:pRg st="0" end="0"/>
+                                              <p:pRg st="1" end="1"/>
                                             </p:txEl>
                                           </p:spTgt>
                                         </p:tgtEl>
@@ -5052,7 +4925,7 @@
                                         <p:tgtEl>
                                           <p:spTgt spid="3">
                                             <p:txEl>
-                                              <p:pRg st="1" end="1"/>
+                                              <p:pRg st="2" end="2"/>
                                             </p:txEl>
                                           </p:spTgt>
                                         </p:tgtEl>
@@ -5094,55 +4967,6 @@
                                     <p:set>
                                       <p:cBhvr>
                                         <p:cTn id="14" dur="1" fill="hold">
-                                          <p:stCondLst>
-                                            <p:cond delay="0"/>
-                                          </p:stCondLst>
-                                        </p:cTn>
-                                        <p:tgtEl>
-                                          <p:spTgt spid="3">
-                                            <p:txEl>
-                                              <p:pRg st="2" end="2"/>
-                                            </p:txEl>
-                                          </p:spTgt>
-                                        </p:tgtEl>
-                                        <p:attrNameLst>
-                                          <p:attrName>style.visibility</p:attrName>
-                                        </p:attrNameLst>
-                                      </p:cBhvr>
-                                      <p:to>
-                                        <p:strVal val="visible"/>
-                                      </p:to>
-                                    </p:set>
-                                  </p:childTnLst>
-                                </p:cTn>
-                              </p:par>
-                            </p:childTnLst>
-                          </p:cTn>
-                        </p:par>
-                      </p:childTnLst>
-                    </p:cTn>
-                  </p:par>
-                  <p:par>
-                    <p:cTn id="15" fill="hold">
-                      <p:stCondLst>
-                        <p:cond delay="indefinite"/>
-                      </p:stCondLst>
-                      <p:childTnLst>
-                        <p:par>
-                          <p:cTn id="16" fill="hold">
-                            <p:stCondLst>
-                              <p:cond delay="0"/>
-                            </p:stCondLst>
-                            <p:childTnLst>
-                              <p:par>
-                                <p:cTn id="17" presetID="1" presetClass="entr" presetSubtype="0" fill="hold" grpId="0" nodeType="clickEffect">
-                                  <p:stCondLst>
-                                    <p:cond delay="0"/>
-                                  </p:stCondLst>
-                                  <p:childTnLst>
-                                    <p:set>
-                                      <p:cBhvr>
-                                        <p:cTn id="18" dur="1" fill="hold">
                                           <p:stCondLst>
                                             <p:cond delay="0"/>
                                           </p:stCondLst>
@@ -5781,6 +5605,31 @@
       </p:grpSpPr>
       <p:sp>
         <p:nvSpPr>
+          <p:cNvPr id="2" name="Title 1"/>
+          <p:cNvSpPr>
+            <a:spLocks noGrp="1"/>
+          </p:cNvSpPr>
+          <p:nvPr>
+            <p:ph type="title"/>
+          </p:nvPr>
+        </p:nvSpPr>
+        <p:spPr/>
+        <p:txBody>
+          <a:bodyPr/>
+          <a:lstStyle/>
+          <a:p>
+            <a:pPr lvl="0" indent="0" marL="0">
+              <a:buNone/>
+            </a:pPr>
+            <a:r>
+              <a:rPr/>
+              <a:t>어느 수준으로 만들 것인가?</a:t>
+            </a:r>
+          </a:p>
+        </p:txBody>
+      </p:sp>
+      <p:sp>
+        <p:nvSpPr>
           <p:cNvPr id="3" name="Content Placeholder 2"/>
           <p:cNvSpPr>
             <a:spLocks noGrp="1"/>
@@ -5794,32 +5643,34 @@
           <a:bodyPr/>
           <a:lstStyle/>
           <a:p>
+            <a:pPr lvl="0" indent="0" marL="0">
+              <a:spcBef>
+                <a:spcPts val="3000"/>
+              </a:spcBef>
+              <a:buNone/>
+            </a:pPr>
+            <a:r>
+              <a:rPr b="1"/>
+              <a:t>프리토타입 (Pretotype)</a:t>
+            </a:r>
+          </a:p>
+          <a:p>
             <a:pPr lvl="0"/>
-            <a:r>
-              <a:rPr/>
-              <a:t>프리토타입 (Pretotype)</a:t>
-            </a:r>
-          </a:p>
-          <a:p>
-            <a:pPr lvl="1"/>
             <a:r>
               <a:rPr/>
               <a:t>아주 기초적인 수준으로 작동하거나, 심지어는 작동하지 않아도 작동하는 것처럼 보이는 가짜 제품</a:t>
             </a:r>
           </a:p>
           <a:p>
-            <a:pPr lvl="1"/>
+            <a:pPr lvl="0"/>
             <a:r>
               <a:rPr b="1"/>
               <a:t>“fake it</a:t>
             </a:r>
             <a:r>
               <a:rPr/>
-              <a:t> till you make it”</a:t>
-            </a:r>
-          </a:p>
-          <a:p>
-            <a:pPr lvl="2"/>
+              <a:t> till you make it” - </a:t>
+            </a:r>
             <a:r>
               <a:rPr>
                 <a:hlinkClick r:id="rId2"/>
@@ -5828,14 +5679,19 @@
             </a:r>
           </a:p>
           <a:p>
+            <a:pPr lvl="0" indent="0" marL="0">
+              <a:spcBef>
+                <a:spcPts val="3000"/>
+              </a:spcBef>
+              <a:buNone/>
+            </a:pPr>
+            <a:r>
+              <a:rPr b="1"/>
+              <a:t>MVP (Minimum Viable Product)</a:t>
+            </a:r>
+          </a:p>
+          <a:p>
             <a:pPr lvl="0"/>
-            <a:r>
-              <a:rPr/>
-              <a:t>MVP (Minimum Viable Product)</a:t>
-            </a:r>
-          </a:p>
-          <a:p>
-            <a:pPr lvl="1"/>
             <a:r>
               <a:rPr/>
               <a:t>최소한의 가치를 달성하는 것을 목표로 하는 최소 기능 제품</a:t>
@@ -5881,7 +5737,7 @@
                                         <p:tgtEl>
                                           <p:spTgt spid="3">
                                             <p:txEl>
-                                              <p:pRg st="0" end="0"/>
+                                              <p:pRg st="1" end="1"/>
                                             </p:txEl>
                                           </p:spTgt>
                                         </p:tgtEl>
@@ -5930,7 +5786,7 @@
                                         <p:tgtEl>
                                           <p:spTgt spid="3">
                                             <p:txEl>
-                                              <p:pRg st="1" end="1"/>
+                                              <p:pRg st="2" end="2"/>
                                             </p:txEl>
                                           </p:spTgt>
                                         </p:tgtEl>
@@ -5979,154 +5835,7 @@
                                         <p:tgtEl>
                                           <p:spTgt spid="3">
                                             <p:txEl>
-                                              <p:pRg st="2" end="2"/>
-                                            </p:txEl>
-                                          </p:spTgt>
-                                        </p:tgtEl>
-                                        <p:attrNameLst>
-                                          <p:attrName>style.visibility</p:attrName>
-                                        </p:attrNameLst>
-                                      </p:cBhvr>
-                                      <p:to>
-                                        <p:strVal val="visible"/>
-                                      </p:to>
-                                    </p:set>
-                                  </p:childTnLst>
-                                </p:cTn>
-                              </p:par>
-                            </p:childTnLst>
-                          </p:cTn>
-                        </p:par>
-                      </p:childTnLst>
-                    </p:cTn>
-                  </p:par>
-                  <p:par>
-                    <p:cTn id="15" fill="hold">
-                      <p:stCondLst>
-                        <p:cond delay="indefinite"/>
-                      </p:stCondLst>
-                      <p:childTnLst>
-                        <p:par>
-                          <p:cTn id="16" fill="hold">
-                            <p:stCondLst>
-                              <p:cond delay="0"/>
-                            </p:stCondLst>
-                            <p:childTnLst>
-                              <p:par>
-                                <p:cTn id="17" presetID="1" presetClass="entr" presetSubtype="0" fill="hold" grpId="0" nodeType="clickEffect">
-                                  <p:stCondLst>
-                                    <p:cond delay="0"/>
-                                  </p:stCondLst>
-                                  <p:childTnLst>
-                                    <p:set>
-                                      <p:cBhvr>
-                                        <p:cTn id="18" dur="1" fill="hold">
-                                          <p:stCondLst>
-                                            <p:cond delay="0"/>
-                                          </p:stCondLst>
-                                        </p:cTn>
-                                        <p:tgtEl>
-                                          <p:spTgt spid="3">
-                                            <p:txEl>
-                                              <p:pRg st="3" end="3"/>
-                                            </p:txEl>
-                                          </p:spTgt>
-                                        </p:tgtEl>
-                                        <p:attrNameLst>
-                                          <p:attrName>style.visibility</p:attrName>
-                                        </p:attrNameLst>
-                                      </p:cBhvr>
-                                      <p:to>
-                                        <p:strVal val="visible"/>
-                                      </p:to>
-                                    </p:set>
-                                  </p:childTnLst>
-                                </p:cTn>
-                              </p:par>
-                            </p:childTnLst>
-                          </p:cTn>
-                        </p:par>
-                      </p:childTnLst>
-                    </p:cTn>
-                  </p:par>
-                  <p:par>
-                    <p:cTn id="19" fill="hold">
-                      <p:stCondLst>
-                        <p:cond delay="indefinite"/>
-                      </p:stCondLst>
-                      <p:childTnLst>
-                        <p:par>
-                          <p:cTn id="20" fill="hold">
-                            <p:stCondLst>
-                              <p:cond delay="0"/>
-                            </p:stCondLst>
-                            <p:childTnLst>
-                              <p:par>
-                                <p:cTn id="21" presetID="1" presetClass="entr" presetSubtype="0" fill="hold" grpId="0" nodeType="clickEffect">
-                                  <p:stCondLst>
-                                    <p:cond delay="0"/>
-                                  </p:stCondLst>
-                                  <p:childTnLst>
-                                    <p:set>
-                                      <p:cBhvr>
-                                        <p:cTn id="22" dur="1" fill="hold">
-                                          <p:stCondLst>
-                                            <p:cond delay="0"/>
-                                          </p:stCondLst>
-                                        </p:cTn>
-                                        <p:tgtEl>
-                                          <p:spTgt spid="3">
-                                            <p:txEl>
                                               <p:pRg st="4" end="4"/>
-                                            </p:txEl>
-                                          </p:spTgt>
-                                        </p:tgtEl>
-                                        <p:attrNameLst>
-                                          <p:attrName>style.visibility</p:attrName>
-                                        </p:attrNameLst>
-                                      </p:cBhvr>
-                                      <p:to>
-                                        <p:strVal val="visible"/>
-                                      </p:to>
-                                    </p:set>
-                                  </p:childTnLst>
-                                </p:cTn>
-                              </p:par>
-                            </p:childTnLst>
-                          </p:cTn>
-                        </p:par>
-                      </p:childTnLst>
-                    </p:cTn>
-                  </p:par>
-                  <p:par>
-                    <p:cTn id="23" fill="hold">
-                      <p:stCondLst>
-                        <p:cond delay="indefinite"/>
-                      </p:stCondLst>
-                      <p:childTnLst>
-                        <p:par>
-                          <p:cTn id="24" fill="hold">
-                            <p:stCondLst>
-                              <p:cond delay="0"/>
-                            </p:stCondLst>
-                            <p:childTnLst>
-                              <p:par>
-                                <p:cTn id="25" presetID="1" presetClass="entr" presetSubtype="0" fill="hold" grpId="0" nodeType="clickEffect">
-                                  <p:stCondLst>
-                                    <p:cond delay="0"/>
-                                  </p:stCondLst>
-                                  <p:childTnLst>
-                                    <p:set>
-                                      <p:cBhvr>
-                                        <p:cTn id="26" dur="1" fill="hold">
-                                          <p:stCondLst>
-                                            <p:cond delay="0"/>
-                                          </p:stCondLst>
-                                        </p:cTn>
-                                        <p:tgtEl>
-                                          <p:spTgt spid="3">
-                                            <p:txEl>
-                                              <p:pRg st="5" end="5"/>
                                             </p:txEl>
                                           </p:spTgt>
                                         </p:tgtEl>
@@ -8075,408 +7784,52 @@
           <a:bodyPr/>
           <a:lstStyle/>
           <a:p>
-            <a:pPr lvl="0" indent="0" marL="0">
-              <a:spcBef>
-                <a:spcPts val="3000"/>
-              </a:spcBef>
-              <a:buNone/>
-            </a:pPr>
-            <a:r>
-              <a:rPr b="1"/>
+            <a:pPr lvl="0"/>
+            <a:r>
+              <a:rPr/>
               <a:t>생성형 AI의 출현은 컴퓨터에게 ’대답을 하는 능력’을 준 것이라고 볼 수 있음</a:t>
             </a:r>
           </a:p>
           <a:p>
-            <a:pPr lvl="0"/>
+            <a:pPr lvl="1"/>
             <a:r>
               <a:rPr/>
               <a:t>사람이 직접적으로 컴퓨터에게 명령을 하는 것에서 컴퓨터에게 목적을 말하는 형태로 이행해갈 것.</a:t>
             </a:r>
           </a:p>
           <a:p>
-            <a:pPr lvl="0" indent="0" marL="0">
-              <a:spcBef>
-                <a:spcPts val="3000"/>
-              </a:spcBef>
-              <a:buNone/>
-            </a:pPr>
-            <a:r>
-              <a:rPr b="1"/>
+            <a:pPr lvl="0"/>
+            <a:r>
+              <a:rPr/>
               <a:t>강인공지능 (스스로 코딩하는 인공지능)으로 가기 위한 중단단계로서의 노코드.</a:t>
             </a:r>
           </a:p>
           <a:p>
-            <a:pPr lvl="0"/>
+            <a:pPr lvl="1"/>
             <a:r>
               <a:rPr/>
               <a:t>현재는 약 인공지능과 노 코드 툴로 사람이 직접 필요한 기능을 개발하는 과도기에 있음.</a:t>
             </a:r>
           </a:p>
           <a:p>
-            <a:pPr lvl="0" indent="0" marL="0">
-              <a:spcBef>
-                <a:spcPts val="3000"/>
-              </a:spcBef>
-              <a:buNone/>
-            </a:pPr>
-            <a:r>
-              <a:rPr b="1"/>
+            <a:pPr lvl="0"/>
+            <a:r>
+              <a:rPr/>
               <a:t>강인공지능이 대중화되었을 때, 그 땐 앱이라는 게 존재할까?</a:t>
             </a:r>
           </a:p>
           <a:p>
-            <a:pPr lvl="0"/>
+            <a:pPr lvl="1"/>
             <a:r>
               <a:rPr/>
               <a:t>애플리케이션, 웹 사이트 등의 인터페이스는 사람이 쓰기 위한 것. 사용자가 직접 서비스에 접근하지 않고 비서 형태의 AI가 스스로 사람을 위한 해결책을 구상하고 실행하는 시대가 오면, 애플리케이션이나 웹 사이트 등의 필요도 없어질 가능성이 큼.</a:t>
             </a:r>
           </a:p>
           <a:p>
-            <a:pPr lvl="0"/>
+            <a:pPr lvl="1"/>
             <a:r>
               <a:rPr/>
               <a:t>물론 사람이 직접 개발할 일도 없어질 것</a:t>
-            </a:r>
-          </a:p>
-        </p:txBody>
-      </p:sp>
-    </p:spTree>
-  </p:cSld>
-  <p:timing>
-    <p:tnLst>
-      <p:par>
-        <p:cTn id="1" dur="indefinite" restart="never" nodeType="tmRoot">
-          <p:childTnLst>
-            <p:seq concurrent="1" nextAc="seek">
-              <p:cTn id="2" dur="indefinite" nodeType="mainSeq">
-                <p:childTnLst>
-                  <p:par>
-                    <p:cTn id="3" fill="hold">
-                      <p:stCondLst>
-                        <p:cond delay="indefinite"/>
-                      </p:stCondLst>
-                      <p:childTnLst>
-                        <p:par>
-                          <p:cTn id="4" fill="hold">
-                            <p:stCondLst>
-                              <p:cond delay="0"/>
-                            </p:stCondLst>
-                            <p:childTnLst>
-                              <p:par>
-                                <p:cTn id="5" presetID="1" presetClass="entr" presetSubtype="0" fill="hold" grpId="0" nodeType="clickEffect">
-                                  <p:stCondLst>
-                                    <p:cond delay="0"/>
-                                  </p:stCondLst>
-                                  <p:childTnLst>
-                                    <p:set>
-                                      <p:cBhvr>
-                                        <p:cTn id="6" dur="1" fill="hold">
-                                          <p:stCondLst>
-                                            <p:cond delay="0"/>
-                                          </p:stCondLst>
-                                        </p:cTn>
-                                        <p:tgtEl>
-                                          <p:spTgt spid="3">
-                                            <p:txEl>
-                                              <p:pRg st="1" end="1"/>
-                                            </p:txEl>
-                                          </p:spTgt>
-                                        </p:tgtEl>
-                                        <p:attrNameLst>
-                                          <p:attrName>style.visibility</p:attrName>
-                                        </p:attrNameLst>
-                                      </p:cBhvr>
-                                      <p:to>
-                                        <p:strVal val="visible"/>
-                                      </p:to>
-                                    </p:set>
-                                  </p:childTnLst>
-                                </p:cTn>
-                              </p:par>
-                            </p:childTnLst>
-                          </p:cTn>
-                        </p:par>
-                      </p:childTnLst>
-                    </p:cTn>
-                  </p:par>
-                  <p:par>
-                    <p:cTn id="7" fill="hold">
-                      <p:stCondLst>
-                        <p:cond delay="indefinite"/>
-                      </p:stCondLst>
-                      <p:childTnLst>
-                        <p:par>
-                          <p:cTn id="8" fill="hold">
-                            <p:stCondLst>
-                              <p:cond delay="0"/>
-                            </p:stCondLst>
-                            <p:childTnLst>
-                              <p:par>
-                                <p:cTn id="9" presetID="1" presetClass="entr" presetSubtype="0" fill="hold" grpId="0" nodeType="clickEffect">
-                                  <p:stCondLst>
-                                    <p:cond delay="0"/>
-                                  </p:stCondLst>
-                                  <p:childTnLst>
-                                    <p:set>
-                                      <p:cBhvr>
-                                        <p:cTn id="10" dur="1" fill="hold">
-                                          <p:stCondLst>
-                                            <p:cond delay="0"/>
-                                          </p:stCondLst>
-                                        </p:cTn>
-                                        <p:tgtEl>
-                                          <p:spTgt spid="3">
-                                            <p:txEl>
-                                              <p:pRg st="3" end="3"/>
-                                            </p:txEl>
-                                          </p:spTgt>
-                                        </p:tgtEl>
-                                        <p:attrNameLst>
-                                          <p:attrName>style.visibility</p:attrName>
-                                        </p:attrNameLst>
-                                      </p:cBhvr>
-                                      <p:to>
-                                        <p:strVal val="visible"/>
-                                      </p:to>
-                                    </p:set>
-                                  </p:childTnLst>
-                                </p:cTn>
-                              </p:par>
-                            </p:childTnLst>
-                          </p:cTn>
-                        </p:par>
-                      </p:childTnLst>
-                    </p:cTn>
-                  </p:par>
-                  <p:par>
-                    <p:cTn id="11" fill="hold">
-                      <p:stCondLst>
-                        <p:cond delay="indefinite"/>
-                      </p:stCondLst>
-                      <p:childTnLst>
-                        <p:par>
-                          <p:cTn id="12" fill="hold">
-                            <p:stCondLst>
-                              <p:cond delay="0"/>
-                            </p:stCondLst>
-                            <p:childTnLst>
-                              <p:par>
-                                <p:cTn id="13" presetID="1" presetClass="entr" presetSubtype="0" fill="hold" grpId="0" nodeType="clickEffect">
-                                  <p:stCondLst>
-                                    <p:cond delay="0"/>
-                                  </p:stCondLst>
-                                  <p:childTnLst>
-                                    <p:set>
-                                      <p:cBhvr>
-                                        <p:cTn id="14" dur="1" fill="hold">
-                                          <p:stCondLst>
-                                            <p:cond delay="0"/>
-                                          </p:stCondLst>
-                                        </p:cTn>
-                                        <p:tgtEl>
-                                          <p:spTgt spid="3">
-                                            <p:txEl>
-                                              <p:pRg st="5" end="5"/>
-                                            </p:txEl>
-                                          </p:spTgt>
-                                        </p:tgtEl>
-                                        <p:attrNameLst>
-                                          <p:attrName>style.visibility</p:attrName>
-                                        </p:attrNameLst>
-                                      </p:cBhvr>
-                                      <p:to>
-                                        <p:strVal val="visible"/>
-                                      </p:to>
-                                    </p:set>
-                                  </p:childTnLst>
-                                </p:cTn>
-                              </p:par>
-                            </p:childTnLst>
-                          </p:cTn>
-                        </p:par>
-                      </p:childTnLst>
-                    </p:cTn>
-                  </p:par>
-                  <p:par>
-                    <p:cTn id="15" fill="hold">
-                      <p:stCondLst>
-                        <p:cond delay="indefinite"/>
-                      </p:stCondLst>
-                      <p:childTnLst>
-                        <p:par>
-                          <p:cTn id="16" fill="hold">
-                            <p:stCondLst>
-                              <p:cond delay="0"/>
-                            </p:stCondLst>
-                            <p:childTnLst>
-                              <p:par>
-                                <p:cTn id="17" presetID="1" presetClass="entr" presetSubtype="0" fill="hold" grpId="0" nodeType="clickEffect">
-                                  <p:stCondLst>
-                                    <p:cond delay="0"/>
-                                  </p:stCondLst>
-                                  <p:childTnLst>
-                                    <p:set>
-                                      <p:cBhvr>
-                                        <p:cTn id="18" dur="1" fill="hold">
-                                          <p:stCondLst>
-                                            <p:cond delay="0"/>
-                                          </p:stCondLst>
-                                        </p:cTn>
-                                        <p:tgtEl>
-                                          <p:spTgt spid="3">
-                                            <p:txEl>
-                                              <p:pRg st="6" end="6"/>
-                                            </p:txEl>
-                                          </p:spTgt>
-                                        </p:tgtEl>
-                                        <p:attrNameLst>
-                                          <p:attrName>style.visibility</p:attrName>
-                                        </p:attrNameLst>
-                                      </p:cBhvr>
-                                      <p:to>
-                                        <p:strVal val="visible"/>
-                                      </p:to>
-                                    </p:set>
-                                  </p:childTnLst>
-                                </p:cTn>
-                              </p:par>
-                            </p:childTnLst>
-                          </p:cTn>
-                        </p:par>
-                      </p:childTnLst>
-                    </p:cTn>
-                  </p:par>
-                </p:childTnLst>
-              </p:cTn>
-              <p:prevCondLst>
-                <p:cond evt="onPrev" delay="0">
-                  <p:tgtEl>
-                    <p:sldTgt/>
-                  </p:tgtEl>
-                </p:cond>
-              </p:prevCondLst>
-              <p:nextCondLst>
-                <p:cond evt="onNext" delay="0">
-                  <p:tgtEl>
-                    <p:sldTgt/>
-                  </p:tgtEl>
-                </p:cond>
-              </p:nextCondLst>
-            </p:seq>
-          </p:childTnLst>
-        </p:cTn>
-      </p:par>
-    </p:tnLst>
-    <p:bldLst>
-      <p:bldP spid="3" grpId="0" uiExpand="1" build="p"/>
-    </p:bldLst>
-  </p:timing>
-</p:sld>
-</file>
-
-<file path=ppt/slides/slide8.xml><?xml version="1.0" encoding="utf-8"?>
-<p:sld xmlns:a="http://schemas.openxmlformats.org/drawingml/2006/main" xmlns:r="http://schemas.openxmlformats.org/officeDocument/2006/relationships" xmlns:p="http://schemas.openxmlformats.org/presentationml/2006/main">
-  <p:cSld>
-    <p:spTree>
-      <p:nvGrpSpPr>
-        <p:cNvPr id="1" name=""/>
-        <p:cNvGrpSpPr/>
-        <p:nvPr/>
-      </p:nvGrpSpPr>
-      <p:grpSpPr>
-        <a:xfrm>
-          <a:off x="0" y="0"/>
-          <a:ext cx="0" cy="0"/>
-          <a:chOff x="0" y="0"/>
-          <a:chExt cx="0" cy="0"/>
-        </a:xfrm>
-      </p:grpSpPr>
-      <p:sp>
-        <p:nvSpPr>
-          <p:cNvPr id="2" name="Title 1"/>
-          <p:cNvSpPr>
-            <a:spLocks noGrp="1"/>
-          </p:cNvSpPr>
-          <p:nvPr>
-            <p:ph type="title"/>
-          </p:nvPr>
-        </p:nvSpPr>
-        <p:spPr/>
-        <p:txBody>
-          <a:bodyPr/>
-          <a:lstStyle/>
-          <a:p>
-            <a:pPr lvl="0" indent="0" marL="0">
-              <a:buNone/>
-            </a:pPr>
-            <a:r>
-              <a:rPr/>
-              <a:t>노코드가 중요해지는 이유</a:t>
-            </a:r>
-          </a:p>
-        </p:txBody>
-      </p:sp>
-      <p:sp>
-        <p:nvSpPr>
-          <p:cNvPr id="3" name="Content Placeholder 2"/>
-          <p:cNvSpPr>
-            <a:spLocks noGrp="1"/>
-          </p:cNvSpPr>
-          <p:nvPr>
-            <p:ph idx="1"/>
-          </p:nvPr>
-        </p:nvSpPr>
-        <p:spPr/>
-        <p:txBody>
-          <a:bodyPr/>
-          <a:lstStyle/>
-          <a:p>
-            <a:pPr lvl="0"/>
-            <a:r>
-              <a:rPr/>
-              <a:t>오랜 시간 성숙된 애자일 문화</a:t>
-            </a:r>
-          </a:p>
-          <a:p>
-            <a:pPr lvl="1"/>
-            <a:r>
-              <a:rPr/>
-              <a:t>워터폴 방식 개발 방법론의 한계를 해결하기 위한 대안</a:t>
-            </a:r>
-          </a:p>
-          <a:p>
-            <a:pPr lvl="1"/>
-            <a:r>
-              <a:rPr/>
-              <a:t>빠른 프로토타입과 테스트를 반복해가며 개발</a:t>
-            </a:r>
-          </a:p>
-          <a:p>
-            <a:pPr lvl="2"/>
-            <a:r>
-              <a:rPr/>
-              <a:t>노코드의 신속성과 직관성이 필요한 영역</a:t>
-            </a:r>
-          </a:p>
-          <a:p>
-            <a:pPr lvl="0"/>
-            <a:r>
-              <a:rPr/>
-              <a:t>생성형 AI의 출현</a:t>
-            </a:r>
-          </a:p>
-          <a:p>
-            <a:pPr lvl="1"/>
-            <a:r>
-              <a:rPr/>
-              <a:t>생성형 AI는 코드 또는 발화의 형태로 대답을 할 수 있음</a:t>
-            </a:r>
-          </a:p>
-          <a:p>
-            <a:pPr lvl="1"/>
-            <a:r>
-              <a:rPr/>
-              <a:t>이 대답을 노코드(GUI)로 할 때 사람과 대화하기가 훨씬 유리</a:t>
             </a:r>
           </a:p>
         </p:txBody>
@@ -8862,7 +8215,7 @@
 </p:sld>
 </file>
 
-<file path=ppt/slides/slide9.xml><?xml version="1.0" encoding="utf-8"?>
+<file path=ppt/slides/slide8.xml><?xml version="1.0" encoding="utf-8"?>
 <p:sld xmlns:a="http://schemas.openxmlformats.org/drawingml/2006/main" xmlns:r="http://schemas.openxmlformats.org/officeDocument/2006/relationships" xmlns:p="http://schemas.openxmlformats.org/presentationml/2006/main">
   <p:cSld>
     <p:spTree>
@@ -8881,6 +8234,31 @@
       </p:grpSpPr>
       <p:sp>
         <p:nvSpPr>
+          <p:cNvPr id="2" name="Title 1"/>
+          <p:cNvSpPr>
+            <a:spLocks noGrp="1"/>
+          </p:cNvSpPr>
+          <p:nvPr>
+            <p:ph type="title"/>
+          </p:nvPr>
+        </p:nvSpPr>
+        <p:spPr/>
+        <p:txBody>
+          <a:bodyPr/>
+          <a:lstStyle/>
+          <a:p>
+            <a:pPr lvl="0" indent="0" marL="0">
+              <a:buNone/>
+            </a:pPr>
+            <a:r>
+              <a:rPr/>
+              <a:t>노코드가 중요해지는 이유</a:t>
+            </a:r>
+          </a:p>
+        </p:txBody>
+      </p:sp>
+      <p:sp>
+        <p:nvSpPr>
           <p:cNvPr id="3" name="Content Placeholder 2"/>
           <p:cNvSpPr>
             <a:spLocks noGrp="1"/>
@@ -8894,52 +8272,55 @@
           <a:bodyPr/>
           <a:lstStyle/>
           <a:p>
+            <a:pPr lvl="0" indent="0" marL="0">
+              <a:spcBef>
+                <a:spcPts val="3000"/>
+              </a:spcBef>
+              <a:buNone/>
+            </a:pPr>
+            <a:r>
+              <a:rPr b="1"/>
+              <a:t>오랜 시간 성숙된 애자일 문화</a:t>
+            </a:r>
+          </a:p>
+          <a:p>
             <a:pPr lvl="0"/>
             <a:r>
               <a:rPr/>
-              <a:t>코로나 이후의 변화</a:t>
-            </a:r>
-          </a:p>
-          <a:p>
-            <a:pPr lvl="1"/>
+              <a:t>워터폴 방식 개발 방법론의 한계를 해결하기 위한 대안</a:t>
+            </a:r>
+          </a:p>
+          <a:p>
+            <a:pPr lvl="0"/>
             <a:r>
               <a:rPr/>
-              <a:t>세계경제 악화</a:t>
-            </a:r>
-          </a:p>
-          <a:p>
-            <a:pPr lvl="1"/>
+              <a:t>빠른 프로토타입과 테스트를 반복해가며 개발 - 노코드의 신속성과 직관성이 필요한 영역</a:t>
+            </a:r>
+          </a:p>
+          <a:p>
+            <a:pPr lvl="0" indent="0" marL="0">
+              <a:spcBef>
+                <a:spcPts val="3000"/>
+              </a:spcBef>
+              <a:buNone/>
+            </a:pPr>
+            <a:r>
+              <a:rPr b="1"/>
+              <a:t>생성형 AI의 출현</a:t>
+            </a:r>
+          </a:p>
+          <a:p>
+            <a:pPr lvl="0"/>
             <a:r>
               <a:rPr/>
-              <a:t>투자 시장의 변화</a:t>
-            </a:r>
-          </a:p>
-          <a:p>
-            <a:pPr lvl="2"/>
+              <a:t>생성형 AI는 코드 또는 발화의 형태로 대답을 할 수 있음</a:t>
+            </a:r>
+          </a:p>
+          <a:p>
+            <a:pPr lvl="0"/>
             <a:r>
               <a:rPr/>
-              <a:t>기존: 미래가치에 투자</a:t>
-            </a:r>
-          </a:p>
-          <a:p>
-            <a:pPr lvl="2"/>
-            <a:r>
-              <a:rPr/>
-              <a:t>현재: 현재수익/성과에 투자</a:t>
-            </a:r>
-          </a:p>
-          <a:p>
-            <a:pPr lvl="3"/>
-            <a:r>
-              <a:rPr/>
-              <a:t>검증된 아이디어. 검증의 필요성 증가</a:t>
-            </a:r>
-          </a:p>
-          <a:p>
-            <a:pPr lvl="4"/>
-            <a:r>
-              <a:rPr/>
-              <a:t>빠른 검증(MVP)을 위한 노코드</a:t>
+              <a:t>이 대답을 노코드(GUI)로 할 때 사람과 대화하기가 훨씬 유리</a:t>
             </a:r>
           </a:p>
         </p:txBody>
@@ -8982,7 +8363,7 @@
                                         <p:tgtEl>
                                           <p:spTgt spid="3">
                                             <p:txEl>
-                                              <p:pRg st="0" end="0"/>
+                                              <p:pRg st="1" end="1"/>
                                             </p:txEl>
                                           </p:spTgt>
                                         </p:tgtEl>
@@ -9031,7 +8412,7 @@
                                         <p:tgtEl>
                                           <p:spTgt spid="3">
                                             <p:txEl>
-                                              <p:pRg st="1" end="1"/>
+                                              <p:pRg st="2" end="2"/>
                                             </p:txEl>
                                           </p:spTgt>
                                         </p:tgtEl>
@@ -9080,7 +8461,7 @@
                                         <p:tgtEl>
                                           <p:spTgt spid="3">
                                             <p:txEl>
-                                              <p:pRg st="2" end="2"/>
+                                              <p:pRg st="4" end="4"/>
                                             </p:txEl>
                                           </p:spTgt>
                                         </p:tgtEl>
@@ -9129,7 +8510,328 @@
                                         <p:tgtEl>
                                           <p:spTgt spid="3">
                                             <p:txEl>
+                                              <p:pRg st="5" end="5"/>
+                                            </p:txEl>
+                                          </p:spTgt>
+                                        </p:tgtEl>
+                                        <p:attrNameLst>
+                                          <p:attrName>style.visibility</p:attrName>
+                                        </p:attrNameLst>
+                                      </p:cBhvr>
+                                      <p:to>
+                                        <p:strVal val="visible"/>
+                                      </p:to>
+                                    </p:set>
+                                  </p:childTnLst>
+                                </p:cTn>
+                              </p:par>
+                            </p:childTnLst>
+                          </p:cTn>
+                        </p:par>
+                      </p:childTnLst>
+                    </p:cTn>
+                  </p:par>
+                </p:childTnLst>
+              </p:cTn>
+              <p:prevCondLst>
+                <p:cond evt="onPrev" delay="0">
+                  <p:tgtEl>
+                    <p:sldTgt/>
+                  </p:tgtEl>
+                </p:cond>
+              </p:prevCondLst>
+              <p:nextCondLst>
+                <p:cond evt="onNext" delay="0">
+                  <p:tgtEl>
+                    <p:sldTgt/>
+                  </p:tgtEl>
+                </p:cond>
+              </p:nextCondLst>
+            </p:seq>
+          </p:childTnLst>
+        </p:cTn>
+      </p:par>
+    </p:tnLst>
+    <p:bldLst>
+      <p:bldP spid="3" grpId="0" uiExpand="1" build="p"/>
+    </p:bldLst>
+  </p:timing>
+</p:sld>
+</file>
+
+<file path=ppt/slides/slide9.xml><?xml version="1.0" encoding="utf-8"?>
+<p:sld xmlns:a="http://schemas.openxmlformats.org/drawingml/2006/main" xmlns:r="http://schemas.openxmlformats.org/officeDocument/2006/relationships" xmlns:p="http://schemas.openxmlformats.org/presentationml/2006/main">
+  <p:cSld>
+    <p:spTree>
+      <p:nvGrpSpPr>
+        <p:cNvPr id="1" name=""/>
+        <p:cNvGrpSpPr/>
+        <p:nvPr/>
+      </p:nvGrpSpPr>
+      <p:grpSpPr>
+        <a:xfrm>
+          <a:off x="0" y="0"/>
+          <a:ext cx="0" cy="0"/>
+          <a:chOff x="0" y="0"/>
+          <a:chExt cx="0" cy="0"/>
+        </a:xfrm>
+      </p:grpSpPr>
+      <p:sp>
+        <p:nvSpPr>
+          <p:cNvPr id="3" name="Content Placeholder 2"/>
+          <p:cNvSpPr>
+            <a:spLocks noGrp="1"/>
+          </p:cNvSpPr>
+          <p:nvPr>
+            <p:ph idx="1"/>
+          </p:nvPr>
+        </p:nvSpPr>
+        <p:spPr/>
+        <p:txBody>
+          <a:bodyPr/>
+          <a:lstStyle/>
+          <a:p>
+            <a:pPr lvl="0" indent="0" marL="0">
+              <a:spcBef>
+                <a:spcPts val="3000"/>
+              </a:spcBef>
+              <a:buNone/>
+            </a:pPr>
+            <a:r>
+              <a:rPr b="1"/>
+              <a:t>코로나 이후의 변화</a:t>
+            </a:r>
+          </a:p>
+          <a:p>
+            <a:pPr lvl="0"/>
+            <a:r>
+              <a:rPr/>
+              <a:t>세계경제 악화</a:t>
+            </a:r>
+          </a:p>
+          <a:p>
+            <a:pPr lvl="0"/>
+            <a:r>
+              <a:rPr/>
+              <a:t>투자 시장의 변화</a:t>
+            </a:r>
+          </a:p>
+          <a:p>
+            <a:pPr lvl="1"/>
+            <a:r>
+              <a:rPr/>
+              <a:t>기존: 미래가치에 투자</a:t>
+            </a:r>
+          </a:p>
+          <a:p>
+            <a:pPr lvl="1"/>
+            <a:r>
+              <a:rPr/>
+              <a:t>현재: 현재수익/성과에 투자</a:t>
+            </a:r>
+          </a:p>
+          <a:p>
+            <a:pPr lvl="2"/>
+            <a:r>
+              <a:rPr/>
+              <a:t>검증된 아이디어. 검증의 필요성 증가</a:t>
+            </a:r>
+          </a:p>
+          <a:p>
+            <a:pPr lvl="3"/>
+            <a:r>
+              <a:rPr/>
+              <a:t>빠른 검증(MVP)을 위한 노코드</a:t>
+            </a:r>
+          </a:p>
+        </p:txBody>
+      </p:sp>
+    </p:spTree>
+  </p:cSld>
+  <p:timing>
+    <p:tnLst>
+      <p:par>
+        <p:cTn id="1" dur="indefinite" restart="never" nodeType="tmRoot">
+          <p:childTnLst>
+            <p:seq concurrent="1" nextAc="seek">
+              <p:cTn id="2" dur="indefinite" nodeType="mainSeq">
+                <p:childTnLst>
+                  <p:par>
+                    <p:cTn id="3" fill="hold">
+                      <p:stCondLst>
+                        <p:cond delay="indefinite"/>
+                      </p:stCondLst>
+                      <p:childTnLst>
+                        <p:par>
+                          <p:cTn id="4" fill="hold">
+                            <p:stCondLst>
+                              <p:cond delay="0"/>
+                            </p:stCondLst>
+                            <p:childTnLst>
+                              <p:par>
+                                <p:cTn id="5" presetID="1" presetClass="entr" presetSubtype="0" fill="hold" grpId="0" nodeType="clickEffect">
+                                  <p:stCondLst>
+                                    <p:cond delay="0"/>
+                                  </p:stCondLst>
+                                  <p:childTnLst>
+                                    <p:set>
+                                      <p:cBhvr>
+                                        <p:cTn id="6" dur="1" fill="hold">
+                                          <p:stCondLst>
+                                            <p:cond delay="0"/>
+                                          </p:stCondLst>
+                                        </p:cTn>
+                                        <p:tgtEl>
+                                          <p:spTgt spid="3">
+                                            <p:txEl>
+                                              <p:pRg st="1" end="1"/>
+                                            </p:txEl>
+                                          </p:spTgt>
+                                        </p:tgtEl>
+                                        <p:attrNameLst>
+                                          <p:attrName>style.visibility</p:attrName>
+                                        </p:attrNameLst>
+                                      </p:cBhvr>
+                                      <p:to>
+                                        <p:strVal val="visible"/>
+                                      </p:to>
+                                    </p:set>
+                                  </p:childTnLst>
+                                </p:cTn>
+                              </p:par>
+                            </p:childTnLst>
+                          </p:cTn>
+                        </p:par>
+                      </p:childTnLst>
+                    </p:cTn>
+                  </p:par>
+                  <p:par>
+                    <p:cTn id="7" fill="hold">
+                      <p:stCondLst>
+                        <p:cond delay="indefinite"/>
+                      </p:stCondLst>
+                      <p:childTnLst>
+                        <p:par>
+                          <p:cTn id="8" fill="hold">
+                            <p:stCondLst>
+                              <p:cond delay="0"/>
+                            </p:stCondLst>
+                            <p:childTnLst>
+                              <p:par>
+                                <p:cTn id="9" presetID="1" presetClass="entr" presetSubtype="0" fill="hold" grpId="0" nodeType="clickEffect">
+                                  <p:stCondLst>
+                                    <p:cond delay="0"/>
+                                  </p:stCondLst>
+                                  <p:childTnLst>
+                                    <p:set>
+                                      <p:cBhvr>
+                                        <p:cTn id="10" dur="1" fill="hold">
+                                          <p:stCondLst>
+                                            <p:cond delay="0"/>
+                                          </p:stCondLst>
+                                        </p:cTn>
+                                        <p:tgtEl>
+                                          <p:spTgt spid="3">
+                                            <p:txEl>
+                                              <p:pRg st="2" end="2"/>
+                                            </p:txEl>
+                                          </p:spTgt>
+                                        </p:tgtEl>
+                                        <p:attrNameLst>
+                                          <p:attrName>style.visibility</p:attrName>
+                                        </p:attrNameLst>
+                                      </p:cBhvr>
+                                      <p:to>
+                                        <p:strVal val="visible"/>
+                                      </p:to>
+                                    </p:set>
+                                  </p:childTnLst>
+                                </p:cTn>
+                              </p:par>
+                            </p:childTnLst>
+                          </p:cTn>
+                        </p:par>
+                      </p:childTnLst>
+                    </p:cTn>
+                  </p:par>
+                  <p:par>
+                    <p:cTn id="11" fill="hold">
+                      <p:stCondLst>
+                        <p:cond delay="indefinite"/>
+                      </p:stCondLst>
+                      <p:childTnLst>
+                        <p:par>
+                          <p:cTn id="12" fill="hold">
+                            <p:stCondLst>
+                              <p:cond delay="0"/>
+                            </p:stCondLst>
+                            <p:childTnLst>
+                              <p:par>
+                                <p:cTn id="13" presetID="1" presetClass="entr" presetSubtype="0" fill="hold" grpId="0" nodeType="clickEffect">
+                                  <p:stCondLst>
+                                    <p:cond delay="0"/>
+                                  </p:stCondLst>
+                                  <p:childTnLst>
+                                    <p:set>
+                                      <p:cBhvr>
+                                        <p:cTn id="14" dur="1" fill="hold">
+                                          <p:stCondLst>
+                                            <p:cond delay="0"/>
+                                          </p:stCondLst>
+                                        </p:cTn>
+                                        <p:tgtEl>
+                                          <p:spTgt spid="3">
+                                            <p:txEl>
                                               <p:pRg st="3" end="3"/>
+                                            </p:txEl>
+                                          </p:spTgt>
+                                        </p:tgtEl>
+                                        <p:attrNameLst>
+                                          <p:attrName>style.visibility</p:attrName>
+                                        </p:attrNameLst>
+                                      </p:cBhvr>
+                                      <p:to>
+                                        <p:strVal val="visible"/>
+                                      </p:to>
+                                    </p:set>
+                                  </p:childTnLst>
+                                </p:cTn>
+                              </p:par>
+                            </p:childTnLst>
+                          </p:cTn>
+                        </p:par>
+                      </p:childTnLst>
+                    </p:cTn>
+                  </p:par>
+                  <p:par>
+                    <p:cTn id="15" fill="hold">
+                      <p:stCondLst>
+                        <p:cond delay="indefinite"/>
+                      </p:stCondLst>
+                      <p:childTnLst>
+                        <p:par>
+                          <p:cTn id="16" fill="hold">
+                            <p:stCondLst>
+                              <p:cond delay="0"/>
+                            </p:stCondLst>
+                            <p:childTnLst>
+                              <p:par>
+                                <p:cTn id="17" presetID="1" presetClass="entr" presetSubtype="0" fill="hold" grpId="0" nodeType="clickEffect">
+                                  <p:stCondLst>
+                                    <p:cond delay="0"/>
+                                  </p:stCondLst>
+                                  <p:childTnLst>
+                                    <p:set>
+                                      <p:cBhvr>
+                                        <p:cTn id="18" dur="1" fill="hold">
+                                          <p:stCondLst>
+                                            <p:cond delay="0"/>
+                                          </p:stCondLst>
+                                        </p:cTn>
+                                        <p:tgtEl>
+                                          <p:spTgt spid="3">
+                                            <p:txEl>
+                                              <p:pRg st="4" end="4"/>
                                             </p:txEl>
                                           </p:spTgt>
                                         </p:tgtEl>
@@ -9178,7 +8880,7 @@
                                         <p:tgtEl>
                                           <p:spTgt spid="3">
                                             <p:txEl>
-                                              <p:pRg st="4" end="4"/>
+                                              <p:pRg st="5" end="5"/>
                                             </p:txEl>
                                           </p:spTgt>
                                         </p:tgtEl>
@@ -9220,55 +8922,6 @@
                                     <p:set>
                                       <p:cBhvr>
                                         <p:cTn id="26" dur="1" fill="hold">
-                                          <p:stCondLst>
-                                            <p:cond delay="0"/>
-                                          </p:stCondLst>
-                                        </p:cTn>
-                                        <p:tgtEl>
-                                          <p:spTgt spid="3">
-                                            <p:txEl>
-                                              <p:pRg st="5" end="5"/>
-                                            </p:txEl>
-                                          </p:spTgt>
-                                        </p:tgtEl>
-                                        <p:attrNameLst>
-                                          <p:attrName>style.visibility</p:attrName>
-                                        </p:attrNameLst>
-                                      </p:cBhvr>
-                                      <p:to>
-                                        <p:strVal val="visible"/>
-                                      </p:to>
-                                    </p:set>
-                                  </p:childTnLst>
-                                </p:cTn>
-                              </p:par>
-                            </p:childTnLst>
-                          </p:cTn>
-                        </p:par>
-                      </p:childTnLst>
-                    </p:cTn>
-                  </p:par>
-                  <p:par>
-                    <p:cTn id="27" fill="hold">
-                      <p:stCondLst>
-                        <p:cond delay="indefinite"/>
-                      </p:stCondLst>
-                      <p:childTnLst>
-                        <p:par>
-                          <p:cTn id="28" fill="hold">
-                            <p:stCondLst>
-                              <p:cond delay="0"/>
-                            </p:stCondLst>
-                            <p:childTnLst>
-                              <p:par>
-                                <p:cTn id="29" presetID="1" presetClass="entr" presetSubtype="0" fill="hold" grpId="0" nodeType="clickEffect">
-                                  <p:stCondLst>
-                                    <p:cond delay="0"/>
-                                  </p:stCondLst>
-                                  <p:childTnLst>
-                                    <p:set>
-                                      <p:cBhvr>
-                                        <p:cTn id="30" dur="1" fill="hold">
                                           <p:stCondLst>
                                             <p:cond delay="0"/>
                                           </p:stCondLst>

</xml_diff>

<commit_message>
백업 완료: 2023-11-25 03:48:58
Affected files:
.obsidian/workspace.json
노코드 엔지니어링/노코드 개론.md
노코드 엔지니어링/노코드 개론.pptx
노코드 엔지니어링/노코드 기반의 프로덕트 구현.md
</commit_message>
<xml_diff>
--- a/노코드 엔지니어링/노코드 개론.pptx
+++ b/노코드 엔지니어링/노코드 개론.pptx
@@ -21,6 +21,7 @@
     <p:sldId id="269" r:id="rId15"/>
     <p:sldId id="270" r:id="rId16"/>
     <p:sldId id="271" r:id="rId17"/>
+    <p:sldId id="272" r:id="rId18"/>
   </p:sldIdLst>
   <p:sldSz cx="12192000" cy="6858000"/>
   <p:notesSz cx="6858000" cy="9144000"/>
@@ -5050,12 +5051,7 @@
             <p:ph type="title"/>
           </p:nvPr>
         </p:nvSpPr>
-        <p:spPr>
-          <a:xfrm>
-            <a:off x="1444671" y="798973"/>
-            <a:ext cx="3273099" cy="924795"/>
-          </a:xfrm>
-        </p:spPr>
+        <p:spPr/>
         <p:txBody>
           <a:bodyPr/>
           <a:lstStyle/>
@@ -5072,12 +5068,12 @@
       </p:sp>
       <p:sp>
         <p:nvSpPr>
-          <p:cNvPr id="4" name="Text Placeholder 3"/>
+          <p:cNvPr id="3" name="Content Placeholder 2"/>
           <p:cNvSpPr>
             <a:spLocks noGrp="1"/>
           </p:cNvSpPr>
           <p:nvPr>
-            <p:ph idx="2" sz="half" type="body"/>
+            <p:ph idx="1"/>
           </p:nvPr>
         </p:nvSpPr>
         <p:spPr/>
@@ -5114,36 +5110,6 @@
           </a:p>
         </p:txBody>
       </p:sp>
-      <p:pic>
-        <p:nvPicPr>
-          <p:cNvPr descr="attachments/Outside.webp" id="0" name="Picture 1"/>
-          <p:cNvPicPr>
-            <a:picLocks noGrp="1" noChangeAspect="1"/>
-          </p:cNvPicPr>
-          <p:nvPr/>
-        </p:nvPicPr>
-        <p:blipFill>
-          <a:blip r:embed="rId2"/>
-          <a:stretch>
-            <a:fillRect/>
-          </a:stretch>
-        </p:blipFill>
-        <p:spPr bwMode="auto">
-          <a:xfrm>
-            <a:off x="5041900" y="1104900"/>
-            <a:ext cx="6007100" cy="4000500"/>
-          </a:xfrm>
-          <a:prstGeom prst="rect">
-            <a:avLst/>
-          </a:prstGeom>
-          <a:noFill/>
-          <a:ln w="9525">
-            <a:noFill/>
-            <a:headEnd/>
-            <a:tailEnd/>
-          </a:ln>
-        </p:spPr>
-      </p:pic>
     </p:spTree>
   </p:cSld>
   <p:timing>
@@ -5180,7 +5146,7 @@
                                           </p:stCondLst>
                                         </p:cTn>
                                         <p:tgtEl>
-                                          <p:spTgt spid="4">
+                                          <p:spTgt spid="3">
                                             <p:txEl>
                                               <p:pRg st="0" end="0"/>
                                             </p:txEl>
@@ -5229,7 +5195,7 @@
                                           </p:stCondLst>
                                         </p:cTn>
                                         <p:tgtEl>
-                                          <p:spTgt spid="4">
+                                          <p:spTgt spid="3">
                                             <p:txEl>
                                               <p:pRg st="1" end="1"/>
                                             </p:txEl>
@@ -5278,7 +5244,7 @@
                                           </p:stCondLst>
                                         </p:cTn>
                                         <p:tgtEl>
-                                          <p:spTgt spid="4">
+                                          <p:spTgt spid="3">
                                             <p:txEl>
                                               <p:pRg st="2" end="2"/>
                                             </p:txEl>
@@ -5327,7 +5293,7 @@
                                           </p:stCondLst>
                                         </p:cTn>
                                         <p:tgtEl>
-                                          <p:spTgt spid="4">
+                                          <p:spTgt spid="3">
                                             <p:txEl>
                                               <p:pRg st="3" end="3"/>
                                             </p:txEl>
@@ -5372,13 +5338,65 @@
       </p:par>
     </p:tnLst>
     <p:bldLst>
-      <p:bldP spid="4" grpId="0" uiExpand="1" build="p"/>
+      <p:bldP spid="3" grpId="0" uiExpand="1" build="p"/>
     </p:bldLst>
   </p:timing>
 </p:sld>
 </file>
 
 <file path=ppt/slides/slide15.xml><?xml version="1.0" encoding="utf-8"?>
+<p:sld xmlns:a="http://schemas.openxmlformats.org/drawingml/2006/main" xmlns:r="http://schemas.openxmlformats.org/officeDocument/2006/relationships" xmlns:p="http://schemas.openxmlformats.org/presentationml/2006/main">
+  <p:cSld>
+    <p:spTree>
+      <p:nvGrpSpPr>
+        <p:cNvPr id="1" name=""/>
+        <p:cNvGrpSpPr/>
+        <p:nvPr/>
+      </p:nvGrpSpPr>
+      <p:grpSpPr>
+        <a:xfrm>
+          <a:off x="0" y="0"/>
+          <a:ext cx="0" cy="0"/>
+          <a:chOff x="0" y="0"/>
+          <a:chExt cx="0" cy="0"/>
+        </a:xfrm>
+      </p:grpSpPr>
+      <p:pic>
+        <p:nvPicPr>
+          <p:cNvPr descr="attachments/Outside.webp" id="0" name="Picture 1"/>
+          <p:cNvPicPr>
+            <a:picLocks noGrp="1" noChangeAspect="1"/>
+          </p:cNvPicPr>
+          <p:nvPr/>
+        </p:nvPicPr>
+        <p:blipFill>
+          <a:blip r:embed="rId2"/>
+          <a:stretch>
+            <a:fillRect/>
+          </a:stretch>
+        </p:blipFill>
+        <p:spPr bwMode="auto">
+          <a:xfrm>
+            <a:off x="3670300" y="2006600"/>
+            <a:ext cx="5156200" cy="3441700"/>
+          </a:xfrm>
+          <a:prstGeom prst="rect">
+            <a:avLst/>
+          </a:prstGeom>
+          <a:noFill/>
+          <a:ln w="9525">
+            <a:noFill/>
+            <a:headEnd/>
+            <a:tailEnd/>
+          </a:ln>
+        </p:spPr>
+      </p:pic>
+    </p:spTree>
+  </p:cSld>
+</p:sld>
+</file>
+
+<file path=ppt/slides/slide16.xml><?xml version="1.0" encoding="utf-8"?>
 <p:sld xmlns:a="http://schemas.openxmlformats.org/drawingml/2006/main" xmlns:r="http://schemas.openxmlformats.org/officeDocument/2006/relationships" xmlns:p="http://schemas.openxmlformats.org/presentationml/2006/main">
   <p:cSld>
     <p:spTree>
@@ -5586,7 +5604,7 @@
 </p:sld>
 </file>
 
-<file path=ppt/slides/slide16.xml><?xml version="1.0" encoding="utf-8"?>
+<file path=ppt/slides/slide17.xml><?xml version="1.0" encoding="utf-8"?>
 <p:sld xmlns:a="http://schemas.openxmlformats.org/drawingml/2006/main" xmlns:r="http://schemas.openxmlformats.org/officeDocument/2006/relationships" xmlns:p="http://schemas.openxmlformats.org/presentationml/2006/main">
   <p:cSld>
     <p:spTree>

</xml_diff>

<commit_message>
백업 완료: 2023-11-25 04:05:16
Affected files:
.obsidian/workspace.json
노코드 엔지니어링/노션으로 랜딩페이지 만들기.md
노코드 엔지니어링/노션으로 랜딩페이지 만들기.pptx
노코드 엔지니어링/노코드 개론.pptx
</commit_message>
<xml_diff>
--- a/노코드 엔지니어링/노코드 개론.pptx
+++ b/노코드 엔지니어링/노코드 개론.pptx
@@ -22,6 +22,7 @@
     <p:sldId id="270" r:id="rId16"/>
     <p:sldId id="271" r:id="rId17"/>
     <p:sldId id="272" r:id="rId18"/>
+    <p:sldId id="273" r:id="rId19"/>
   </p:sldIdLst>
   <p:sldSz cx="12192000" cy="6858000"/>
   <p:notesSz cx="6858000" cy="9144000"/>
@@ -1232,8 +1233,8 @@
         </p:nvSpPr>
         <p:spPr>
           <a:xfrm>
-            <a:off x="1449217" y="804889"/>
-            <a:ext cx="9605635" cy="1059305"/>
+            <a:off x="1449217" y="804890"/>
+            <a:ext cx="9605635" cy="593638"/>
           </a:xfrm>
         </p:spPr>
         <p:txBody>
@@ -1260,8 +1261,8 @@
         </p:nvSpPr>
         <p:spPr>
           <a:xfrm>
-            <a:off x="1447331" y="2010878"/>
-            <a:ext cx="4645152" cy="3448595"/>
+            <a:off x="1447331" y="1556450"/>
+            <a:ext cx="4645152" cy="3903023"/>
           </a:xfrm>
         </p:spPr>
         <p:txBody>
@@ -1317,8 +1318,8 @@
         </p:nvSpPr>
         <p:spPr>
           <a:xfrm>
-            <a:off x="6413771" y="2017343"/>
-            <a:ext cx="4645152" cy="3441520"/>
+            <a:off x="6413771" y="1563847"/>
+            <a:ext cx="4645152" cy="3895016"/>
           </a:xfrm>
         </p:spPr>
         <p:txBody>
@@ -1327,35 +1328,35 @@
           <a:p>
             <a:pPr lvl="0"/>
             <a:r>
-              <a:rPr lang="en-US" altLang="ko-KR"/>
+              <a:rPr lang="en-US" altLang="ko-KR" dirty="0"/>
               <a:t>Click to edit Master text styles</a:t>
             </a:r>
           </a:p>
           <a:p>
             <a:pPr lvl="1"/>
             <a:r>
-              <a:rPr lang="en-US" altLang="ko-KR"/>
+              <a:rPr lang="en-US" altLang="ko-KR" dirty="0"/>
               <a:t>Second level</a:t>
             </a:r>
           </a:p>
           <a:p>
             <a:pPr lvl="2"/>
             <a:r>
-              <a:rPr lang="en-US" altLang="ko-KR"/>
+              <a:rPr lang="en-US" altLang="ko-KR" dirty="0"/>
               <a:t>Third level</a:t>
             </a:r>
           </a:p>
           <a:p>
             <a:pPr lvl="3"/>
             <a:r>
-              <a:rPr lang="en-US" altLang="ko-KR"/>
+              <a:rPr lang="en-US" altLang="ko-KR" dirty="0"/>
               <a:t>Fourth level</a:t>
             </a:r>
           </a:p>
           <a:p>
             <a:pPr lvl="4"/>
             <a:r>
-              <a:rPr lang="en-US" altLang="ko-KR"/>
+              <a:rPr lang="en-US" altLang="ko-KR" dirty="0"/>
               <a:t>Fifth level</a:t>
             </a:r>
             <a:endParaRPr lang="en-US" dirty="0"/>
@@ -3132,8 +3133,8 @@
         </p:nvSpPr>
         <p:spPr>
           <a:xfrm>
-            <a:off x="1451579" y="804519"/>
-            <a:ext cx="9603275" cy="1049235"/>
+            <a:off x="1451579" y="804520"/>
+            <a:ext cx="9603275" cy="550914"/>
           </a:xfrm>
           <a:prstGeom prst="rect">
             <a:avLst/>
@@ -3146,7 +3147,7 @@
           <a:lstStyle/>
           <a:p>
             <a:r>
-              <a:rPr altLang="ko-KR" lang="en-US"/>
+              <a:rPr altLang="ko-KR" dirty="0" lang="en-US"/>
               <a:t>Click to edit Master title style</a:t>
             </a:r>
             <a:endParaRPr dirty="0" lang="en-US"/>
@@ -3165,8 +3166,8 @@
         </p:nvSpPr>
         <p:spPr>
           <a:xfrm>
-            <a:off x="1451579" y="2015732"/>
-            <a:ext cx="9603275" cy="3450613"/>
+            <a:off x="1451579" y="1520384"/>
+            <a:ext cx="9603275" cy="3945962"/>
           </a:xfrm>
           <a:prstGeom prst="rect">
             <a:avLst/>
@@ -5377,8 +5378,8 @@
         </p:blipFill>
         <p:spPr bwMode="auto">
           <a:xfrm>
-            <a:off x="3670300" y="2006600"/>
-            <a:ext cx="5156200" cy="3441700"/>
+            <a:off x="3302000" y="1511300"/>
+            <a:ext cx="5905500" cy="3937000"/>
           </a:xfrm>
           <a:prstGeom prst="rect">
             <a:avLst/>
@@ -5846,6 +5847,382 @@
                                     <p:set>
                                       <p:cBhvr>
                                         <p:cTn id="14" dur="1" fill="hold">
+                                          <p:stCondLst>
+                                            <p:cond delay="0"/>
+                                          </p:stCondLst>
+                                        </p:cTn>
+                                        <p:tgtEl>
+                                          <p:spTgt spid="3">
+                                            <p:txEl>
+                                              <p:pRg st="4" end="4"/>
+                                            </p:txEl>
+                                          </p:spTgt>
+                                        </p:tgtEl>
+                                        <p:attrNameLst>
+                                          <p:attrName>style.visibility</p:attrName>
+                                        </p:attrNameLst>
+                                      </p:cBhvr>
+                                      <p:to>
+                                        <p:strVal val="visible"/>
+                                      </p:to>
+                                    </p:set>
+                                  </p:childTnLst>
+                                </p:cTn>
+                              </p:par>
+                            </p:childTnLst>
+                          </p:cTn>
+                        </p:par>
+                      </p:childTnLst>
+                    </p:cTn>
+                  </p:par>
+                </p:childTnLst>
+              </p:cTn>
+              <p:prevCondLst>
+                <p:cond evt="onPrev" delay="0">
+                  <p:tgtEl>
+                    <p:sldTgt/>
+                  </p:tgtEl>
+                </p:cond>
+              </p:prevCondLst>
+              <p:nextCondLst>
+                <p:cond evt="onNext" delay="0">
+                  <p:tgtEl>
+                    <p:sldTgt/>
+                  </p:tgtEl>
+                </p:cond>
+              </p:nextCondLst>
+            </p:seq>
+          </p:childTnLst>
+        </p:cTn>
+      </p:par>
+    </p:tnLst>
+    <p:bldLst>
+      <p:bldP spid="3" grpId="0" uiExpand="1" build="p"/>
+    </p:bldLst>
+  </p:timing>
+</p:sld>
+</file>
+
+<file path=ppt/slides/slide18.xml><?xml version="1.0" encoding="utf-8"?>
+<p:sld xmlns:a="http://schemas.openxmlformats.org/drawingml/2006/main" xmlns:r="http://schemas.openxmlformats.org/officeDocument/2006/relationships" xmlns:p="http://schemas.openxmlformats.org/presentationml/2006/main">
+  <p:cSld>
+    <p:spTree>
+      <p:nvGrpSpPr>
+        <p:cNvPr id="1" name=""/>
+        <p:cNvGrpSpPr/>
+        <p:nvPr/>
+      </p:nvGrpSpPr>
+      <p:grpSpPr>
+        <a:xfrm>
+          <a:off x="0" y="0"/>
+          <a:ext cx="0" cy="0"/>
+          <a:chOff x="0" y="0"/>
+          <a:chExt cx="0" cy="0"/>
+        </a:xfrm>
+      </p:grpSpPr>
+      <p:sp>
+        <p:nvSpPr>
+          <p:cNvPr id="2" name="Title 1"/>
+          <p:cNvSpPr>
+            <a:spLocks noGrp="1"/>
+          </p:cNvSpPr>
+          <p:nvPr>
+            <p:ph type="title"/>
+          </p:nvPr>
+        </p:nvSpPr>
+        <p:spPr/>
+        <p:txBody>
+          <a:bodyPr/>
+          <a:lstStyle/>
+          <a:p>
+            <a:pPr lvl="0" indent="0" marL="0">
+              <a:buNone/>
+            </a:pPr>
+            <a:r>
+              <a:rPr/>
+              <a:t>유지보수 관점에서의 노코드와 코딩</a:t>
+            </a:r>
+          </a:p>
+        </p:txBody>
+      </p:sp>
+      <p:sp>
+        <p:nvSpPr>
+          <p:cNvPr id="3" name="Content Placeholder 2"/>
+          <p:cNvSpPr>
+            <a:spLocks noGrp="1"/>
+          </p:cNvSpPr>
+          <p:nvPr>
+            <p:ph idx="1"/>
+          </p:nvPr>
+        </p:nvSpPr>
+        <p:spPr/>
+        <p:txBody>
+          <a:bodyPr/>
+          <a:lstStyle/>
+          <a:p>
+            <a:pPr lvl="0"/>
+            <a:r>
+              <a:rPr/>
+              <a:t>코드로 된 제품은, 평상시에 분해가 되어 있다가 실행할 때 조립이 된다.</a:t>
+            </a:r>
+          </a:p>
+          <a:p>
+            <a:pPr lvl="1"/>
+            <a:r>
+              <a:rPr/>
+              <a:t>Point of Interest 단위로 분리되어 있음.</a:t>
+            </a:r>
+          </a:p>
+          <a:p>
+            <a:pPr lvl="1"/>
+            <a:r>
+              <a:rPr/>
+              <a:t>개발 패턴 (MVC, MVVM)</a:t>
+            </a:r>
+          </a:p>
+          <a:p>
+            <a:pPr lvl="0"/>
+            <a:r>
+              <a:rPr/>
+              <a:t>노 코드 제품은, UI / DB / 로직이 한 데 뭉쳐서 존재하고 있고, 이 패키지 그대로 실행이 됨.</a:t>
+            </a:r>
+          </a:p>
+          <a:p>
+            <a:pPr lvl="1"/>
+            <a:r>
+              <a:rPr/>
+              <a:t>컨벤션이 엄청나게 중요해진다.</a:t>
+            </a:r>
+          </a:p>
+        </p:txBody>
+      </p:sp>
+    </p:spTree>
+  </p:cSld>
+  <p:timing>
+    <p:tnLst>
+      <p:par>
+        <p:cTn id="1" dur="indefinite" restart="never" nodeType="tmRoot">
+          <p:childTnLst>
+            <p:seq concurrent="1" nextAc="seek">
+              <p:cTn id="2" dur="indefinite" nodeType="mainSeq">
+                <p:childTnLst>
+                  <p:par>
+                    <p:cTn id="3" fill="hold">
+                      <p:stCondLst>
+                        <p:cond delay="indefinite"/>
+                      </p:stCondLst>
+                      <p:childTnLst>
+                        <p:par>
+                          <p:cTn id="4" fill="hold">
+                            <p:stCondLst>
+                              <p:cond delay="0"/>
+                            </p:stCondLst>
+                            <p:childTnLst>
+                              <p:par>
+                                <p:cTn id="5" presetID="1" presetClass="entr" presetSubtype="0" fill="hold" grpId="0" nodeType="clickEffect">
+                                  <p:stCondLst>
+                                    <p:cond delay="0"/>
+                                  </p:stCondLst>
+                                  <p:childTnLst>
+                                    <p:set>
+                                      <p:cBhvr>
+                                        <p:cTn id="6" dur="1" fill="hold">
+                                          <p:stCondLst>
+                                            <p:cond delay="0"/>
+                                          </p:stCondLst>
+                                        </p:cTn>
+                                        <p:tgtEl>
+                                          <p:spTgt spid="3">
+                                            <p:txEl>
+                                              <p:pRg st="0" end="0"/>
+                                            </p:txEl>
+                                          </p:spTgt>
+                                        </p:tgtEl>
+                                        <p:attrNameLst>
+                                          <p:attrName>style.visibility</p:attrName>
+                                        </p:attrNameLst>
+                                      </p:cBhvr>
+                                      <p:to>
+                                        <p:strVal val="visible"/>
+                                      </p:to>
+                                    </p:set>
+                                  </p:childTnLst>
+                                </p:cTn>
+                              </p:par>
+                            </p:childTnLst>
+                          </p:cTn>
+                        </p:par>
+                      </p:childTnLst>
+                    </p:cTn>
+                  </p:par>
+                  <p:par>
+                    <p:cTn id="7" fill="hold">
+                      <p:stCondLst>
+                        <p:cond delay="indefinite"/>
+                      </p:stCondLst>
+                      <p:childTnLst>
+                        <p:par>
+                          <p:cTn id="8" fill="hold">
+                            <p:stCondLst>
+                              <p:cond delay="0"/>
+                            </p:stCondLst>
+                            <p:childTnLst>
+                              <p:par>
+                                <p:cTn id="9" presetID="1" presetClass="entr" presetSubtype="0" fill="hold" grpId="0" nodeType="clickEffect">
+                                  <p:stCondLst>
+                                    <p:cond delay="0"/>
+                                  </p:stCondLst>
+                                  <p:childTnLst>
+                                    <p:set>
+                                      <p:cBhvr>
+                                        <p:cTn id="10" dur="1" fill="hold">
+                                          <p:stCondLst>
+                                            <p:cond delay="0"/>
+                                          </p:stCondLst>
+                                        </p:cTn>
+                                        <p:tgtEl>
+                                          <p:spTgt spid="3">
+                                            <p:txEl>
+                                              <p:pRg st="1" end="1"/>
+                                            </p:txEl>
+                                          </p:spTgt>
+                                        </p:tgtEl>
+                                        <p:attrNameLst>
+                                          <p:attrName>style.visibility</p:attrName>
+                                        </p:attrNameLst>
+                                      </p:cBhvr>
+                                      <p:to>
+                                        <p:strVal val="visible"/>
+                                      </p:to>
+                                    </p:set>
+                                  </p:childTnLst>
+                                </p:cTn>
+                              </p:par>
+                            </p:childTnLst>
+                          </p:cTn>
+                        </p:par>
+                      </p:childTnLst>
+                    </p:cTn>
+                  </p:par>
+                  <p:par>
+                    <p:cTn id="11" fill="hold">
+                      <p:stCondLst>
+                        <p:cond delay="indefinite"/>
+                      </p:stCondLst>
+                      <p:childTnLst>
+                        <p:par>
+                          <p:cTn id="12" fill="hold">
+                            <p:stCondLst>
+                              <p:cond delay="0"/>
+                            </p:stCondLst>
+                            <p:childTnLst>
+                              <p:par>
+                                <p:cTn id="13" presetID="1" presetClass="entr" presetSubtype="0" fill="hold" grpId="0" nodeType="clickEffect">
+                                  <p:stCondLst>
+                                    <p:cond delay="0"/>
+                                  </p:stCondLst>
+                                  <p:childTnLst>
+                                    <p:set>
+                                      <p:cBhvr>
+                                        <p:cTn id="14" dur="1" fill="hold">
+                                          <p:stCondLst>
+                                            <p:cond delay="0"/>
+                                          </p:stCondLst>
+                                        </p:cTn>
+                                        <p:tgtEl>
+                                          <p:spTgt spid="3">
+                                            <p:txEl>
+                                              <p:pRg st="2" end="2"/>
+                                            </p:txEl>
+                                          </p:spTgt>
+                                        </p:tgtEl>
+                                        <p:attrNameLst>
+                                          <p:attrName>style.visibility</p:attrName>
+                                        </p:attrNameLst>
+                                      </p:cBhvr>
+                                      <p:to>
+                                        <p:strVal val="visible"/>
+                                      </p:to>
+                                    </p:set>
+                                  </p:childTnLst>
+                                </p:cTn>
+                              </p:par>
+                            </p:childTnLst>
+                          </p:cTn>
+                        </p:par>
+                      </p:childTnLst>
+                    </p:cTn>
+                  </p:par>
+                  <p:par>
+                    <p:cTn id="15" fill="hold">
+                      <p:stCondLst>
+                        <p:cond delay="indefinite"/>
+                      </p:stCondLst>
+                      <p:childTnLst>
+                        <p:par>
+                          <p:cTn id="16" fill="hold">
+                            <p:stCondLst>
+                              <p:cond delay="0"/>
+                            </p:stCondLst>
+                            <p:childTnLst>
+                              <p:par>
+                                <p:cTn id="17" presetID="1" presetClass="entr" presetSubtype="0" fill="hold" grpId="0" nodeType="clickEffect">
+                                  <p:stCondLst>
+                                    <p:cond delay="0"/>
+                                  </p:stCondLst>
+                                  <p:childTnLst>
+                                    <p:set>
+                                      <p:cBhvr>
+                                        <p:cTn id="18" dur="1" fill="hold">
+                                          <p:stCondLst>
+                                            <p:cond delay="0"/>
+                                          </p:stCondLst>
+                                        </p:cTn>
+                                        <p:tgtEl>
+                                          <p:spTgt spid="3">
+                                            <p:txEl>
+                                              <p:pRg st="3" end="3"/>
+                                            </p:txEl>
+                                          </p:spTgt>
+                                        </p:tgtEl>
+                                        <p:attrNameLst>
+                                          <p:attrName>style.visibility</p:attrName>
+                                        </p:attrNameLst>
+                                      </p:cBhvr>
+                                      <p:to>
+                                        <p:strVal val="visible"/>
+                                      </p:to>
+                                    </p:set>
+                                  </p:childTnLst>
+                                </p:cTn>
+                              </p:par>
+                            </p:childTnLst>
+                          </p:cTn>
+                        </p:par>
+                      </p:childTnLst>
+                    </p:cTn>
+                  </p:par>
+                  <p:par>
+                    <p:cTn id="19" fill="hold">
+                      <p:stCondLst>
+                        <p:cond delay="indefinite"/>
+                      </p:stCondLst>
+                      <p:childTnLst>
+                        <p:par>
+                          <p:cTn id="20" fill="hold">
+                            <p:stCondLst>
+                              <p:cond delay="0"/>
+                            </p:stCondLst>
+                            <p:childTnLst>
+                              <p:par>
+                                <p:cTn id="21" presetID="1" presetClass="entr" presetSubtype="0" fill="hold" grpId="0" nodeType="clickEffect">
+                                  <p:stCondLst>
+                                    <p:cond delay="0"/>
+                                  </p:stCondLst>
+                                  <p:childTnLst>
+                                    <p:set>
+                                      <p:cBhvr>
+                                        <p:cTn id="22" dur="1" fill="hold">
                                           <p:stCondLst>
                                             <p:cond delay="0"/>
                                           </p:stCondLst>
@@ -6234,8 +6611,8 @@
         </p:blipFill>
         <p:spPr bwMode="auto">
           <a:xfrm>
-            <a:off x="3124200" y="2006600"/>
-            <a:ext cx="6248400" cy="3441700"/>
+            <a:off x="2679700" y="1511300"/>
+            <a:ext cx="7150100" cy="3937000"/>
           </a:xfrm>
           <a:prstGeom prst="rect">
             <a:avLst/>

</xml_diff>